<commit_message>
various things, including first draft of report
</commit_message>
<xml_diff>
--- a/2023_05_24 - BDA - Big Data Big Dreams v0.pptx
+++ b/2023_05_24 - BDA - Big Data Big Dreams v0.pptx
@@ -3373,7 +3373,7 @@
         <p:spPr>
           <a:xfrm>
             <a:off x="891396" y="428179"/>
-            <a:ext cx="10409208" cy="3693319"/>
+            <a:ext cx="10409208" cy="3970318"/>
           </a:xfrm>
           <a:prstGeom prst="rect">
             <a:avLst/>
@@ -3617,6 +3617,25 @@
                 <a:cs typeface="Arial" panose="020B0604020202020204" pitchFamily="34" charset="0"/>
               </a:rPr>
               <a:t>--&gt;</a:t>
+            </a:r>
+            <a:endParaRPr lang="en-BE" dirty="0" smtClean="0">
+              <a:solidFill>
+                <a:schemeClr val="bg1"/>
+              </a:solidFill>
+              <a:latin typeface="Arial" panose="020B0604020202020204" pitchFamily="34" charset="0"/>
+              <a:cs typeface="Arial" panose="020B0604020202020204" pitchFamily="34" charset="0"/>
+            </a:endParaRPr>
+          </a:p>
+          <a:p>
+            <a:r>
+              <a:rPr lang="en-BE" dirty="0" smtClean="0">
+                <a:solidFill>
+                  <a:schemeClr val="bg1"/>
+                </a:solidFill>
+                <a:latin typeface="Arial" panose="020B0604020202020204" pitchFamily="34" charset="0"/>
+                <a:cs typeface="Arial" panose="020B0604020202020204" pitchFamily="34" charset="0"/>
+              </a:rPr>
+              <a:t>Xxx</a:t>
             </a:r>
             <a:endParaRPr lang="en-BE" dirty="0" smtClean="0">
               <a:solidFill>
@@ -3715,7 +3734,7 @@
         <p:spPr>
           <a:xfrm>
             <a:off x="891396" y="428179"/>
-            <a:ext cx="10409208" cy="2585323"/>
+            <a:ext cx="10409208" cy="2862322"/>
           </a:xfrm>
           <a:prstGeom prst="rect">
             <a:avLst/>
@@ -3880,7 +3899,36 @@
                 <a:latin typeface="Arial" panose="020B0604020202020204" pitchFamily="34" charset="0"/>
                 <a:cs typeface="Arial" panose="020B0604020202020204" pitchFamily="34" charset="0"/>
               </a:rPr>
-              <a:t>, etc. to get a feeling for how Economists write such notes.) --&gt;</a:t>
+              <a:t>, etc. to get a feeling for how Economists write such notes.) </a:t>
+            </a:r>
+            <a:r>
+              <a:rPr lang="en-GB" dirty="0" smtClean="0">
+                <a:solidFill>
+                  <a:schemeClr val="bg1"/>
+                </a:solidFill>
+                <a:latin typeface="Arial" panose="020B0604020202020204" pitchFamily="34" charset="0"/>
+                <a:cs typeface="Arial" panose="020B0604020202020204" pitchFamily="34" charset="0"/>
+              </a:rPr>
+              <a:t>--&gt;</a:t>
+            </a:r>
+            <a:endParaRPr lang="en-BE" dirty="0" smtClean="0">
+              <a:solidFill>
+                <a:schemeClr val="bg1"/>
+              </a:solidFill>
+              <a:latin typeface="Arial" panose="020B0604020202020204" pitchFamily="34" charset="0"/>
+              <a:cs typeface="Arial" panose="020B0604020202020204" pitchFamily="34" charset="0"/>
+            </a:endParaRPr>
+          </a:p>
+          <a:p>
+            <a:r>
+              <a:rPr lang="en-BE" dirty="0" smtClean="0">
+                <a:solidFill>
+                  <a:schemeClr val="bg1"/>
+                </a:solidFill>
+                <a:latin typeface="Arial" panose="020B0604020202020204" pitchFamily="34" charset="0"/>
+                <a:cs typeface="Arial" panose="020B0604020202020204" pitchFamily="34" charset="0"/>
+              </a:rPr>
+              <a:t>Xxx</a:t>
             </a:r>
             <a:endParaRPr lang="en-BE" dirty="0" smtClean="0">
               <a:solidFill>
@@ -3961,7 +4009,7 @@
         <p:spPr>
           <a:xfrm>
             <a:off x="891396" y="428179"/>
-            <a:ext cx="10409208" cy="3416320"/>
+            <a:ext cx="10409208" cy="3693319"/>
           </a:xfrm>
           <a:prstGeom prst="rect">
             <a:avLst/>
@@ -4126,7 +4174,36 @@
                 <a:latin typeface="Arial" panose="020B0604020202020204" pitchFamily="34" charset="0"/>
                 <a:cs typeface="Arial" panose="020B0604020202020204" pitchFamily="34" charset="0"/>
               </a:rPr>
-              <a:t>&lt;!-- Almost done! In this last section, suppose you have to re-run your data pipeline with substantially more data. Further suppose that you have access to cloud resources to scale up/scale out the different components of your pipeline. Briefly describe which cloud solutions you would use for which part of your analysis and explain why. Note: as in the explanations above, this part is also very project-specific. Some cloud solutions probably make sense for some projects but would be overkill in other projects, etc.  --&gt;</a:t>
+              <a:t>&lt;!-- Almost done! In this last section, suppose you have to re-run your data pipeline with substantially more data. Further suppose that you have access to cloud resources to scale up/scale out the different components of your pipeline. Briefly describe which cloud solutions you would use for which part of your analysis and explain why. Note: as in the explanations above, this part is also very project-specific. Some cloud solutions probably make sense for some projects but would be overkill in other projects, etc.  </a:t>
+            </a:r>
+            <a:r>
+              <a:rPr lang="en-GB" dirty="0" smtClean="0">
+                <a:solidFill>
+                  <a:schemeClr val="bg1"/>
+                </a:solidFill>
+                <a:latin typeface="Arial" panose="020B0604020202020204" pitchFamily="34" charset="0"/>
+                <a:cs typeface="Arial" panose="020B0604020202020204" pitchFamily="34" charset="0"/>
+              </a:rPr>
+              <a:t>--&gt;</a:t>
+            </a:r>
+            <a:endParaRPr lang="en-BE" dirty="0" smtClean="0">
+              <a:solidFill>
+                <a:schemeClr val="bg1"/>
+              </a:solidFill>
+              <a:latin typeface="Arial" panose="020B0604020202020204" pitchFamily="34" charset="0"/>
+              <a:cs typeface="Arial" panose="020B0604020202020204" pitchFamily="34" charset="0"/>
+            </a:endParaRPr>
+          </a:p>
+          <a:p>
+            <a:r>
+              <a:rPr lang="en-BE" dirty="0" smtClean="0">
+                <a:solidFill>
+                  <a:schemeClr val="bg1"/>
+                </a:solidFill>
+                <a:latin typeface="Arial" panose="020B0604020202020204" pitchFamily="34" charset="0"/>
+                <a:cs typeface="Arial" panose="020B0604020202020204" pitchFamily="34" charset="0"/>
+              </a:rPr>
+              <a:t>Xxx</a:t>
             </a:r>
             <a:endParaRPr lang="en-BE" dirty="0" smtClean="0">
               <a:solidFill>
@@ -6771,14 +6848,14 @@
           </a:p>
           <a:p>
             <a:r>
-              <a:rPr lang="en-GB" dirty="0" smtClean="0">
-                <a:solidFill>
-                  <a:schemeClr val="bg1"/>
-                </a:solidFill>
-                <a:latin typeface="Arial" panose="020B0604020202020204" pitchFamily="34" charset="0"/>
-                <a:cs typeface="Arial" panose="020B0604020202020204" pitchFamily="34" charset="0"/>
-              </a:rPr>
-              <a:t> </a:t>
+              <a:rPr lang="en-BE" dirty="0" smtClean="0">
+                <a:solidFill>
+                  <a:schemeClr val="bg1"/>
+                </a:solidFill>
+                <a:latin typeface="Arial" panose="020B0604020202020204" pitchFamily="34" charset="0"/>
+                <a:cs typeface="Arial" panose="020B0604020202020204" pitchFamily="34" charset="0"/>
+              </a:rPr>
+              <a:t>Xxx</a:t>
             </a:r>
             <a:endParaRPr lang="en-BE" dirty="0" smtClean="0">
               <a:solidFill>
@@ -6859,7 +6936,7 @@
         <p:spPr>
           <a:xfrm>
             <a:off x="891396" y="428179"/>
-            <a:ext cx="10409208" cy="2862322"/>
+            <a:ext cx="10409208" cy="3139321"/>
           </a:xfrm>
           <a:prstGeom prst="rect">
             <a:avLst/>
@@ -7033,7 +7110,46 @@
                 <a:latin typeface="Arial" panose="020B0604020202020204" pitchFamily="34" charset="0"/>
                 <a:cs typeface="Arial" panose="020B0604020202020204" pitchFamily="34" charset="0"/>
               </a:rPr>
-              <a:t>&lt;!-- Describe the challenges related to cleaning/filtering your raw data in order to prepare an analytic data set. What were the bottle necks (which tasks and which hardware resources)? How did you speed up/improve the data cleaning procedure for large amounts of data? Which tools/techniques did you use and how do these tools/techniques work?   --&gt;</a:t>
+              <a:t>&lt;!-- Describe the challenges related to cleaning/filtering your raw data in order to prepare an analytic data set. What were the bottle necks (which tasks and which hardware resources)? How did you speed up/improve the data cleaning procedure for large amounts of data? Which tools/techniques did you use and how do these tools/techniques work?   </a:t>
+            </a:r>
+            <a:r>
+              <a:rPr lang="en-GB" dirty="0" smtClean="0">
+                <a:solidFill>
+                  <a:schemeClr val="bg1"/>
+                </a:solidFill>
+                <a:latin typeface="Arial" panose="020B0604020202020204" pitchFamily="34" charset="0"/>
+                <a:cs typeface="Arial" panose="020B0604020202020204" pitchFamily="34" charset="0"/>
+              </a:rPr>
+              <a:t>--&gt;</a:t>
+            </a:r>
+            <a:r>
+              <a:rPr lang="en-BE" dirty="0" smtClean="0">
+                <a:solidFill>
+                  <a:schemeClr val="bg1"/>
+                </a:solidFill>
+                <a:latin typeface="Arial" panose="020B0604020202020204" pitchFamily="34" charset="0"/>
+                <a:cs typeface="Arial" panose="020B0604020202020204" pitchFamily="34" charset="0"/>
+              </a:rPr>
+              <a:t/>
+            </a:r>
+            <a:br>
+              <a:rPr lang="en-BE" dirty="0" smtClean="0">
+                <a:solidFill>
+                  <a:schemeClr val="bg1"/>
+                </a:solidFill>
+                <a:latin typeface="Arial" panose="020B0604020202020204" pitchFamily="34" charset="0"/>
+                <a:cs typeface="Arial" panose="020B0604020202020204" pitchFamily="34" charset="0"/>
+              </a:rPr>
+            </a:br>
+            <a:r>
+              <a:rPr lang="en-BE" dirty="0" smtClean="0">
+                <a:solidFill>
+                  <a:schemeClr val="bg1"/>
+                </a:solidFill>
+                <a:latin typeface="Arial" panose="020B0604020202020204" pitchFamily="34" charset="0"/>
+                <a:cs typeface="Arial" panose="020B0604020202020204" pitchFamily="34" charset="0"/>
+              </a:rPr>
+              <a:t>Xxx</a:t>
             </a:r>
             <a:endParaRPr lang="en-BE" dirty="0" smtClean="0">
               <a:solidFill>

</xml_diff>

<commit_message>
22_05_2023 final update of the day
</commit_message>
<xml_diff>
--- a/2023_05_24 - BDA - Big Data Big Dreams v0.pptx
+++ b/2023_05_24 - BDA - Big Data Big Dreams v0.pptx
@@ -264,7 +264,7 @@
           <a:p>
             <a:fld id="{F97EA7D6-1BAF-4656-97B9-63A86D9CFAEF}" type="datetimeFigureOut">
               <a:rPr lang="en-GB" smtClean="0"/>
-              <a:t>22/05/2023</a:t>
+              <a:t>23/05/2023</a:t>
             </a:fld>
             <a:endParaRPr lang="en-GB"/>
           </a:p>
@@ -434,7 +434,7 @@
           <a:p>
             <a:fld id="{F97EA7D6-1BAF-4656-97B9-63A86D9CFAEF}" type="datetimeFigureOut">
               <a:rPr lang="en-GB" smtClean="0"/>
-              <a:t>22/05/2023</a:t>
+              <a:t>23/05/2023</a:t>
             </a:fld>
             <a:endParaRPr lang="en-GB"/>
           </a:p>
@@ -614,7 +614,7 @@
           <a:p>
             <a:fld id="{F97EA7D6-1BAF-4656-97B9-63A86D9CFAEF}" type="datetimeFigureOut">
               <a:rPr lang="en-GB" smtClean="0"/>
-              <a:t>22/05/2023</a:t>
+              <a:t>23/05/2023</a:t>
             </a:fld>
             <a:endParaRPr lang="en-GB"/>
           </a:p>
@@ -784,7 +784,7 @@
           <a:p>
             <a:fld id="{F97EA7D6-1BAF-4656-97B9-63A86D9CFAEF}" type="datetimeFigureOut">
               <a:rPr lang="en-GB" smtClean="0"/>
-              <a:t>22/05/2023</a:t>
+              <a:t>23/05/2023</a:t>
             </a:fld>
             <a:endParaRPr lang="en-GB"/>
           </a:p>
@@ -1030,7 +1030,7 @@
           <a:p>
             <a:fld id="{F97EA7D6-1BAF-4656-97B9-63A86D9CFAEF}" type="datetimeFigureOut">
               <a:rPr lang="en-GB" smtClean="0"/>
-              <a:t>22/05/2023</a:t>
+              <a:t>23/05/2023</a:t>
             </a:fld>
             <a:endParaRPr lang="en-GB"/>
           </a:p>
@@ -1262,7 +1262,7 @@
           <a:p>
             <a:fld id="{F97EA7D6-1BAF-4656-97B9-63A86D9CFAEF}" type="datetimeFigureOut">
               <a:rPr lang="en-GB" smtClean="0"/>
-              <a:t>22/05/2023</a:t>
+              <a:t>23/05/2023</a:t>
             </a:fld>
             <a:endParaRPr lang="en-GB"/>
           </a:p>
@@ -1629,7 +1629,7 @@
           <a:p>
             <a:fld id="{F97EA7D6-1BAF-4656-97B9-63A86D9CFAEF}" type="datetimeFigureOut">
               <a:rPr lang="en-GB" smtClean="0"/>
-              <a:t>22/05/2023</a:t>
+              <a:t>23/05/2023</a:t>
             </a:fld>
             <a:endParaRPr lang="en-GB"/>
           </a:p>
@@ -1747,7 +1747,7 @@
           <a:p>
             <a:fld id="{F97EA7D6-1BAF-4656-97B9-63A86D9CFAEF}" type="datetimeFigureOut">
               <a:rPr lang="en-GB" smtClean="0"/>
-              <a:t>22/05/2023</a:t>
+              <a:t>23/05/2023</a:t>
             </a:fld>
             <a:endParaRPr lang="en-GB"/>
           </a:p>
@@ -1842,7 +1842,7 @@
           <a:p>
             <a:fld id="{F97EA7D6-1BAF-4656-97B9-63A86D9CFAEF}" type="datetimeFigureOut">
               <a:rPr lang="en-GB" smtClean="0"/>
-              <a:t>22/05/2023</a:t>
+              <a:t>23/05/2023</a:t>
             </a:fld>
             <a:endParaRPr lang="en-GB"/>
           </a:p>
@@ -2119,7 +2119,7 @@
           <a:p>
             <a:fld id="{F97EA7D6-1BAF-4656-97B9-63A86D9CFAEF}" type="datetimeFigureOut">
               <a:rPr lang="en-GB" smtClean="0"/>
-              <a:t>22/05/2023</a:t>
+              <a:t>23/05/2023</a:t>
             </a:fld>
             <a:endParaRPr lang="en-GB"/>
           </a:p>
@@ -2372,7 +2372,7 @@
           <a:p>
             <a:fld id="{F97EA7D6-1BAF-4656-97B9-63A86D9CFAEF}" type="datetimeFigureOut">
               <a:rPr lang="en-GB" smtClean="0"/>
-              <a:t>22/05/2023</a:t>
+              <a:t>23/05/2023</a:t>
             </a:fld>
             <a:endParaRPr lang="en-GB"/>
           </a:p>
@@ -2594,7 +2594,7 @@
           <a:p>
             <a:fld id="{F97EA7D6-1BAF-4656-97B9-63A86D9CFAEF}" type="datetimeFigureOut">
               <a:rPr lang="en-GB" smtClean="0"/>
-              <a:t>22/05/2023</a:t>
+              <a:t>23/05/2023</a:t>
             </a:fld>
             <a:endParaRPr lang="en-GB"/>
           </a:p>
@@ -3195,106 +3195,86 @@
             </a:endParaRPr>
           </a:p>
           <a:p>
+            <a:endParaRPr lang="en-BE" dirty="0" smtClean="0">
+              <a:solidFill>
+                <a:schemeClr val="bg1"/>
+              </a:solidFill>
+              <a:latin typeface="Arial" panose="020B0604020202020204" pitchFamily="34" charset="0"/>
+              <a:cs typeface="Arial" panose="020B0604020202020204" pitchFamily="34" charset="0"/>
+            </a:endParaRPr>
+          </a:p>
+          <a:p>
+            <a:r>
+              <a:rPr lang="en-GB" dirty="0">
+                <a:solidFill>
+                  <a:schemeClr val="bg1"/>
+                </a:solidFill>
+                <a:latin typeface="Arial" panose="020B0604020202020204" pitchFamily="34" charset="0"/>
+                <a:cs typeface="Arial" panose="020B0604020202020204" pitchFamily="34" charset="0"/>
+              </a:rPr>
+              <a:t>What is the unique optimal investment </a:t>
+            </a:r>
+            <a:r>
+              <a:rPr lang="en-GB" dirty="0" smtClean="0">
+                <a:solidFill>
+                  <a:schemeClr val="bg1"/>
+                </a:solidFill>
+                <a:latin typeface="Arial" panose="020B0604020202020204" pitchFamily="34" charset="0"/>
+                <a:cs typeface="Arial" panose="020B0604020202020204" pitchFamily="34" charset="0"/>
+              </a:rPr>
+              <a:t>strategy</a:t>
+            </a:r>
+            <a:r>
+              <a:rPr lang="en-BE" baseline="30000" dirty="0" smtClean="0">
+                <a:solidFill>
+                  <a:schemeClr val="bg1"/>
+                </a:solidFill>
+                <a:latin typeface="Arial" panose="020B0604020202020204" pitchFamily="34" charset="0"/>
+                <a:cs typeface="Arial" panose="020B0604020202020204" pitchFamily="34" charset="0"/>
+              </a:rPr>
+              <a:t>1</a:t>
+            </a:r>
+            <a:r>
+              <a:rPr lang="en-GB" dirty="0" smtClean="0">
+                <a:solidFill>
+                  <a:schemeClr val="bg1"/>
+                </a:solidFill>
+                <a:latin typeface="Arial" panose="020B0604020202020204" pitchFamily="34" charset="0"/>
+                <a:cs typeface="Arial" panose="020B0604020202020204" pitchFamily="34" charset="0"/>
+              </a:rPr>
+              <a:t> </a:t>
+            </a:r>
+            <a:r>
+              <a:rPr lang="en-GB" dirty="0">
+                <a:solidFill>
+                  <a:schemeClr val="bg1"/>
+                </a:solidFill>
+                <a:latin typeface="Arial" panose="020B0604020202020204" pitchFamily="34" charset="0"/>
+                <a:cs typeface="Arial" panose="020B0604020202020204" pitchFamily="34" charset="0"/>
+              </a:rPr>
+              <a:t>that corresponds exactly to a given user-specified set of investment </a:t>
+            </a:r>
+            <a:r>
+              <a:rPr lang="en-GB" dirty="0" smtClean="0">
+                <a:solidFill>
+                  <a:schemeClr val="bg1"/>
+                </a:solidFill>
+                <a:latin typeface="Arial" panose="020B0604020202020204" pitchFamily="34" charset="0"/>
+                <a:cs typeface="Arial" panose="020B0604020202020204" pitchFamily="34" charset="0"/>
+              </a:rPr>
+              <a:t>parameters</a:t>
+            </a:r>
+            <a:r>
+              <a:rPr lang="en-BE" dirty="0" smtClean="0">
+                <a:solidFill>
+                  <a:schemeClr val="bg1"/>
+                </a:solidFill>
+                <a:latin typeface="Arial" panose="020B0604020202020204" pitchFamily="34" charset="0"/>
+                <a:cs typeface="Arial" panose="020B0604020202020204" pitchFamily="34" charset="0"/>
+              </a:rPr>
+              <a:t>?</a:t>
+            </a:r>
             <a:endParaRPr lang="en-BE" dirty="0">
-              <a:solidFill>
-                <a:schemeClr val="bg1"/>
-              </a:solidFill>
-              <a:latin typeface="Arial" panose="020B0604020202020204" pitchFamily="34" charset="0"/>
-              <a:cs typeface="Arial" panose="020B0604020202020204" pitchFamily="34" charset="0"/>
-            </a:endParaRPr>
-          </a:p>
-          <a:p>
-            <a:r>
-              <a:rPr lang="en-BE" dirty="0" smtClean="0">
-                <a:solidFill>
-                  <a:schemeClr val="bg1"/>
-                </a:solidFill>
-                <a:latin typeface="Arial" panose="020B0604020202020204" pitchFamily="34" charset="0"/>
-                <a:cs typeface="Arial" panose="020B0604020202020204" pitchFamily="34" charset="0"/>
-              </a:rPr>
-              <a:t>What are </a:t>
-            </a:r>
-            <a:r>
-              <a:rPr lang="en-GB" dirty="0" smtClean="0">
-                <a:solidFill>
-                  <a:schemeClr val="bg1"/>
-                </a:solidFill>
-                <a:latin typeface="Arial" panose="020B0604020202020204" pitchFamily="34" charset="0"/>
-                <a:cs typeface="Arial" panose="020B0604020202020204" pitchFamily="34" charset="0"/>
-              </a:rPr>
-              <a:t>the </a:t>
-            </a:r>
-            <a:r>
-              <a:rPr lang="en-GB" dirty="0">
-                <a:solidFill>
-                  <a:schemeClr val="bg1"/>
-                </a:solidFill>
-                <a:latin typeface="Arial" panose="020B0604020202020204" pitchFamily="34" charset="0"/>
-                <a:cs typeface="Arial" panose="020B0604020202020204" pitchFamily="34" charset="0"/>
-              </a:rPr>
-              <a:t>optimal, quantitative investment </a:t>
-            </a:r>
-            <a:r>
-              <a:rPr lang="en-GB" dirty="0" err="1" smtClean="0">
-                <a:solidFill>
-                  <a:schemeClr val="bg1"/>
-                </a:solidFill>
-                <a:latin typeface="Arial" panose="020B0604020202020204" pitchFamily="34" charset="0"/>
-                <a:cs typeface="Arial" panose="020B0604020202020204" pitchFamily="34" charset="0"/>
-              </a:rPr>
-              <a:t>strateg</a:t>
-            </a:r>
-            <a:r>
-              <a:rPr lang="en-BE" dirty="0" smtClean="0">
-                <a:solidFill>
-                  <a:schemeClr val="bg1"/>
-                </a:solidFill>
-                <a:latin typeface="Arial" panose="020B0604020202020204" pitchFamily="34" charset="0"/>
-                <a:cs typeface="Arial" panose="020B0604020202020204" pitchFamily="34" charset="0"/>
-              </a:rPr>
-              <a:t>ies</a:t>
-            </a:r>
-            <a:r>
-              <a:rPr lang="en-GB" baseline="30000" dirty="0" smtClean="0">
-                <a:solidFill>
-                  <a:schemeClr val="bg1"/>
-                </a:solidFill>
-                <a:latin typeface="Arial" panose="020B0604020202020204" pitchFamily="34" charset="0"/>
-                <a:cs typeface="Arial" panose="020B0604020202020204" pitchFamily="34" charset="0"/>
-              </a:rPr>
-              <a:t>1</a:t>
-            </a:r>
-            <a:r>
-              <a:rPr lang="en-GB" dirty="0" smtClean="0">
-                <a:solidFill>
-                  <a:schemeClr val="bg1"/>
-                </a:solidFill>
-                <a:latin typeface="Arial" panose="020B0604020202020204" pitchFamily="34" charset="0"/>
-                <a:cs typeface="Arial" panose="020B0604020202020204" pitchFamily="34" charset="0"/>
-              </a:rPr>
-              <a:t> for </a:t>
-            </a:r>
-            <a:r>
-              <a:rPr lang="en-BE" dirty="0" smtClean="0">
-                <a:solidFill>
-                  <a:schemeClr val="bg1"/>
-                </a:solidFill>
-                <a:latin typeface="Arial" panose="020B0604020202020204" pitchFamily="34" charset="0"/>
-                <a:cs typeface="Arial" panose="020B0604020202020204" pitchFamily="34" charset="0"/>
-              </a:rPr>
-              <a:t>different possible combinations of investment parameters</a:t>
-            </a:r>
-            <a:r>
-              <a:rPr lang="en-GB" dirty="0" smtClean="0">
-                <a:solidFill>
-                  <a:schemeClr val="bg1"/>
-                </a:solidFill>
-                <a:latin typeface="Arial" panose="020B0604020202020204" pitchFamily="34" charset="0"/>
-                <a:cs typeface="Arial" panose="020B0604020202020204" pitchFamily="34" charset="0"/>
-              </a:rPr>
-              <a:t>?</a:t>
-            </a:r>
-            <a:endParaRPr lang="en-BE" dirty="0" smtClean="0">
               <a:solidFill>
                 <a:schemeClr val="bg1"/>
               </a:solidFill>
@@ -5060,47 +5040,17 @@
           </a:p>
           <a:p>
             <a:r>
-              <a:rPr lang="en-BE" sz="1600" b="1" dirty="0" smtClean="0">
-                <a:solidFill>
-                  <a:schemeClr val="bg1"/>
-                </a:solidFill>
-                <a:latin typeface="Arial" panose="020B0604020202020204" pitchFamily="34" charset="0"/>
-                <a:cs typeface="Arial" panose="020B0604020202020204" pitchFamily="34" charset="0"/>
-              </a:rPr>
-              <a:t>What are </a:t>
-            </a:r>
-            <a:r>
-              <a:rPr lang="en-GB" sz="1600" b="1" dirty="0" smtClean="0">
-                <a:solidFill>
-                  <a:schemeClr val="bg1"/>
-                </a:solidFill>
-                <a:latin typeface="Arial" panose="020B0604020202020204" pitchFamily="34" charset="0"/>
-                <a:cs typeface="Arial" panose="020B0604020202020204" pitchFamily="34" charset="0"/>
-              </a:rPr>
-              <a:t>the optimal, quantitative investment </a:t>
-            </a:r>
-            <a:r>
-              <a:rPr lang="en-GB" sz="1600" b="1" dirty="0" err="1" smtClean="0">
-                <a:solidFill>
-                  <a:schemeClr val="bg1"/>
-                </a:solidFill>
-                <a:latin typeface="Arial" panose="020B0604020202020204" pitchFamily="34" charset="0"/>
-                <a:cs typeface="Arial" panose="020B0604020202020204" pitchFamily="34" charset="0"/>
-              </a:rPr>
-              <a:t>strateg</a:t>
-            </a:r>
-            <a:r>
-              <a:rPr lang="en-BE" sz="1600" b="1" dirty="0" smtClean="0">
-                <a:solidFill>
-                  <a:schemeClr val="bg1"/>
-                </a:solidFill>
-                <a:latin typeface="Arial" panose="020B0604020202020204" pitchFamily="34" charset="0"/>
-                <a:cs typeface="Arial" panose="020B0604020202020204" pitchFamily="34" charset="0"/>
-              </a:rPr>
-              <a:t>ies</a:t>
-            </a:r>
-            <a:r>
-              <a:rPr lang="en-GB" sz="1600" b="1" baseline="30000" dirty="0" smtClean="0">
+              <a:rPr lang="en-GB" sz="1600" b="1" dirty="0">
+                <a:solidFill>
+                  <a:schemeClr val="bg1"/>
+                </a:solidFill>
+                <a:latin typeface="Arial" panose="020B0604020202020204" pitchFamily="34" charset="0"/>
+                <a:cs typeface="Arial" panose="020B0604020202020204" pitchFamily="34" charset="0"/>
+              </a:rPr>
+              <a:t>What is the unique optimal investment strategy</a:t>
+            </a:r>
+            <a:r>
+              <a:rPr lang="en-BE" sz="1600" b="1" baseline="30000" dirty="0">
                 <a:solidFill>
                   <a:schemeClr val="bg1"/>
                 </a:solidFill>
@@ -5110,27 +5060,17 @@
               <a:t>1</a:t>
             </a:r>
             <a:r>
-              <a:rPr lang="en-GB" sz="1600" b="1" dirty="0" smtClean="0">
-                <a:solidFill>
-                  <a:schemeClr val="bg1"/>
-                </a:solidFill>
-                <a:latin typeface="Arial" panose="020B0604020202020204" pitchFamily="34" charset="0"/>
-                <a:cs typeface="Arial" panose="020B0604020202020204" pitchFamily="34" charset="0"/>
-              </a:rPr>
-              <a:t> for </a:t>
-            </a:r>
-            <a:r>
-              <a:rPr lang="en-BE" sz="1600" b="1" dirty="0" smtClean="0">
-                <a:solidFill>
-                  <a:schemeClr val="bg1"/>
-                </a:solidFill>
-                <a:latin typeface="Arial" panose="020B0604020202020204" pitchFamily="34" charset="0"/>
-                <a:cs typeface="Arial" panose="020B0604020202020204" pitchFamily="34" charset="0"/>
-              </a:rPr>
-              <a:t>different possible combinations of investment parameters</a:t>
-            </a:r>
-            <a:r>
-              <a:rPr lang="en-GB" sz="1600" b="1" dirty="0" smtClean="0">
+              <a:rPr lang="en-GB" sz="1600" b="1" dirty="0">
+                <a:solidFill>
+                  <a:schemeClr val="bg1"/>
+                </a:solidFill>
+                <a:latin typeface="Arial" panose="020B0604020202020204" pitchFamily="34" charset="0"/>
+                <a:cs typeface="Arial" panose="020B0604020202020204" pitchFamily="34" charset="0"/>
+              </a:rPr>
+              <a:t> that corresponds exactly to a given user-specified set of investment parameters</a:t>
+            </a:r>
+            <a:r>
+              <a:rPr lang="en-BE" sz="1600" b="1" dirty="0">
                 <a:solidFill>
                   <a:schemeClr val="bg1"/>
                 </a:solidFill>
@@ -5139,13 +5079,6 @@
               </a:rPr>
               <a:t>?</a:t>
             </a:r>
-            <a:endParaRPr lang="en-BE" sz="1600" b="1" dirty="0" smtClean="0">
-              <a:solidFill>
-                <a:schemeClr val="bg1"/>
-              </a:solidFill>
-              <a:latin typeface="Arial" panose="020B0604020202020204" pitchFamily="34" charset="0"/>
-              <a:cs typeface="Arial" panose="020B0604020202020204" pitchFamily="34" charset="0"/>
-            </a:endParaRPr>
           </a:p>
           <a:p>
             <a:r>

</xml_diff>

<commit_message>
report partly highlighted for our reading convenience
</commit_message>
<xml_diff>
--- a/2023_05_24 - BDA - Big Data Big Dreams v0.pptx
+++ b/2023_05_24 - BDA - Big Data Big Dreams v0.pptx
@@ -5,28 +5,32 @@
     <p:sldMasterId id="2147483648" r:id="rId1"/>
   </p:sldMasterIdLst>
   <p:sldIdLst>
-    <p:sldId id="257" r:id="rId2"/>
-    <p:sldId id="459" r:id="rId3"/>
-    <p:sldId id="258" r:id="rId4"/>
-    <p:sldId id="460" r:id="rId5"/>
-    <p:sldId id="267" r:id="rId6"/>
-    <p:sldId id="461" r:id="rId7"/>
-    <p:sldId id="266" r:id="rId8"/>
-    <p:sldId id="462" r:id="rId9"/>
-    <p:sldId id="268" r:id="rId10"/>
-    <p:sldId id="463" r:id="rId11"/>
-    <p:sldId id="269" r:id="rId12"/>
-    <p:sldId id="464" r:id="rId13"/>
-    <p:sldId id="270" r:id="rId14"/>
-    <p:sldId id="465" r:id="rId15"/>
-    <p:sldId id="271" r:id="rId16"/>
-    <p:sldId id="466" r:id="rId17"/>
-    <p:sldId id="467" r:id="rId18"/>
-    <p:sldId id="468" r:id="rId19"/>
-    <p:sldId id="412" r:id="rId20"/>
-    <p:sldId id="469" r:id="rId21"/>
-    <p:sldId id="265" r:id="rId22"/>
-    <p:sldId id="470" r:id="rId23"/>
+    <p:sldId id="459" r:id="rId2"/>
+    <p:sldId id="472" r:id="rId3"/>
+    <p:sldId id="475" r:id="rId4"/>
+    <p:sldId id="473" r:id="rId5"/>
+    <p:sldId id="476" r:id="rId6"/>
+    <p:sldId id="477" r:id="rId7"/>
+    <p:sldId id="267" r:id="rId8"/>
+    <p:sldId id="460" r:id="rId9"/>
+    <p:sldId id="258" r:id="rId10"/>
+    <p:sldId id="461" r:id="rId11"/>
+    <p:sldId id="266" r:id="rId12"/>
+    <p:sldId id="462" r:id="rId13"/>
+    <p:sldId id="268" r:id="rId14"/>
+    <p:sldId id="463" r:id="rId15"/>
+    <p:sldId id="269" r:id="rId16"/>
+    <p:sldId id="464" r:id="rId17"/>
+    <p:sldId id="270" r:id="rId18"/>
+    <p:sldId id="465" r:id="rId19"/>
+    <p:sldId id="271" r:id="rId20"/>
+    <p:sldId id="466" r:id="rId21"/>
+    <p:sldId id="467" r:id="rId22"/>
+    <p:sldId id="468" r:id="rId23"/>
+    <p:sldId id="412" r:id="rId24"/>
+    <p:sldId id="469" r:id="rId25"/>
+    <p:sldId id="265" r:id="rId26"/>
+    <p:sldId id="470" r:id="rId27"/>
   </p:sldIdLst>
   <p:sldSz cx="12192000" cy="6858000"/>
   <p:notesSz cx="6858000" cy="9144000"/>
@@ -3001,76 +3005,54 @@
       </p:grpSpPr>
       <p:sp>
         <p:nvSpPr>
-          <p:cNvPr id="4" name="Rectangle 3"/>
+          <p:cNvPr id="3" name="Rectangle 2"/>
           <p:cNvSpPr/>
           <p:nvPr/>
         </p:nvSpPr>
         <p:spPr>
           <a:xfrm>
-            <a:off x="891396" y="428179"/>
-            <a:ext cx="10409208" cy="2862322"/>
+            <a:off x="468701" y="2243193"/>
+            <a:ext cx="6096000" cy="923330"/>
           </a:xfrm>
           <a:prstGeom prst="rect">
             <a:avLst/>
           </a:prstGeom>
         </p:spPr>
         <p:txBody>
-          <a:bodyPr wrap="square">
+          <a:bodyPr>
             <a:spAutoFit/>
           </a:bodyPr>
           <a:lstStyle/>
           <a:p>
             <a:r>
-              <a:rPr lang="en-GB" b="1" u="sng" dirty="0">
-                <a:solidFill>
-                  <a:schemeClr val="accent4"/>
-                </a:solidFill>
-                <a:latin typeface="Arial" panose="020B0604020202020204" pitchFamily="34" charset="0"/>
-                <a:cs typeface="Arial" panose="020B0604020202020204" pitchFamily="34" charset="0"/>
-              </a:rPr>
-              <a:t>Big Data </a:t>
-            </a:r>
-            <a:r>
-              <a:rPr lang="en-GB" b="1" u="sng" dirty="0" smtClean="0">
-                <a:solidFill>
-                  <a:schemeClr val="accent4"/>
-                </a:solidFill>
-                <a:latin typeface="Arial" panose="020B0604020202020204" pitchFamily="34" charset="0"/>
-                <a:cs typeface="Arial" panose="020B0604020202020204" pitchFamily="34" charset="0"/>
-              </a:rPr>
-              <a:t>Analytics</a:t>
-            </a:r>
-            <a:r>
-              <a:rPr lang="en-BE" b="1" u="sng" dirty="0">
-                <a:solidFill>
-                  <a:schemeClr val="accent4"/>
-                </a:solidFill>
-                <a:latin typeface="Arial" panose="020B0604020202020204" pitchFamily="34" charset="0"/>
-                <a:cs typeface="Arial" panose="020B0604020202020204" pitchFamily="34" charset="0"/>
-              </a:rPr>
-              <a:t> </a:t>
-            </a:r>
-            <a:r>
-              <a:rPr lang="en-BE" b="1" u="sng" dirty="0" smtClean="0">
-                <a:solidFill>
-                  <a:schemeClr val="accent4"/>
-                </a:solidFill>
-                <a:latin typeface="Arial" panose="020B0604020202020204" pitchFamily="34" charset="0"/>
-                <a:cs typeface="Arial" panose="020B0604020202020204" pitchFamily="34" charset="0"/>
-              </a:rPr>
-              <a:t>– project presentation</a:t>
-            </a:r>
-          </a:p>
-          <a:p>
-            <a:r>
-              <a:rPr lang="en-BE" dirty="0" smtClean="0">
-                <a:solidFill>
-                  <a:schemeClr val="bg1"/>
-                </a:solidFill>
-                <a:latin typeface="Arial" panose="020B0604020202020204" pitchFamily="34" charset="0"/>
-                <a:cs typeface="Arial" panose="020B0604020202020204" pitchFamily="34" charset="0"/>
-              </a:rPr>
-              <a:t>24 </a:t>
+              <a:rPr lang="en-GB" dirty="0">
+                <a:solidFill>
+                  <a:schemeClr val="bg1"/>
+                </a:solidFill>
+                <a:latin typeface="Arial" panose="020B0604020202020204" pitchFamily="34" charset="0"/>
+                <a:cs typeface="Arial" panose="020B0604020202020204" pitchFamily="34" charset="0"/>
+              </a:rPr>
+              <a:t>What is the unique optimal investment strategy</a:t>
+            </a:r>
+            <a:r>
+              <a:rPr lang="en-BE" baseline="30000" dirty="0">
+                <a:solidFill>
+                  <a:schemeClr val="bg1"/>
+                </a:solidFill>
+                <a:latin typeface="Arial" panose="020B0604020202020204" pitchFamily="34" charset="0"/>
+                <a:cs typeface="Arial" panose="020B0604020202020204" pitchFamily="34" charset="0"/>
+              </a:rPr>
+              <a:t>1</a:t>
+            </a:r>
+            <a:r>
+              <a:rPr lang="en-GB" dirty="0">
+                <a:solidFill>
+                  <a:schemeClr val="bg1"/>
+                </a:solidFill>
+                <a:latin typeface="Arial" panose="020B0604020202020204" pitchFamily="34" charset="0"/>
+                <a:cs typeface="Arial" panose="020B0604020202020204" pitchFamily="34" charset="0"/>
+              </a:rPr>
+              <a:t> that corresponds exactly to a given user-specified set of investment parameters</a:t>
             </a:r>
             <a:r>
               <a:rPr lang="en-BE" dirty="0">
@@ -3080,10 +3062,8 @@
                 <a:latin typeface="Arial" panose="020B0604020202020204" pitchFamily="34" charset="0"/>
                 <a:cs typeface="Arial" panose="020B0604020202020204" pitchFamily="34" charset="0"/>
               </a:rPr>
-              <a:t>May 2023</a:t>
-            </a:r>
-          </a:p>
-          <a:p>
+              <a:t>?</a:t>
+            </a:r>
             <a:endParaRPr lang="en-BE" dirty="0">
               <a:solidFill>
                 <a:schemeClr val="bg1"/>
@@ -3092,6 +3072,28 @@
               <a:cs typeface="Arial" panose="020B0604020202020204" pitchFamily="34" charset="0"/>
             </a:endParaRPr>
           </a:p>
+        </p:txBody>
+      </p:sp>
+      <p:sp>
+        <p:nvSpPr>
+          <p:cNvPr id="5" name="Rectangle 4"/>
+          <p:cNvSpPr/>
+          <p:nvPr/>
+        </p:nvSpPr>
+        <p:spPr>
+          <a:xfrm>
+            <a:off x="4541728" y="3244334"/>
+            <a:ext cx="3108543" cy="369332"/>
+          </a:xfrm>
+          <a:prstGeom prst="rect">
+            <a:avLst/>
+          </a:prstGeom>
+        </p:spPr>
+        <p:txBody>
+          <a:bodyPr wrap="none">
+            <a:spAutoFit/>
+          </a:bodyPr>
+          <a:lstStyle/>
           <a:p>
             <a:r>
               <a:rPr lang="en-BE" dirty="0" smtClean="0">
@@ -3101,92 +3103,19 @@
                 <a:latin typeface="Arial" panose="020B0604020202020204" pitchFamily="34" charset="0"/>
                 <a:cs typeface="Arial" panose="020B0604020202020204" pitchFamily="34" charset="0"/>
               </a:rPr>
-              <a:t>Group: Big Data Big Dreams</a:t>
-            </a:r>
-          </a:p>
-          <a:p>
-            <a:r>
-              <a:rPr lang="en-GB" dirty="0" err="1" smtClean="0">
-                <a:solidFill>
-                  <a:schemeClr val="bg1"/>
-                </a:solidFill>
-                <a:latin typeface="Arial" panose="020B0604020202020204" pitchFamily="34" charset="0"/>
-                <a:cs typeface="Arial" panose="020B0604020202020204" pitchFamily="34" charset="0"/>
-              </a:rPr>
-              <a:t>Ariq</a:t>
-            </a:r>
-            <a:r>
-              <a:rPr lang="en-GB" dirty="0" smtClean="0">
-                <a:solidFill>
-                  <a:schemeClr val="bg1"/>
-                </a:solidFill>
-                <a:latin typeface="Arial" panose="020B0604020202020204" pitchFamily="34" charset="0"/>
-                <a:cs typeface="Arial" panose="020B0604020202020204" pitchFamily="34" charset="0"/>
-              </a:rPr>
-              <a:t> Bintang (22-605-901)</a:t>
-            </a:r>
-            <a:br>
-              <a:rPr lang="en-GB" dirty="0" smtClean="0">
-                <a:solidFill>
-                  <a:schemeClr val="bg1"/>
-                </a:solidFill>
-                <a:latin typeface="Arial" panose="020B0604020202020204" pitchFamily="34" charset="0"/>
-                <a:cs typeface="Arial" panose="020B0604020202020204" pitchFamily="34" charset="0"/>
-              </a:rPr>
-            </a:br>
-            <a:r>
-              <a:rPr lang="en-GB" dirty="0" smtClean="0">
-                <a:solidFill>
-                  <a:schemeClr val="bg1"/>
-                </a:solidFill>
-                <a:latin typeface="Arial" panose="020B0604020202020204" pitchFamily="34" charset="0"/>
-                <a:cs typeface="Arial" panose="020B0604020202020204" pitchFamily="34" charset="0"/>
-              </a:rPr>
-              <a:t>Luca Gewehr (22-620-967)</a:t>
-            </a:r>
-          </a:p>
-          <a:p>
-            <a:r>
-              <a:rPr lang="en-GB" dirty="0" smtClean="0">
-                <a:solidFill>
-                  <a:schemeClr val="bg1"/>
-                </a:solidFill>
-                <a:latin typeface="Arial" panose="020B0604020202020204" pitchFamily="34" charset="0"/>
-                <a:cs typeface="Arial" panose="020B0604020202020204" pitchFamily="34" charset="0"/>
-              </a:rPr>
-              <a:t>Marco </a:t>
-            </a:r>
-            <a:r>
-              <a:rPr lang="en-GB" dirty="0">
-                <a:solidFill>
-                  <a:schemeClr val="bg1"/>
-                </a:solidFill>
-                <a:latin typeface="Arial" panose="020B0604020202020204" pitchFamily="34" charset="0"/>
-                <a:cs typeface="Arial" panose="020B0604020202020204" pitchFamily="34" charset="0"/>
-              </a:rPr>
-              <a:t>Hafid (22-620-546</a:t>
-            </a:r>
-            <a:r>
-              <a:rPr lang="en-GB" dirty="0" smtClean="0">
-                <a:solidFill>
-                  <a:schemeClr val="bg1"/>
-                </a:solidFill>
-                <a:latin typeface="Arial" panose="020B0604020202020204" pitchFamily="34" charset="0"/>
-                <a:cs typeface="Arial" panose="020B0604020202020204" pitchFamily="34" charset="0"/>
-              </a:rPr>
-              <a:t>)</a:t>
-            </a:r>
-            <a:r>
-              <a:rPr lang="en-GB" dirty="0">
-                <a:solidFill>
-                  <a:schemeClr val="bg1"/>
-                </a:solidFill>
-                <a:latin typeface="Arial" panose="020B0604020202020204" pitchFamily="34" charset="0"/>
-                <a:cs typeface="Arial" panose="020B0604020202020204" pitchFamily="34" charset="0"/>
-              </a:rPr>
-              <a:t> </a:t>
-            </a:r>
-            <a:endParaRPr lang="en-BE" dirty="0" smtClean="0">
+              <a:t>TEAM: </a:t>
+            </a:r>
+            <a:r>
+              <a:rPr lang="en-BE" dirty="0">
+                <a:solidFill>
+                  <a:schemeClr val="bg1"/>
+                </a:solidFill>
+                <a:latin typeface="Arial" panose="020B0604020202020204" pitchFamily="34" charset="0"/>
+                <a:cs typeface="Arial" panose="020B0604020202020204" pitchFamily="34" charset="0"/>
+              </a:rPr>
+              <a:t>Big Data Big Dreams</a:t>
+            </a:r>
+            <a:endParaRPr lang="en-BE" dirty="0">
               <a:solidFill>
                 <a:schemeClr val="bg1"/>
               </a:solidFill>
@@ -3194,85 +3123,38 @@
               <a:cs typeface="Arial" panose="020B0604020202020204" pitchFamily="34" charset="0"/>
             </a:endParaRPr>
           </a:p>
-          <a:p>
-            <a:endParaRPr lang="en-BE" dirty="0" smtClean="0">
-              <a:solidFill>
-                <a:schemeClr val="bg1"/>
-              </a:solidFill>
-              <a:latin typeface="Arial" panose="020B0604020202020204" pitchFamily="34" charset="0"/>
-              <a:cs typeface="Arial" panose="020B0604020202020204" pitchFamily="34" charset="0"/>
-            </a:endParaRPr>
-          </a:p>
-          <a:p>
-            <a:r>
-              <a:rPr lang="en-GB" dirty="0">
-                <a:solidFill>
-                  <a:schemeClr val="bg1"/>
-                </a:solidFill>
-                <a:latin typeface="Arial" panose="020B0604020202020204" pitchFamily="34" charset="0"/>
-                <a:cs typeface="Arial" panose="020B0604020202020204" pitchFamily="34" charset="0"/>
-              </a:rPr>
-              <a:t>What is the unique optimal investment </a:t>
-            </a:r>
-            <a:r>
-              <a:rPr lang="en-GB" dirty="0" smtClean="0">
-                <a:solidFill>
-                  <a:schemeClr val="bg1"/>
-                </a:solidFill>
-                <a:latin typeface="Arial" panose="020B0604020202020204" pitchFamily="34" charset="0"/>
-                <a:cs typeface="Arial" panose="020B0604020202020204" pitchFamily="34" charset="0"/>
-              </a:rPr>
-              <a:t>strategy</a:t>
-            </a:r>
-            <a:r>
-              <a:rPr lang="en-BE" baseline="30000" dirty="0" smtClean="0">
-                <a:solidFill>
-                  <a:schemeClr val="bg1"/>
-                </a:solidFill>
-                <a:latin typeface="Arial" panose="020B0604020202020204" pitchFamily="34" charset="0"/>
-                <a:cs typeface="Arial" panose="020B0604020202020204" pitchFamily="34" charset="0"/>
-              </a:rPr>
-              <a:t>1</a:t>
-            </a:r>
-            <a:r>
-              <a:rPr lang="en-GB" dirty="0" smtClean="0">
-                <a:solidFill>
-                  <a:schemeClr val="bg1"/>
-                </a:solidFill>
-                <a:latin typeface="Arial" panose="020B0604020202020204" pitchFamily="34" charset="0"/>
-                <a:cs typeface="Arial" panose="020B0604020202020204" pitchFamily="34" charset="0"/>
-              </a:rPr>
-              <a:t> </a:t>
-            </a:r>
-            <a:r>
-              <a:rPr lang="en-GB" dirty="0">
-                <a:solidFill>
-                  <a:schemeClr val="bg1"/>
-                </a:solidFill>
-                <a:latin typeface="Arial" panose="020B0604020202020204" pitchFamily="34" charset="0"/>
-                <a:cs typeface="Arial" panose="020B0604020202020204" pitchFamily="34" charset="0"/>
-              </a:rPr>
-              <a:t>that corresponds exactly to a given user-specified set of investment </a:t>
-            </a:r>
-            <a:r>
-              <a:rPr lang="en-GB" dirty="0" smtClean="0">
-                <a:solidFill>
-                  <a:schemeClr val="bg1"/>
-                </a:solidFill>
-                <a:latin typeface="Arial" panose="020B0604020202020204" pitchFamily="34" charset="0"/>
-                <a:cs typeface="Arial" panose="020B0604020202020204" pitchFamily="34" charset="0"/>
-              </a:rPr>
-              <a:t>parameters</a:t>
-            </a:r>
-            <a:r>
-              <a:rPr lang="en-BE" dirty="0" smtClean="0">
-                <a:solidFill>
-                  <a:schemeClr val="bg1"/>
-                </a:solidFill>
-                <a:latin typeface="Arial" panose="020B0604020202020204" pitchFamily="34" charset="0"/>
-                <a:cs typeface="Arial" panose="020B0604020202020204" pitchFamily="34" charset="0"/>
-              </a:rPr>
-              <a:t>?</a:t>
+        </p:txBody>
+      </p:sp>
+      <p:sp>
+        <p:nvSpPr>
+          <p:cNvPr id="6" name="Rectangle 5"/>
+          <p:cNvSpPr/>
+          <p:nvPr/>
+        </p:nvSpPr>
+        <p:spPr>
+          <a:xfrm>
+            <a:off x="6682539" y="5215470"/>
+            <a:ext cx="1518364" cy="369332"/>
+          </a:xfrm>
+          <a:prstGeom prst="rect">
+            <a:avLst/>
+          </a:prstGeom>
+        </p:spPr>
+        <p:txBody>
+          <a:bodyPr wrap="none">
+            <a:spAutoFit/>
+          </a:bodyPr>
+          <a:lstStyle/>
+          <a:p>
+            <a:r>
+              <a:rPr lang="en-BE" dirty="0">
+                <a:solidFill>
+                  <a:schemeClr val="bg1"/>
+                </a:solidFill>
+                <a:latin typeface="Arial" panose="020B0604020202020204" pitchFamily="34" charset="0"/>
+                <a:cs typeface="Arial" panose="020B0604020202020204" pitchFamily="34" charset="0"/>
+              </a:rPr>
+              <a:t>24 May 2023</a:t>
             </a:r>
             <a:endParaRPr lang="en-BE" dirty="0">
               <a:solidFill>
@@ -3287,7 +3169,7 @@
     </p:spTree>
     <p:extLst>
       <p:ext uri="{BB962C8B-B14F-4D97-AF65-F5344CB8AC3E}">
-        <p14:creationId xmlns:p14="http://schemas.microsoft.com/office/powerpoint/2010/main" val="616729424"/>
+        <p14:creationId xmlns:p14="http://schemas.microsoft.com/office/powerpoint/2010/main" val="3211413721"/>
       </p:ext>
     </p:extLst>
   </p:cSld>
@@ -3317,7 +3199,7 @@
     </p:spTree>
     <p:extLst>
       <p:ext uri="{BB962C8B-B14F-4D97-AF65-F5344CB8AC3E}">
-        <p14:creationId xmlns:p14="http://schemas.microsoft.com/office/powerpoint/2010/main" val="3780681869"/>
+        <p14:creationId xmlns:p14="http://schemas.microsoft.com/office/powerpoint/2010/main" val="3245249009"/>
       </p:ext>
     </p:extLst>
   </p:cSld>
@@ -3353,7 +3235,7 @@
         <p:spPr>
           <a:xfrm>
             <a:off x="891396" y="428179"/>
-            <a:ext cx="10409208" cy="3970318"/>
+            <a:ext cx="10409208" cy="2862322"/>
           </a:xfrm>
           <a:prstGeom prst="rect">
             <a:avLst/>
@@ -3373,7 +3255,7 @@
                 <a:latin typeface="Arial" panose="020B0604020202020204" pitchFamily="34" charset="0"/>
                 <a:cs typeface="Arial" panose="020B0604020202020204" pitchFamily="34" charset="0"/>
               </a:rPr>
-              <a:t>Data Analysis and Data Visualization: </a:t>
+              <a:t>Data Collection and Data Storage: </a:t>
             </a:r>
             <a:endParaRPr lang="en-BE" b="1" u="sng" dirty="0">
               <a:solidFill>
@@ -3392,7 +3274,7 @@
                 <a:latin typeface="Arial" panose="020B0604020202020204" pitchFamily="34" charset="0"/>
                 <a:cs typeface="Arial" panose="020B0604020202020204" pitchFamily="34" charset="0"/>
               </a:rPr>
-              <a:t>This </a:t>
+              <a:t>Discuss </a:t>
             </a:r>
             <a:r>
               <a:rPr lang="en-GB" dirty="0">
@@ -3402,27 +3284,7 @@
                 <a:latin typeface="Arial" panose="020B0604020202020204" pitchFamily="34" charset="0"/>
                 <a:cs typeface="Arial" panose="020B0604020202020204" pitchFamily="34" charset="0"/>
               </a:rPr>
-              <a:t>part should detail how you </a:t>
-            </a:r>
-            <a:r>
-              <a:rPr lang="en-GB" dirty="0" err="1">
-                <a:solidFill>
-                  <a:schemeClr val="bg1"/>
-                </a:solidFill>
-                <a:latin typeface="Arial" panose="020B0604020202020204" pitchFamily="34" charset="0"/>
-                <a:cs typeface="Arial" panose="020B0604020202020204" pitchFamily="34" charset="0"/>
-              </a:rPr>
-              <a:t>analyzed</a:t>
-            </a:r>
-            <a:r>
-              <a:rPr lang="en-GB" dirty="0">
-                <a:solidFill>
-                  <a:schemeClr val="bg1"/>
-                </a:solidFill>
-                <a:latin typeface="Arial" panose="020B0604020202020204" pitchFamily="34" charset="0"/>
-                <a:cs typeface="Arial" panose="020B0604020202020204" pitchFamily="34" charset="0"/>
-              </a:rPr>
-              <a:t> the data, </a:t>
+              <a:t>your approach to data collection, </a:t>
             </a:r>
             <a:endParaRPr lang="en-BE" dirty="0" smtClean="0">
               <a:solidFill>
@@ -3451,7 +3313,7 @@
                 <a:latin typeface="Arial" panose="020B0604020202020204" pitchFamily="34" charset="0"/>
                 <a:cs typeface="Arial" panose="020B0604020202020204" pitchFamily="34" charset="0"/>
               </a:rPr>
-              <a:t>chosen methods, </a:t>
+              <a:t>challenges faced, </a:t>
             </a:r>
             <a:endParaRPr lang="en-BE" dirty="0" smtClean="0">
               <a:solidFill>
@@ -3480,7 +3342,7 @@
                 <a:latin typeface="Arial" panose="020B0604020202020204" pitchFamily="34" charset="0"/>
                 <a:cs typeface="Arial" panose="020B0604020202020204" pitchFamily="34" charset="0"/>
               </a:rPr>
-              <a:t>their reasons. </a:t>
+              <a:t>how you overcame them. </a:t>
             </a:r>
             <a:endParaRPr lang="en-BE" dirty="0" smtClean="0">
               <a:solidFill>
@@ -3499,7 +3361,7 @@
                 <a:latin typeface="Arial" panose="020B0604020202020204" pitchFamily="34" charset="0"/>
                 <a:cs typeface="Arial" panose="020B0604020202020204" pitchFamily="34" charset="0"/>
               </a:rPr>
-              <a:t>Discuss </a:t>
+              <a:t>You </a:t>
             </a:r>
             <a:r>
               <a:rPr lang="en-GB" dirty="0">
@@ -3509,7 +3371,17 @@
                 <a:latin typeface="Arial" panose="020B0604020202020204" pitchFamily="34" charset="0"/>
                 <a:cs typeface="Arial" panose="020B0604020202020204" pitchFamily="34" charset="0"/>
               </a:rPr>
-              <a:t>the challenges faced due to the large amount of data </a:t>
+              <a:t>should also detail how and why you stored the raw data in a certain way</a:t>
+            </a:r>
+            <a:r>
+              <a:rPr lang="en-GB" dirty="0" smtClean="0">
+                <a:solidFill>
+                  <a:schemeClr val="bg1"/>
+                </a:solidFill>
+                <a:latin typeface="Arial" panose="020B0604020202020204" pitchFamily="34" charset="0"/>
+                <a:cs typeface="Arial" panose="020B0604020202020204" pitchFamily="34" charset="0"/>
+              </a:rPr>
+              <a:t>.</a:t>
             </a:r>
             <a:endParaRPr lang="en-BE" dirty="0" smtClean="0">
               <a:solidFill>
@@ -3520,27 +3392,7 @@
             </a:endParaRPr>
           </a:p>
           <a:p>
-            <a:r>
-              <a:rPr lang="en-GB" dirty="0" smtClean="0">
-                <a:solidFill>
-                  <a:schemeClr val="bg1"/>
-                </a:solidFill>
-                <a:latin typeface="Arial" panose="020B0604020202020204" pitchFamily="34" charset="0"/>
-                <a:cs typeface="Arial" panose="020B0604020202020204" pitchFamily="34" charset="0"/>
-              </a:rPr>
-              <a:t>and </a:t>
-            </a:r>
-            <a:r>
-              <a:rPr lang="en-GB" dirty="0">
-                <a:solidFill>
-                  <a:schemeClr val="bg1"/>
-                </a:solidFill>
-                <a:latin typeface="Arial" panose="020B0604020202020204" pitchFamily="34" charset="0"/>
-                <a:cs typeface="Arial" panose="020B0604020202020204" pitchFamily="34" charset="0"/>
-              </a:rPr>
-              <a:t>the tools/techniques used to overcome them. </a:t>
-            </a:r>
-            <a:endParaRPr lang="en-BE" dirty="0" smtClean="0">
+            <a:endParaRPr lang="en-BE" dirty="0">
               <a:solidFill>
                 <a:schemeClr val="bg1"/>
               </a:solidFill>
@@ -3549,7 +3401,27 @@
             </a:endParaRPr>
           </a:p>
           <a:p>
-            <a:endParaRPr lang="en-BE" dirty="0">
+            <a:r>
+              <a:rPr lang="en-GB" dirty="0">
+                <a:solidFill>
+                  <a:schemeClr val="bg1"/>
+                </a:solidFill>
+                <a:latin typeface="Arial" panose="020B0604020202020204" pitchFamily="34" charset="0"/>
+                <a:cs typeface="Arial" panose="020B0604020202020204" pitchFamily="34" charset="0"/>
+              </a:rPr>
+              <a:t>&lt;!-- Describe how you approach the data collection procedure. In your research setting, what were the challenges regarding collecting the raw data. How did you solve these challenges? How do you store the raw data and why?  </a:t>
+            </a:r>
+            <a:r>
+              <a:rPr lang="en-GB" dirty="0" smtClean="0">
+                <a:solidFill>
+                  <a:schemeClr val="bg1"/>
+                </a:solidFill>
+                <a:latin typeface="Arial" panose="020B0604020202020204" pitchFamily="34" charset="0"/>
+                <a:cs typeface="Arial" panose="020B0604020202020204" pitchFamily="34" charset="0"/>
+              </a:rPr>
+              <a:t>--&gt;</a:t>
+            </a:r>
+            <a:endParaRPr lang="en-BE" dirty="0" smtClean="0">
               <a:solidFill>
                 <a:schemeClr val="bg1"/>
               </a:solidFill>
@@ -3559,55 +3431,6 @@
           </a:p>
           <a:p>
             <a:r>
-              <a:rPr lang="en-GB" dirty="0">
-                <a:solidFill>
-                  <a:schemeClr val="bg1"/>
-                </a:solidFill>
-                <a:latin typeface="Arial" panose="020B0604020202020204" pitchFamily="34" charset="0"/>
-                <a:cs typeface="Arial" panose="020B0604020202020204" pitchFamily="34" charset="0"/>
-              </a:rPr>
-              <a:t>&lt;!-- Explain how you </a:t>
-            </a:r>
-            <a:r>
-              <a:rPr lang="en-GB" dirty="0" err="1">
-                <a:solidFill>
-                  <a:schemeClr val="bg1"/>
-                </a:solidFill>
-                <a:latin typeface="Arial" panose="020B0604020202020204" pitchFamily="34" charset="0"/>
-                <a:cs typeface="Arial" panose="020B0604020202020204" pitchFamily="34" charset="0"/>
-              </a:rPr>
-              <a:t>analyzed</a:t>
-            </a:r>
-            <a:r>
-              <a:rPr lang="en-GB" dirty="0">
-                <a:solidFill>
-                  <a:schemeClr val="bg1"/>
-                </a:solidFill>
-                <a:latin typeface="Arial" panose="020B0604020202020204" pitchFamily="34" charset="0"/>
-                <a:cs typeface="Arial" panose="020B0604020202020204" pitchFamily="34" charset="0"/>
-              </a:rPr>
-              <a:t> the data (which method(s) were used and why). Then explain what the challenges were in implementing these analyses, given the large amount of data. Finally, explain which tools/techniques you have used in order to tackle these challenges. Make sure to briefly point out why you have chosen these tools/techniques and how they helped.   </a:t>
-            </a:r>
-            <a:r>
-              <a:rPr lang="en-GB" dirty="0" smtClean="0">
-                <a:solidFill>
-                  <a:schemeClr val="bg1"/>
-                </a:solidFill>
-                <a:latin typeface="Arial" panose="020B0604020202020204" pitchFamily="34" charset="0"/>
-                <a:cs typeface="Arial" panose="020B0604020202020204" pitchFamily="34" charset="0"/>
-              </a:rPr>
-              <a:t>--&gt;</a:t>
-            </a:r>
-            <a:endParaRPr lang="en-BE" dirty="0" smtClean="0">
-              <a:solidFill>
-                <a:schemeClr val="bg1"/>
-              </a:solidFill>
-              <a:latin typeface="Arial" panose="020B0604020202020204" pitchFamily="34" charset="0"/>
-              <a:cs typeface="Arial" panose="020B0604020202020204" pitchFamily="34" charset="0"/>
-            </a:endParaRPr>
-          </a:p>
-          <a:p>
-            <a:r>
               <a:rPr lang="en-BE" dirty="0" smtClean="0">
                 <a:solidFill>
                   <a:schemeClr val="bg1"/>
@@ -3617,31 +3440,13 @@
               </a:rPr>
               <a:t>Xxx</a:t>
             </a:r>
-          </a:p>
-          <a:p>
-            <a:endParaRPr lang="en-BE" dirty="0">
-              <a:solidFill>
-                <a:schemeClr val="bg1"/>
-              </a:solidFill>
-              <a:latin typeface="Arial" panose="020B0604020202020204" pitchFamily="34" charset="0"/>
-              <a:cs typeface="Arial" panose="020B0604020202020204" pitchFamily="34" charset="0"/>
-            </a:endParaRPr>
-          </a:p>
-          <a:p>
-            <a:endParaRPr lang="en-BE" dirty="0" smtClean="0">
-              <a:solidFill>
-                <a:schemeClr val="bg1"/>
-              </a:solidFill>
-              <a:latin typeface="Arial" panose="020B0604020202020204" pitchFamily="34" charset="0"/>
-              <a:cs typeface="Arial" panose="020B0604020202020204" pitchFamily="34" charset="0"/>
-            </a:endParaRPr>
           </a:p>
         </p:txBody>
       </p:sp>
     </p:spTree>
     <p:extLst>
       <p:ext uri="{BB962C8B-B14F-4D97-AF65-F5344CB8AC3E}">
-        <p14:creationId xmlns:p14="http://schemas.microsoft.com/office/powerpoint/2010/main" val="3097130636"/>
+        <p14:creationId xmlns:p14="http://schemas.microsoft.com/office/powerpoint/2010/main" val="2074830425"/>
       </p:ext>
     </p:extLst>
   </p:cSld>
@@ -3671,7 +3476,7 @@
     </p:spTree>
     <p:extLst>
       <p:ext uri="{BB962C8B-B14F-4D97-AF65-F5344CB8AC3E}">
-        <p14:creationId xmlns:p14="http://schemas.microsoft.com/office/powerpoint/2010/main" val="2038890368"/>
+        <p14:creationId xmlns:p14="http://schemas.microsoft.com/office/powerpoint/2010/main" val="2818645891"/>
       </p:ext>
     </p:extLst>
   </p:cSld>
@@ -3707,7 +3512,7 @@
         <p:spPr>
           <a:xfrm>
             <a:off x="891396" y="428179"/>
-            <a:ext cx="10409208" cy="2862322"/>
+            <a:ext cx="10409208" cy="3139321"/>
           </a:xfrm>
           <a:prstGeom prst="rect">
             <a:avLst/>
@@ -3727,7 +3532,7 @@
                 <a:latin typeface="Arial" panose="020B0604020202020204" pitchFamily="34" charset="0"/>
                 <a:cs typeface="Arial" panose="020B0604020202020204" pitchFamily="34" charset="0"/>
               </a:rPr>
-              <a:t>Results: </a:t>
+              <a:t>Data Cleaning and Preparation: </a:t>
             </a:r>
             <a:endParaRPr lang="en-BE" b="1" u="sng" dirty="0">
               <a:solidFill>
@@ -3746,7 +3551,7 @@
                 <a:latin typeface="Arial" panose="020B0604020202020204" pitchFamily="34" charset="0"/>
                 <a:cs typeface="Arial" panose="020B0604020202020204" pitchFamily="34" charset="0"/>
               </a:rPr>
-              <a:t>Summarize </a:t>
+              <a:t>Explain </a:t>
             </a:r>
             <a:r>
               <a:rPr lang="en-GB" dirty="0">
@@ -3756,7 +3561,7 @@
                 <a:latin typeface="Arial" panose="020B0604020202020204" pitchFamily="34" charset="0"/>
                 <a:cs typeface="Arial" panose="020B0604020202020204" pitchFamily="34" charset="0"/>
               </a:rPr>
-              <a:t>the main findings of the research. </a:t>
+              <a:t>the process of cleaning and preparing the data, </a:t>
             </a:r>
             <a:endParaRPr lang="en-BE" dirty="0" smtClean="0">
               <a:solidFill>
@@ -3775,7 +3580,7 @@
                 <a:latin typeface="Arial" panose="020B0604020202020204" pitchFamily="34" charset="0"/>
                 <a:cs typeface="Arial" panose="020B0604020202020204" pitchFamily="34" charset="0"/>
               </a:rPr>
-              <a:t>Include </a:t>
+              <a:t>highlighting </a:t>
             </a:r>
             <a:r>
               <a:rPr lang="en-GB" dirty="0">
@@ -3785,7 +3590,7 @@
                 <a:latin typeface="Arial" panose="020B0604020202020204" pitchFamily="34" charset="0"/>
                 <a:cs typeface="Arial" panose="020B0604020202020204" pitchFamily="34" charset="0"/>
               </a:rPr>
-              <a:t>up to five exhibits (tables or figures) to support these findings, </a:t>
+              <a:t>the challenges, bottlenecks, </a:t>
             </a:r>
             <a:endParaRPr lang="en-BE" dirty="0" smtClean="0">
               <a:solidFill>
@@ -3804,7 +3609,7 @@
                 <a:latin typeface="Arial" panose="020B0604020202020204" pitchFamily="34" charset="0"/>
                 <a:cs typeface="Arial" panose="020B0604020202020204" pitchFamily="34" charset="0"/>
               </a:rPr>
-              <a:t>with </a:t>
+              <a:t>and </a:t>
             </a:r>
             <a:r>
               <a:rPr lang="en-GB" dirty="0">
@@ -3814,17 +3619,7 @@
                 <a:latin typeface="Arial" panose="020B0604020202020204" pitchFamily="34" charset="0"/>
                 <a:cs typeface="Arial" panose="020B0604020202020204" pitchFamily="34" charset="0"/>
               </a:rPr>
-              <a:t>accompanying notes explaining what each exhibit represents</a:t>
-            </a:r>
-            <a:r>
-              <a:rPr lang="en-GB" dirty="0" smtClean="0">
-                <a:solidFill>
-                  <a:schemeClr val="bg1"/>
-                </a:solidFill>
-                <a:latin typeface="Arial" panose="020B0604020202020204" pitchFamily="34" charset="0"/>
-                <a:cs typeface="Arial" panose="020B0604020202020204" pitchFamily="34" charset="0"/>
-              </a:rPr>
-              <a:t>.</a:t>
+              <a:t>your approach to improving the data cleaning process. </a:t>
             </a:r>
             <a:endParaRPr lang="en-BE" dirty="0" smtClean="0">
               <a:solidFill>
@@ -3835,7 +3630,37 @@
             </a:endParaRPr>
           </a:p>
           <a:p>
-            <a:endParaRPr lang="en-BE" dirty="0">
+            <a:r>
+              <a:rPr lang="en-GB" dirty="0" smtClean="0">
+                <a:solidFill>
+                  <a:schemeClr val="bg1"/>
+                </a:solidFill>
+                <a:latin typeface="Arial" panose="020B0604020202020204" pitchFamily="34" charset="0"/>
+                <a:cs typeface="Arial" panose="020B0604020202020204" pitchFamily="34" charset="0"/>
+              </a:rPr>
+              <a:t>Also</a:t>
+            </a:r>
+            <a:r>
+              <a:rPr lang="en-GB" dirty="0">
+                <a:solidFill>
+                  <a:schemeClr val="bg1"/>
+                </a:solidFill>
+                <a:latin typeface="Arial" panose="020B0604020202020204" pitchFamily="34" charset="0"/>
+                <a:cs typeface="Arial" panose="020B0604020202020204" pitchFamily="34" charset="0"/>
+              </a:rPr>
+              <a:t>, discuss the tools and techniques used for this task and their functioning</a:t>
+            </a:r>
+            <a:r>
+              <a:rPr lang="en-GB" dirty="0" smtClean="0">
+                <a:solidFill>
+                  <a:schemeClr val="bg1"/>
+                </a:solidFill>
+                <a:latin typeface="Arial" panose="020B0604020202020204" pitchFamily="34" charset="0"/>
+                <a:cs typeface="Arial" panose="020B0604020202020204" pitchFamily="34" charset="0"/>
+              </a:rPr>
+              <a:t>.</a:t>
+            </a:r>
+            <a:endParaRPr lang="en-BE" dirty="0" smtClean="0">
               <a:solidFill>
                 <a:schemeClr val="bg1"/>
               </a:solidFill>
@@ -3844,47 +3669,7 @@
             </a:endParaRPr>
           </a:p>
           <a:p>
-            <a:r>
-              <a:rPr lang="en-GB" dirty="0">
-                <a:solidFill>
-                  <a:schemeClr val="bg1"/>
-                </a:solidFill>
-                <a:latin typeface="Arial" panose="020B0604020202020204" pitchFamily="34" charset="0"/>
-                <a:cs typeface="Arial" panose="020B0604020202020204" pitchFamily="34" charset="0"/>
-              </a:rPr>
-              <a:t>&lt;!-- First, briefly summarize your main findings. Then, show up to 5 exhibits (tables and figures). Right below each table/figure, add table/figure-notes that describe what the reader sees in the corresponding table/figure. (Hint: have a look at empirical papers in the top Econ outlets like AER, QJE, </a:t>
-            </a:r>
-            <a:r>
-              <a:rPr lang="en-GB" dirty="0" err="1">
-                <a:solidFill>
-                  <a:schemeClr val="bg1"/>
-                </a:solidFill>
-                <a:latin typeface="Arial" panose="020B0604020202020204" pitchFamily="34" charset="0"/>
-                <a:cs typeface="Arial" panose="020B0604020202020204" pitchFamily="34" charset="0"/>
-              </a:rPr>
-              <a:t>Econometrica</a:t>
-            </a:r>
-            <a:r>
-              <a:rPr lang="en-GB" dirty="0">
-                <a:solidFill>
-                  <a:schemeClr val="bg1"/>
-                </a:solidFill>
-                <a:latin typeface="Arial" panose="020B0604020202020204" pitchFamily="34" charset="0"/>
-                <a:cs typeface="Arial" panose="020B0604020202020204" pitchFamily="34" charset="0"/>
-              </a:rPr>
-              <a:t>, etc. to get a feeling for how Economists write such notes.) </a:t>
-            </a:r>
-            <a:r>
-              <a:rPr lang="en-GB" dirty="0" smtClean="0">
-                <a:solidFill>
-                  <a:schemeClr val="bg1"/>
-                </a:solidFill>
-                <a:latin typeface="Arial" panose="020B0604020202020204" pitchFamily="34" charset="0"/>
-                <a:cs typeface="Arial" panose="020B0604020202020204" pitchFamily="34" charset="0"/>
-              </a:rPr>
-              <a:t>--&gt;</a:t>
-            </a:r>
-            <a:endParaRPr lang="en-BE" dirty="0" smtClean="0">
+            <a:endParaRPr lang="en-BE" dirty="0">
               <a:solidFill>
                 <a:schemeClr val="bg1"/>
               </a:solidFill>
@@ -3893,6 +3678,45 @@
             </a:endParaRPr>
           </a:p>
           <a:p>
+            <a:r>
+              <a:rPr lang="en-GB" dirty="0">
+                <a:solidFill>
+                  <a:schemeClr val="bg1"/>
+                </a:solidFill>
+                <a:latin typeface="Arial" panose="020B0604020202020204" pitchFamily="34" charset="0"/>
+                <a:cs typeface="Arial" panose="020B0604020202020204" pitchFamily="34" charset="0"/>
+              </a:rPr>
+              <a:t>&lt;!-- Describe the challenges related to cleaning/filtering your raw data in order to prepare an analytic data set. What were the bottle necks (which tasks and which hardware resources)? How did you speed up/improve the data cleaning procedure for large amounts of data? Which tools/techniques did you use and how do these tools/techniques work?   </a:t>
+            </a:r>
+            <a:r>
+              <a:rPr lang="en-GB" dirty="0" smtClean="0">
+                <a:solidFill>
+                  <a:schemeClr val="bg1"/>
+                </a:solidFill>
+                <a:latin typeface="Arial" panose="020B0604020202020204" pitchFamily="34" charset="0"/>
+                <a:cs typeface="Arial" panose="020B0604020202020204" pitchFamily="34" charset="0"/>
+              </a:rPr>
+              <a:t>--&gt;</a:t>
+            </a:r>
+            <a:r>
+              <a:rPr lang="en-BE" dirty="0" smtClean="0">
+                <a:solidFill>
+                  <a:schemeClr val="bg1"/>
+                </a:solidFill>
+                <a:latin typeface="Arial" panose="020B0604020202020204" pitchFamily="34" charset="0"/>
+                <a:cs typeface="Arial" panose="020B0604020202020204" pitchFamily="34" charset="0"/>
+              </a:rPr>
+              <a:t/>
+            </a:r>
+            <a:br>
+              <a:rPr lang="en-BE" dirty="0" smtClean="0">
+                <a:solidFill>
+                  <a:schemeClr val="bg1"/>
+                </a:solidFill>
+                <a:latin typeface="Arial" panose="020B0604020202020204" pitchFamily="34" charset="0"/>
+                <a:cs typeface="Arial" panose="020B0604020202020204" pitchFamily="34" charset="0"/>
+              </a:rPr>
+            </a:br>
             <a:r>
               <a:rPr lang="en-BE" dirty="0" smtClean="0">
                 <a:solidFill>
@@ -3909,7 +3733,7 @@
     </p:spTree>
     <p:extLst>
       <p:ext uri="{BB962C8B-B14F-4D97-AF65-F5344CB8AC3E}">
-        <p14:creationId xmlns:p14="http://schemas.microsoft.com/office/powerpoint/2010/main" val="1774966646"/>
+        <p14:creationId xmlns:p14="http://schemas.microsoft.com/office/powerpoint/2010/main" val="1926662717"/>
       </p:ext>
     </p:extLst>
   </p:cSld>
@@ -3939,7 +3763,7 @@
     </p:spTree>
     <p:extLst>
       <p:ext uri="{BB962C8B-B14F-4D97-AF65-F5344CB8AC3E}">
-        <p14:creationId xmlns:p14="http://schemas.microsoft.com/office/powerpoint/2010/main" val="453994540"/>
+        <p14:creationId xmlns:p14="http://schemas.microsoft.com/office/powerpoint/2010/main" val="3780681869"/>
       </p:ext>
     </p:extLst>
   </p:cSld>
@@ -3975,7 +3799,7 @@
         <p:spPr>
           <a:xfrm>
             <a:off x="891396" y="428179"/>
-            <a:ext cx="10409208" cy="3693319"/>
+            <a:ext cx="10409208" cy="3970318"/>
           </a:xfrm>
           <a:prstGeom prst="rect">
             <a:avLst/>
@@ -3995,7 +3819,7 @@
                 <a:latin typeface="Arial" panose="020B0604020202020204" pitchFamily="34" charset="0"/>
                 <a:cs typeface="Arial" panose="020B0604020202020204" pitchFamily="34" charset="0"/>
               </a:rPr>
-              <a:t>Scaling and Cloud Deployment: </a:t>
+              <a:t>Data Analysis and Data Visualization: </a:t>
             </a:r>
             <a:endParaRPr lang="en-BE" b="1" u="sng" dirty="0">
               <a:solidFill>
@@ -4014,7 +3838,7 @@
                 <a:latin typeface="Arial" panose="020B0604020202020204" pitchFamily="34" charset="0"/>
                 <a:cs typeface="Arial" panose="020B0604020202020204" pitchFamily="34" charset="0"/>
               </a:rPr>
-              <a:t>Finally</a:t>
+              <a:t>This </a:t>
             </a:r>
             <a:r>
               <a:rPr lang="en-GB" dirty="0">
@@ -4024,17 +3848,17 @@
                 <a:latin typeface="Arial" panose="020B0604020202020204" pitchFamily="34" charset="0"/>
                 <a:cs typeface="Arial" panose="020B0604020202020204" pitchFamily="34" charset="0"/>
               </a:rPr>
-              <a:t>, discuss how you would scale up or out your data pipeline with significantly more data, </a:t>
-            </a:r>
-            <a:r>
-              <a:rPr lang="en-GB" dirty="0" smtClean="0">
-                <a:solidFill>
-                  <a:schemeClr val="bg1"/>
-                </a:solidFill>
-                <a:latin typeface="Arial" panose="020B0604020202020204" pitchFamily="34" charset="0"/>
-                <a:cs typeface="Arial" panose="020B0604020202020204" pitchFamily="34" charset="0"/>
-              </a:rPr>
-              <a:t>using </a:t>
+              <a:t>part should detail how you </a:t>
+            </a:r>
+            <a:r>
+              <a:rPr lang="en-GB" dirty="0" err="1">
+                <a:solidFill>
+                  <a:schemeClr val="bg1"/>
+                </a:solidFill>
+                <a:latin typeface="Arial" panose="020B0604020202020204" pitchFamily="34" charset="0"/>
+                <a:cs typeface="Arial" panose="020B0604020202020204" pitchFamily="34" charset="0"/>
+              </a:rPr>
+              <a:t>analyzed</a:t>
             </a:r>
             <a:r>
               <a:rPr lang="en-GB" dirty="0">
@@ -4044,7 +3868,7 @@
                 <a:latin typeface="Arial" panose="020B0604020202020204" pitchFamily="34" charset="0"/>
                 <a:cs typeface="Arial" panose="020B0604020202020204" pitchFamily="34" charset="0"/>
               </a:rPr>
-              <a:t>cloud resources. </a:t>
+              <a:t> the data, </a:t>
             </a:r>
             <a:endParaRPr lang="en-BE" dirty="0" smtClean="0">
               <a:solidFill>
@@ -4063,7 +3887,7 @@
                 <a:latin typeface="Arial" panose="020B0604020202020204" pitchFamily="34" charset="0"/>
                 <a:cs typeface="Arial" panose="020B0604020202020204" pitchFamily="34" charset="0"/>
               </a:rPr>
-              <a:t>Specify </a:t>
+              <a:t>the </a:t>
             </a:r>
             <a:r>
               <a:rPr lang="en-GB" dirty="0">
@@ -4073,7 +3897,7 @@
                 <a:latin typeface="Arial" panose="020B0604020202020204" pitchFamily="34" charset="0"/>
                 <a:cs typeface="Arial" panose="020B0604020202020204" pitchFamily="34" charset="0"/>
               </a:rPr>
-              <a:t>the cloud solutions you would choose for different parts of your analysis </a:t>
+              <a:t>chosen methods, </a:t>
             </a:r>
             <a:endParaRPr lang="en-BE" dirty="0" smtClean="0">
               <a:solidFill>
@@ -4102,17 +3926,7 @@
                 <a:latin typeface="Arial" panose="020B0604020202020204" pitchFamily="34" charset="0"/>
                 <a:cs typeface="Arial" panose="020B0604020202020204" pitchFamily="34" charset="0"/>
               </a:rPr>
-              <a:t>justify why they are the best options</a:t>
-            </a:r>
-            <a:r>
-              <a:rPr lang="en-GB" dirty="0" smtClean="0">
-                <a:solidFill>
-                  <a:schemeClr val="bg1"/>
-                </a:solidFill>
-                <a:latin typeface="Arial" panose="020B0604020202020204" pitchFamily="34" charset="0"/>
-                <a:cs typeface="Arial" panose="020B0604020202020204" pitchFamily="34" charset="0"/>
-              </a:rPr>
-              <a:t>.</a:t>
+              <a:t>their reasons. </a:t>
             </a:r>
             <a:endParaRPr lang="en-BE" dirty="0" smtClean="0">
               <a:solidFill>
@@ -4123,7 +3937,27 @@
             </a:endParaRPr>
           </a:p>
           <a:p>
-            <a:endParaRPr lang="en-BE" dirty="0">
+            <a:r>
+              <a:rPr lang="en-GB" dirty="0" smtClean="0">
+                <a:solidFill>
+                  <a:schemeClr val="bg1"/>
+                </a:solidFill>
+                <a:latin typeface="Arial" panose="020B0604020202020204" pitchFamily="34" charset="0"/>
+                <a:cs typeface="Arial" panose="020B0604020202020204" pitchFamily="34" charset="0"/>
+              </a:rPr>
+              <a:t>Discuss </a:t>
+            </a:r>
+            <a:r>
+              <a:rPr lang="en-GB" dirty="0">
+                <a:solidFill>
+                  <a:schemeClr val="bg1"/>
+                </a:solidFill>
+                <a:latin typeface="Arial" panose="020B0604020202020204" pitchFamily="34" charset="0"/>
+                <a:cs typeface="Arial" panose="020B0604020202020204" pitchFamily="34" charset="0"/>
+              </a:rPr>
+              <a:t>the challenges faced due to the large amount of data </a:t>
+            </a:r>
+            <a:endParaRPr lang="en-BE" dirty="0" smtClean="0">
               <a:solidFill>
                 <a:schemeClr val="bg1"/>
               </a:solidFill>
@@ -4133,6 +3967,16 @@
           </a:p>
           <a:p>
             <a:r>
+              <a:rPr lang="en-GB" dirty="0" smtClean="0">
+                <a:solidFill>
+                  <a:schemeClr val="bg1"/>
+                </a:solidFill>
+                <a:latin typeface="Arial" panose="020B0604020202020204" pitchFamily="34" charset="0"/>
+                <a:cs typeface="Arial" panose="020B0604020202020204" pitchFamily="34" charset="0"/>
+              </a:rPr>
+              <a:t>and </a:t>
+            </a:r>
+            <a:r>
               <a:rPr lang="en-GB" dirty="0">
                 <a:solidFill>
                   <a:schemeClr val="bg1"/>
@@ -4140,17 +3984,7 @@
                 <a:latin typeface="Arial" panose="020B0604020202020204" pitchFamily="34" charset="0"/>
                 <a:cs typeface="Arial" panose="020B0604020202020204" pitchFamily="34" charset="0"/>
               </a:rPr>
-              <a:t>&lt;!-- Almost done! In this last section, suppose you have to re-run your data pipeline with substantially more data. Further suppose that you have access to cloud resources to scale up/scale out the different components of your pipeline. Briefly describe which cloud solutions you would use for which part of your analysis and explain why. Note: as in the explanations above, this part is also very project-specific. Some cloud solutions probably make sense for some projects but would be overkill in other projects, etc.  </a:t>
-            </a:r>
-            <a:r>
-              <a:rPr lang="en-GB" dirty="0" smtClean="0">
-                <a:solidFill>
-                  <a:schemeClr val="bg1"/>
-                </a:solidFill>
-                <a:latin typeface="Arial" panose="020B0604020202020204" pitchFamily="34" charset="0"/>
-                <a:cs typeface="Arial" panose="020B0604020202020204" pitchFamily="34" charset="0"/>
-              </a:rPr>
-              <a:t>--&gt;</a:t>
+              <a:t>the tools/techniques used to overcome them. </a:t>
             </a:r>
             <a:endParaRPr lang="en-BE" dirty="0" smtClean="0">
               <a:solidFill>
@@ -4161,6 +3995,64 @@
             </a:endParaRPr>
           </a:p>
           <a:p>
+            <a:endParaRPr lang="en-BE" dirty="0">
+              <a:solidFill>
+                <a:schemeClr val="bg1"/>
+              </a:solidFill>
+              <a:latin typeface="Arial" panose="020B0604020202020204" pitchFamily="34" charset="0"/>
+              <a:cs typeface="Arial" panose="020B0604020202020204" pitchFamily="34" charset="0"/>
+            </a:endParaRPr>
+          </a:p>
+          <a:p>
+            <a:r>
+              <a:rPr lang="en-GB" dirty="0">
+                <a:solidFill>
+                  <a:schemeClr val="bg1"/>
+                </a:solidFill>
+                <a:latin typeface="Arial" panose="020B0604020202020204" pitchFamily="34" charset="0"/>
+                <a:cs typeface="Arial" panose="020B0604020202020204" pitchFamily="34" charset="0"/>
+              </a:rPr>
+              <a:t>&lt;!-- Explain how you </a:t>
+            </a:r>
+            <a:r>
+              <a:rPr lang="en-GB" dirty="0" err="1">
+                <a:solidFill>
+                  <a:schemeClr val="bg1"/>
+                </a:solidFill>
+                <a:latin typeface="Arial" panose="020B0604020202020204" pitchFamily="34" charset="0"/>
+                <a:cs typeface="Arial" panose="020B0604020202020204" pitchFamily="34" charset="0"/>
+              </a:rPr>
+              <a:t>analyzed</a:t>
+            </a:r>
+            <a:r>
+              <a:rPr lang="en-GB" dirty="0">
+                <a:solidFill>
+                  <a:schemeClr val="bg1"/>
+                </a:solidFill>
+                <a:latin typeface="Arial" panose="020B0604020202020204" pitchFamily="34" charset="0"/>
+                <a:cs typeface="Arial" panose="020B0604020202020204" pitchFamily="34" charset="0"/>
+              </a:rPr>
+              <a:t> the data (which method(s) were used and why). Then explain what the challenges were in implementing these analyses, given the large amount of data. Finally, explain which tools/techniques you have used in order to tackle these challenges. Make sure to briefly point out why you have chosen these tools/techniques and how they helped.   </a:t>
+            </a:r>
+            <a:r>
+              <a:rPr lang="en-GB" dirty="0" smtClean="0">
+                <a:solidFill>
+                  <a:schemeClr val="bg1"/>
+                </a:solidFill>
+                <a:latin typeface="Arial" panose="020B0604020202020204" pitchFamily="34" charset="0"/>
+                <a:cs typeface="Arial" panose="020B0604020202020204" pitchFamily="34" charset="0"/>
+              </a:rPr>
+              <a:t>--&gt;</a:t>
+            </a:r>
+            <a:endParaRPr lang="en-BE" dirty="0" smtClean="0">
+              <a:solidFill>
+                <a:schemeClr val="bg1"/>
+              </a:solidFill>
+              <a:latin typeface="Arial" panose="020B0604020202020204" pitchFamily="34" charset="0"/>
+              <a:cs typeface="Arial" panose="020B0604020202020204" pitchFamily="34" charset="0"/>
+            </a:endParaRPr>
+          </a:p>
+          <a:p>
             <a:r>
               <a:rPr lang="en-BE" dirty="0" smtClean="0">
                 <a:solidFill>
@@ -4171,13 +4063,31 @@
               </a:rPr>
               <a:t>Xxx</a:t>
             </a:r>
+          </a:p>
+          <a:p>
+            <a:endParaRPr lang="en-BE" dirty="0">
+              <a:solidFill>
+                <a:schemeClr val="bg1"/>
+              </a:solidFill>
+              <a:latin typeface="Arial" panose="020B0604020202020204" pitchFamily="34" charset="0"/>
+              <a:cs typeface="Arial" panose="020B0604020202020204" pitchFamily="34" charset="0"/>
+            </a:endParaRPr>
+          </a:p>
+          <a:p>
+            <a:endParaRPr lang="en-BE" dirty="0" smtClean="0">
+              <a:solidFill>
+                <a:schemeClr val="bg1"/>
+              </a:solidFill>
+              <a:latin typeface="Arial" panose="020B0604020202020204" pitchFamily="34" charset="0"/>
+              <a:cs typeface="Arial" panose="020B0604020202020204" pitchFamily="34" charset="0"/>
+            </a:endParaRPr>
           </a:p>
         </p:txBody>
       </p:sp>
     </p:spTree>
     <p:extLst>
       <p:ext uri="{BB962C8B-B14F-4D97-AF65-F5344CB8AC3E}">
-        <p14:creationId xmlns:p14="http://schemas.microsoft.com/office/powerpoint/2010/main" val="3917658943"/>
+        <p14:creationId xmlns:p14="http://schemas.microsoft.com/office/powerpoint/2010/main" val="3097130636"/>
       </p:ext>
     </p:extLst>
   </p:cSld>
@@ -4207,7 +4117,7 @@
     </p:spTree>
     <p:extLst>
       <p:ext uri="{BB962C8B-B14F-4D97-AF65-F5344CB8AC3E}">
-        <p14:creationId xmlns:p14="http://schemas.microsoft.com/office/powerpoint/2010/main" val="2453554330"/>
+        <p14:creationId xmlns:p14="http://schemas.microsoft.com/office/powerpoint/2010/main" val="2038890368"/>
       </p:ext>
     </p:extLst>
   </p:cSld>
@@ -4243,7 +4153,7 @@
         <p:spPr>
           <a:xfrm>
             <a:off x="891396" y="428179"/>
-            <a:ext cx="10409208" cy="369332"/>
+            <a:ext cx="10409208" cy="2862322"/>
           </a:xfrm>
           <a:prstGeom prst="rect">
             <a:avLst/>
@@ -4256,24 +4166,14 @@
           <a:lstStyle/>
           <a:p>
             <a:r>
-              <a:rPr lang="en-GB" b="1" u="sng" dirty="0" smtClean="0">
+              <a:rPr lang="en-GB" b="1" u="sng" dirty="0">
                 <a:solidFill>
                   <a:schemeClr val="accent4"/>
                 </a:solidFill>
                 <a:latin typeface="Arial" panose="020B0604020202020204" pitchFamily="34" charset="0"/>
                 <a:cs typeface="Arial" panose="020B0604020202020204" pitchFamily="34" charset="0"/>
               </a:rPr>
-              <a:t>T</a:t>
-            </a:r>
-            <a:r>
-              <a:rPr lang="en-BE" b="1" u="sng" dirty="0" smtClean="0">
-                <a:solidFill>
-                  <a:schemeClr val="accent4"/>
-                </a:solidFill>
-                <a:latin typeface="Arial" panose="020B0604020202020204" pitchFamily="34" charset="0"/>
-                <a:cs typeface="Arial" panose="020B0604020202020204" pitchFamily="34" charset="0"/>
-              </a:rPr>
-              <a:t>hank you / Q&amp;A</a:t>
+              <a:t>Results: </a:t>
             </a:r>
             <a:endParaRPr lang="en-BE" b="1" u="sng" dirty="0">
               <a:solidFill>
@@ -4282,13 +4182,180 @@
               <a:latin typeface="Arial" panose="020B0604020202020204" pitchFamily="34" charset="0"/>
               <a:cs typeface="Arial" panose="020B0604020202020204" pitchFamily="34" charset="0"/>
             </a:endParaRPr>
+          </a:p>
+          <a:p>
+            <a:r>
+              <a:rPr lang="en-GB" dirty="0" smtClean="0">
+                <a:solidFill>
+                  <a:schemeClr val="bg1"/>
+                </a:solidFill>
+                <a:latin typeface="Arial" panose="020B0604020202020204" pitchFamily="34" charset="0"/>
+                <a:cs typeface="Arial" panose="020B0604020202020204" pitchFamily="34" charset="0"/>
+              </a:rPr>
+              <a:t>Summarize </a:t>
+            </a:r>
+            <a:r>
+              <a:rPr lang="en-GB" dirty="0">
+                <a:solidFill>
+                  <a:schemeClr val="bg1"/>
+                </a:solidFill>
+                <a:latin typeface="Arial" panose="020B0604020202020204" pitchFamily="34" charset="0"/>
+                <a:cs typeface="Arial" panose="020B0604020202020204" pitchFamily="34" charset="0"/>
+              </a:rPr>
+              <a:t>the main findings of the research. </a:t>
+            </a:r>
+            <a:endParaRPr lang="en-BE" dirty="0" smtClean="0">
+              <a:solidFill>
+                <a:schemeClr val="bg1"/>
+              </a:solidFill>
+              <a:latin typeface="Arial" panose="020B0604020202020204" pitchFamily="34" charset="0"/>
+              <a:cs typeface="Arial" panose="020B0604020202020204" pitchFamily="34" charset="0"/>
+            </a:endParaRPr>
+          </a:p>
+          <a:p>
+            <a:r>
+              <a:rPr lang="en-GB" dirty="0" smtClean="0">
+                <a:solidFill>
+                  <a:schemeClr val="bg1"/>
+                </a:solidFill>
+                <a:latin typeface="Arial" panose="020B0604020202020204" pitchFamily="34" charset="0"/>
+                <a:cs typeface="Arial" panose="020B0604020202020204" pitchFamily="34" charset="0"/>
+              </a:rPr>
+              <a:t>Include </a:t>
+            </a:r>
+            <a:r>
+              <a:rPr lang="en-GB" dirty="0">
+                <a:solidFill>
+                  <a:schemeClr val="bg1"/>
+                </a:solidFill>
+                <a:latin typeface="Arial" panose="020B0604020202020204" pitchFamily="34" charset="0"/>
+                <a:cs typeface="Arial" panose="020B0604020202020204" pitchFamily="34" charset="0"/>
+              </a:rPr>
+              <a:t>up to five exhibits (tables or figures) to support these findings, </a:t>
+            </a:r>
+            <a:endParaRPr lang="en-BE" dirty="0" smtClean="0">
+              <a:solidFill>
+                <a:schemeClr val="bg1"/>
+              </a:solidFill>
+              <a:latin typeface="Arial" panose="020B0604020202020204" pitchFamily="34" charset="0"/>
+              <a:cs typeface="Arial" panose="020B0604020202020204" pitchFamily="34" charset="0"/>
+            </a:endParaRPr>
+          </a:p>
+          <a:p>
+            <a:r>
+              <a:rPr lang="en-GB" dirty="0" smtClean="0">
+                <a:solidFill>
+                  <a:schemeClr val="bg1"/>
+                </a:solidFill>
+                <a:latin typeface="Arial" panose="020B0604020202020204" pitchFamily="34" charset="0"/>
+                <a:cs typeface="Arial" panose="020B0604020202020204" pitchFamily="34" charset="0"/>
+              </a:rPr>
+              <a:t>with </a:t>
+            </a:r>
+            <a:r>
+              <a:rPr lang="en-GB" dirty="0">
+                <a:solidFill>
+                  <a:schemeClr val="bg1"/>
+                </a:solidFill>
+                <a:latin typeface="Arial" panose="020B0604020202020204" pitchFamily="34" charset="0"/>
+                <a:cs typeface="Arial" panose="020B0604020202020204" pitchFamily="34" charset="0"/>
+              </a:rPr>
+              <a:t>accompanying notes explaining what each exhibit represents</a:t>
+            </a:r>
+            <a:r>
+              <a:rPr lang="en-GB" dirty="0" smtClean="0">
+                <a:solidFill>
+                  <a:schemeClr val="bg1"/>
+                </a:solidFill>
+                <a:latin typeface="Arial" panose="020B0604020202020204" pitchFamily="34" charset="0"/>
+                <a:cs typeface="Arial" panose="020B0604020202020204" pitchFamily="34" charset="0"/>
+              </a:rPr>
+              <a:t>.</a:t>
+            </a:r>
+            <a:endParaRPr lang="en-BE" dirty="0" smtClean="0">
+              <a:solidFill>
+                <a:schemeClr val="bg1"/>
+              </a:solidFill>
+              <a:latin typeface="Arial" panose="020B0604020202020204" pitchFamily="34" charset="0"/>
+              <a:cs typeface="Arial" panose="020B0604020202020204" pitchFamily="34" charset="0"/>
+            </a:endParaRPr>
+          </a:p>
+          <a:p>
+            <a:endParaRPr lang="en-BE" dirty="0">
+              <a:solidFill>
+                <a:schemeClr val="bg1"/>
+              </a:solidFill>
+              <a:latin typeface="Arial" panose="020B0604020202020204" pitchFamily="34" charset="0"/>
+              <a:cs typeface="Arial" panose="020B0604020202020204" pitchFamily="34" charset="0"/>
+            </a:endParaRPr>
+          </a:p>
+          <a:p>
+            <a:r>
+              <a:rPr lang="en-GB" dirty="0">
+                <a:solidFill>
+                  <a:schemeClr val="bg1"/>
+                </a:solidFill>
+                <a:latin typeface="Arial" panose="020B0604020202020204" pitchFamily="34" charset="0"/>
+                <a:cs typeface="Arial" panose="020B0604020202020204" pitchFamily="34" charset="0"/>
+              </a:rPr>
+              <a:t>&lt;!-- First, briefly summarize your main findings. Then, show up to 5 exhibits (tables and figures). Right below each table/figure, add table/figure-notes that describe what the reader sees in the corresponding table/figure. (Hint: have a look at empirical papers in the top Econ outlets like AER, QJE, </a:t>
+            </a:r>
+            <a:r>
+              <a:rPr lang="en-GB" dirty="0" err="1">
+                <a:solidFill>
+                  <a:schemeClr val="bg1"/>
+                </a:solidFill>
+                <a:latin typeface="Arial" panose="020B0604020202020204" pitchFamily="34" charset="0"/>
+                <a:cs typeface="Arial" panose="020B0604020202020204" pitchFamily="34" charset="0"/>
+              </a:rPr>
+              <a:t>Econometrica</a:t>
+            </a:r>
+            <a:r>
+              <a:rPr lang="en-GB" dirty="0">
+                <a:solidFill>
+                  <a:schemeClr val="bg1"/>
+                </a:solidFill>
+                <a:latin typeface="Arial" panose="020B0604020202020204" pitchFamily="34" charset="0"/>
+                <a:cs typeface="Arial" panose="020B0604020202020204" pitchFamily="34" charset="0"/>
+              </a:rPr>
+              <a:t>, etc. to get a feeling for how Economists write such notes.) </a:t>
+            </a:r>
+            <a:r>
+              <a:rPr lang="en-GB" dirty="0" smtClean="0">
+                <a:solidFill>
+                  <a:schemeClr val="bg1"/>
+                </a:solidFill>
+                <a:latin typeface="Arial" panose="020B0604020202020204" pitchFamily="34" charset="0"/>
+                <a:cs typeface="Arial" panose="020B0604020202020204" pitchFamily="34" charset="0"/>
+              </a:rPr>
+              <a:t>--&gt;</a:t>
+            </a:r>
+            <a:endParaRPr lang="en-BE" dirty="0" smtClean="0">
+              <a:solidFill>
+                <a:schemeClr val="bg1"/>
+              </a:solidFill>
+              <a:latin typeface="Arial" panose="020B0604020202020204" pitchFamily="34" charset="0"/>
+              <a:cs typeface="Arial" panose="020B0604020202020204" pitchFamily="34" charset="0"/>
+            </a:endParaRPr>
+          </a:p>
+          <a:p>
+            <a:r>
+              <a:rPr lang="en-BE" dirty="0" smtClean="0">
+                <a:solidFill>
+                  <a:schemeClr val="bg1"/>
+                </a:solidFill>
+                <a:latin typeface="Arial" panose="020B0604020202020204" pitchFamily="34" charset="0"/>
+                <a:cs typeface="Arial" panose="020B0604020202020204" pitchFamily="34" charset="0"/>
+              </a:rPr>
+              <a:t>Xxx</a:t>
+            </a:r>
           </a:p>
         </p:txBody>
       </p:sp>
     </p:spTree>
     <p:extLst>
       <p:ext uri="{BB962C8B-B14F-4D97-AF65-F5344CB8AC3E}">
-        <p14:creationId xmlns:p14="http://schemas.microsoft.com/office/powerpoint/2010/main" val="2326349846"/>
+        <p14:creationId xmlns:p14="http://schemas.microsoft.com/office/powerpoint/2010/main" val="1774966646"/>
       </p:ext>
     </p:extLst>
   </p:cSld>
@@ -4318,7 +4385,7 @@
     </p:spTree>
     <p:extLst>
       <p:ext uri="{BB962C8B-B14F-4D97-AF65-F5344CB8AC3E}">
-        <p14:creationId xmlns:p14="http://schemas.microsoft.com/office/powerpoint/2010/main" val="3388994060"/>
+        <p14:creationId xmlns:p14="http://schemas.microsoft.com/office/powerpoint/2010/main" val="453994540"/>
       </p:ext>
     </p:extLst>
   </p:cSld>
@@ -4347,14 +4414,14 @@
       </p:grpSpPr>
       <p:sp>
         <p:nvSpPr>
-          <p:cNvPr id="2" name="Rectangle 1"/>
+          <p:cNvPr id="4" name="Rectangle 3"/>
           <p:cNvSpPr/>
           <p:nvPr/>
         </p:nvSpPr>
         <p:spPr>
           <a:xfrm>
             <a:off x="891396" y="428179"/>
-            <a:ext cx="10409208" cy="338554"/>
+            <a:ext cx="10409208" cy="3693319"/>
           </a:xfrm>
           <a:prstGeom prst="rect">
             <a:avLst/>
@@ -4367,29 +4434,196 @@
           <a:lstStyle/>
           <a:p>
             <a:r>
-              <a:rPr lang="en-BE" sz="1600" b="1" u="sng" dirty="0" smtClean="0">
+              <a:rPr lang="en-GB" b="1" u="sng" dirty="0">
                 <a:solidFill>
                   <a:schemeClr val="accent4"/>
                 </a:solidFill>
                 <a:latin typeface="Arial" panose="020B0604020202020204" pitchFamily="34" charset="0"/>
                 <a:cs typeface="Arial" panose="020B0604020202020204" pitchFamily="34" charset="0"/>
               </a:rPr>
-              <a:t>APPENDIX</a:t>
-            </a:r>
-            <a:endParaRPr lang="en-GB" sz="1600" b="1" dirty="0">
+              <a:t>Scaling and Cloud Deployment: </a:t>
+            </a:r>
+            <a:endParaRPr lang="en-BE" b="1" u="sng" dirty="0">
               <a:solidFill>
                 <a:schemeClr val="accent4"/>
               </a:solidFill>
               <a:latin typeface="Arial" panose="020B0604020202020204" pitchFamily="34" charset="0"/>
               <a:cs typeface="Arial" panose="020B0604020202020204" pitchFamily="34" charset="0"/>
             </a:endParaRPr>
+          </a:p>
+          <a:p>
+            <a:r>
+              <a:rPr lang="en-GB" dirty="0" smtClean="0">
+                <a:solidFill>
+                  <a:schemeClr val="bg1"/>
+                </a:solidFill>
+                <a:latin typeface="Arial" panose="020B0604020202020204" pitchFamily="34" charset="0"/>
+                <a:cs typeface="Arial" panose="020B0604020202020204" pitchFamily="34" charset="0"/>
+              </a:rPr>
+              <a:t>Finally</a:t>
+            </a:r>
+            <a:r>
+              <a:rPr lang="en-GB" dirty="0">
+                <a:solidFill>
+                  <a:schemeClr val="bg1"/>
+                </a:solidFill>
+                <a:latin typeface="Arial" panose="020B0604020202020204" pitchFamily="34" charset="0"/>
+                <a:cs typeface="Arial" panose="020B0604020202020204" pitchFamily="34" charset="0"/>
+              </a:rPr>
+              <a:t>, discuss how you would scale up or out your data pipeline with significantly more data, </a:t>
+            </a:r>
+            <a:r>
+              <a:rPr lang="en-GB" dirty="0" smtClean="0">
+                <a:solidFill>
+                  <a:schemeClr val="bg1"/>
+                </a:solidFill>
+                <a:latin typeface="Arial" panose="020B0604020202020204" pitchFamily="34" charset="0"/>
+                <a:cs typeface="Arial" panose="020B0604020202020204" pitchFamily="34" charset="0"/>
+              </a:rPr>
+              <a:t>using </a:t>
+            </a:r>
+            <a:r>
+              <a:rPr lang="en-GB" dirty="0">
+                <a:solidFill>
+                  <a:schemeClr val="bg1"/>
+                </a:solidFill>
+                <a:latin typeface="Arial" panose="020B0604020202020204" pitchFamily="34" charset="0"/>
+                <a:cs typeface="Arial" panose="020B0604020202020204" pitchFamily="34" charset="0"/>
+              </a:rPr>
+              <a:t>cloud resources. </a:t>
+            </a:r>
+            <a:endParaRPr lang="en-BE" dirty="0" smtClean="0">
+              <a:solidFill>
+                <a:schemeClr val="bg1"/>
+              </a:solidFill>
+              <a:latin typeface="Arial" panose="020B0604020202020204" pitchFamily="34" charset="0"/>
+              <a:cs typeface="Arial" panose="020B0604020202020204" pitchFamily="34" charset="0"/>
+            </a:endParaRPr>
+          </a:p>
+          <a:p>
+            <a:r>
+              <a:rPr lang="en-GB" dirty="0" smtClean="0">
+                <a:solidFill>
+                  <a:schemeClr val="bg1"/>
+                </a:solidFill>
+                <a:latin typeface="Arial" panose="020B0604020202020204" pitchFamily="34" charset="0"/>
+                <a:cs typeface="Arial" panose="020B0604020202020204" pitchFamily="34" charset="0"/>
+              </a:rPr>
+              <a:t>Specify </a:t>
+            </a:r>
+            <a:r>
+              <a:rPr lang="en-GB" dirty="0">
+                <a:solidFill>
+                  <a:schemeClr val="bg1"/>
+                </a:solidFill>
+                <a:latin typeface="Arial" panose="020B0604020202020204" pitchFamily="34" charset="0"/>
+                <a:cs typeface="Arial" panose="020B0604020202020204" pitchFamily="34" charset="0"/>
+              </a:rPr>
+              <a:t>the cloud solutions you would choose for different parts of your analysis </a:t>
+            </a:r>
+            <a:endParaRPr lang="en-BE" dirty="0" smtClean="0">
+              <a:solidFill>
+                <a:schemeClr val="bg1"/>
+              </a:solidFill>
+              <a:latin typeface="Arial" panose="020B0604020202020204" pitchFamily="34" charset="0"/>
+              <a:cs typeface="Arial" panose="020B0604020202020204" pitchFamily="34" charset="0"/>
+            </a:endParaRPr>
+          </a:p>
+          <a:p>
+            <a:r>
+              <a:rPr lang="en-GB" dirty="0" smtClean="0">
+                <a:solidFill>
+                  <a:schemeClr val="bg1"/>
+                </a:solidFill>
+                <a:latin typeface="Arial" panose="020B0604020202020204" pitchFamily="34" charset="0"/>
+                <a:cs typeface="Arial" panose="020B0604020202020204" pitchFamily="34" charset="0"/>
+              </a:rPr>
+              <a:t>and </a:t>
+            </a:r>
+            <a:r>
+              <a:rPr lang="en-GB" dirty="0">
+                <a:solidFill>
+                  <a:schemeClr val="bg1"/>
+                </a:solidFill>
+                <a:latin typeface="Arial" panose="020B0604020202020204" pitchFamily="34" charset="0"/>
+                <a:cs typeface="Arial" panose="020B0604020202020204" pitchFamily="34" charset="0"/>
+              </a:rPr>
+              <a:t>justify why they are the best options</a:t>
+            </a:r>
+            <a:r>
+              <a:rPr lang="en-GB" dirty="0" smtClean="0">
+                <a:solidFill>
+                  <a:schemeClr val="bg1"/>
+                </a:solidFill>
+                <a:latin typeface="Arial" panose="020B0604020202020204" pitchFamily="34" charset="0"/>
+                <a:cs typeface="Arial" panose="020B0604020202020204" pitchFamily="34" charset="0"/>
+              </a:rPr>
+              <a:t>.</a:t>
+            </a:r>
+            <a:endParaRPr lang="en-BE" dirty="0" smtClean="0">
+              <a:solidFill>
+                <a:schemeClr val="bg1"/>
+              </a:solidFill>
+              <a:latin typeface="Arial" panose="020B0604020202020204" pitchFamily="34" charset="0"/>
+              <a:cs typeface="Arial" panose="020B0604020202020204" pitchFamily="34" charset="0"/>
+            </a:endParaRPr>
+          </a:p>
+          <a:p>
+            <a:endParaRPr lang="en-BE" dirty="0">
+              <a:solidFill>
+                <a:schemeClr val="bg1"/>
+              </a:solidFill>
+              <a:latin typeface="Arial" panose="020B0604020202020204" pitchFamily="34" charset="0"/>
+              <a:cs typeface="Arial" panose="020B0604020202020204" pitchFamily="34" charset="0"/>
+            </a:endParaRPr>
+          </a:p>
+          <a:p>
+            <a:r>
+              <a:rPr lang="en-GB" dirty="0">
+                <a:solidFill>
+                  <a:schemeClr val="bg1"/>
+                </a:solidFill>
+                <a:latin typeface="Arial" panose="020B0604020202020204" pitchFamily="34" charset="0"/>
+                <a:cs typeface="Arial" panose="020B0604020202020204" pitchFamily="34" charset="0"/>
+              </a:rPr>
+              <a:t>&lt;!-- Almost done! In this last section, suppose you have to re-run your data pipeline with substantially more data. Further suppose that you have access to cloud resources to scale up/scale out the different components of your pipeline. Briefly describe which cloud solutions you would use for which part of your analysis and explain why. Note: as in the explanations above, this part is also very project-specific. Some cloud solutions probably make sense for some projects but would be overkill in other projects, etc.  </a:t>
+            </a:r>
+            <a:r>
+              <a:rPr lang="en-GB" dirty="0" smtClean="0">
+                <a:solidFill>
+                  <a:schemeClr val="bg1"/>
+                </a:solidFill>
+                <a:latin typeface="Arial" panose="020B0604020202020204" pitchFamily="34" charset="0"/>
+                <a:cs typeface="Arial" panose="020B0604020202020204" pitchFamily="34" charset="0"/>
+              </a:rPr>
+              <a:t>--&gt;</a:t>
+            </a:r>
+            <a:endParaRPr lang="en-BE" dirty="0" smtClean="0">
+              <a:solidFill>
+                <a:schemeClr val="bg1"/>
+              </a:solidFill>
+              <a:latin typeface="Arial" panose="020B0604020202020204" pitchFamily="34" charset="0"/>
+              <a:cs typeface="Arial" panose="020B0604020202020204" pitchFamily="34" charset="0"/>
+            </a:endParaRPr>
+          </a:p>
+          <a:p>
+            <a:r>
+              <a:rPr lang="en-BE" dirty="0" smtClean="0">
+                <a:solidFill>
+                  <a:schemeClr val="bg1"/>
+                </a:solidFill>
+                <a:latin typeface="Arial" panose="020B0604020202020204" pitchFamily="34" charset="0"/>
+                <a:cs typeface="Arial" panose="020B0604020202020204" pitchFamily="34" charset="0"/>
+              </a:rPr>
+              <a:t>Xxx</a:t>
+            </a:r>
           </a:p>
         </p:txBody>
       </p:sp>
     </p:spTree>
     <p:extLst>
       <p:ext uri="{BB962C8B-B14F-4D97-AF65-F5344CB8AC3E}">
-        <p14:creationId xmlns:p14="http://schemas.microsoft.com/office/powerpoint/2010/main" val="3370261199"/>
+        <p14:creationId xmlns:p14="http://schemas.microsoft.com/office/powerpoint/2010/main" val="3917658943"/>
       </p:ext>
     </p:extLst>
   </p:cSld>
@@ -4416,10 +4650,322 @@
           <a:chExt cx="0" cy="0"/>
         </a:xfrm>
       </p:grpSpPr>
+      <p:pic>
+        <p:nvPicPr>
+          <p:cNvPr id="7" name="Content Placeholder 4"/>
+          <p:cNvPicPr>
+            <a:picLocks noChangeAspect="1"/>
+          </p:cNvPicPr>
+          <p:nvPr/>
+        </p:nvPicPr>
+        <p:blipFill rotWithShape="1">
+          <a:blip r:embed="rId2">
+            <a:extLst>
+              <a:ext uri="{28A0092B-C50C-407E-A947-70E740481C1C}">
+                <a14:useLocalDpi xmlns:a14="http://schemas.microsoft.com/office/drawing/2010/main" val="0"/>
+              </a:ext>
+            </a:extLst>
+          </a:blip>
+          <a:srcRect l="3596" r="9702"/>
+          <a:stretch/>
+        </p:blipFill>
+        <p:spPr>
+          <a:xfrm>
+            <a:off x="6315972" y="365125"/>
+            <a:ext cx="5037828" cy="5810400"/>
+          </a:xfrm>
+          <a:prstGeom prst="rect">
+            <a:avLst/>
+          </a:prstGeom>
+          <a:ln>
+            <a:noFill/>
+          </a:ln>
+          <a:effectLst>
+            <a:softEdge rad="112500"/>
+          </a:effectLst>
+        </p:spPr>
+      </p:pic>
+      <p:sp>
+        <p:nvSpPr>
+          <p:cNvPr id="10" name="TextBox 9"/>
+          <p:cNvSpPr txBox="1"/>
+          <p:nvPr/>
+        </p:nvSpPr>
+        <p:spPr>
+          <a:xfrm>
+            <a:off x="838200" y="1825625"/>
+            <a:ext cx="5040000" cy="1077218"/>
+          </a:xfrm>
+          <a:prstGeom prst="rect">
+            <a:avLst/>
+          </a:prstGeom>
+          <a:noFill/>
+        </p:spPr>
+        <p:txBody>
+          <a:bodyPr wrap="square" rtlCol="0">
+            <a:spAutoFit/>
+          </a:bodyPr>
+          <a:lstStyle/>
+          <a:p>
+            <a:r>
+              <a:rPr lang="en-BE" sz="3200" b="1" dirty="0" smtClean="0">
+                <a:solidFill>
+                  <a:schemeClr val="accent4"/>
+                </a:solidFill>
+                <a:latin typeface="Tahoma" panose="020B0604030504040204" pitchFamily="34" charset="0"/>
+                <a:ea typeface="Tahoma" panose="020B0604030504040204" pitchFamily="34" charset="0"/>
+                <a:cs typeface="Tahoma" panose="020B0604030504040204" pitchFamily="34" charset="0"/>
+              </a:rPr>
+              <a:t>BIG DATA ANALYTICS</a:t>
+            </a:r>
+          </a:p>
+          <a:p>
+            <a:r>
+              <a:rPr lang="en-BE" sz="3200" dirty="0" smtClean="0">
+                <a:solidFill>
+                  <a:schemeClr val="accent4"/>
+                </a:solidFill>
+                <a:latin typeface="Tahoma" panose="020B0604030504040204" pitchFamily="34" charset="0"/>
+                <a:ea typeface="Tahoma" panose="020B0604030504040204" pitchFamily="34" charset="0"/>
+                <a:cs typeface="Tahoma" panose="020B0604030504040204" pitchFamily="34" charset="0"/>
+              </a:rPr>
+              <a:t>project presentation</a:t>
+            </a:r>
+          </a:p>
+        </p:txBody>
+      </p:sp>
+      <p:sp>
+        <p:nvSpPr>
+          <p:cNvPr id="13" name="Rectangle 12"/>
+          <p:cNvSpPr/>
+          <p:nvPr/>
+        </p:nvSpPr>
+        <p:spPr>
+          <a:xfrm>
+            <a:off x="845070" y="4975196"/>
+            <a:ext cx="3219151" cy="1200329"/>
+          </a:xfrm>
+          <a:prstGeom prst="rect">
+            <a:avLst/>
+          </a:prstGeom>
+        </p:spPr>
+        <p:txBody>
+          <a:bodyPr wrap="none">
+            <a:spAutoFit/>
+          </a:bodyPr>
+          <a:lstStyle/>
+          <a:p>
+            <a:r>
+              <a:rPr lang="en-BE" b="1" i="1" dirty="0" smtClean="0">
+                <a:solidFill>
+                  <a:schemeClr val="bg1"/>
+                </a:solidFill>
+                <a:latin typeface="Tahoma" panose="020B0604030504040204" pitchFamily="34" charset="0"/>
+                <a:ea typeface="Tahoma" panose="020B0604030504040204" pitchFamily="34" charset="0"/>
+                <a:cs typeface="Tahoma" panose="020B0604030504040204" pitchFamily="34" charset="0"/>
+              </a:rPr>
+              <a:t>By “Big Data Big Dreams”</a:t>
+            </a:r>
+          </a:p>
+          <a:p>
+            <a:pPr marL="285750" indent="-285750">
+              <a:buFont typeface="Wingdings" panose="05000000000000000000" pitchFamily="2" charset="2"/>
+              <a:buChar char="Ø"/>
+            </a:pPr>
+            <a:r>
+              <a:rPr lang="en-BE" i="1" dirty="0" smtClean="0">
+                <a:solidFill>
+                  <a:schemeClr val="bg1"/>
+                </a:solidFill>
+                <a:latin typeface="Tahoma" panose="020B0604030504040204" pitchFamily="34" charset="0"/>
+                <a:ea typeface="Tahoma" panose="020B0604030504040204" pitchFamily="34" charset="0"/>
+                <a:cs typeface="Tahoma" panose="020B0604030504040204" pitchFamily="34" charset="0"/>
+              </a:rPr>
+              <a:t>Ariq Bintang</a:t>
+            </a:r>
+          </a:p>
+          <a:p>
+            <a:pPr marL="285750" indent="-285750">
+              <a:buFont typeface="Wingdings" panose="05000000000000000000" pitchFamily="2" charset="2"/>
+              <a:buChar char="Ø"/>
+            </a:pPr>
+            <a:r>
+              <a:rPr lang="en-BE" i="1" dirty="0" smtClean="0">
+                <a:solidFill>
+                  <a:schemeClr val="bg1"/>
+                </a:solidFill>
+                <a:latin typeface="Tahoma" panose="020B0604030504040204" pitchFamily="34" charset="0"/>
+                <a:ea typeface="Tahoma" panose="020B0604030504040204" pitchFamily="34" charset="0"/>
+                <a:cs typeface="Tahoma" panose="020B0604030504040204" pitchFamily="34" charset="0"/>
+              </a:rPr>
+              <a:t>Luca Gewehr</a:t>
+            </a:r>
+          </a:p>
+          <a:p>
+            <a:pPr marL="285750" indent="-285750">
+              <a:buFont typeface="Wingdings" panose="05000000000000000000" pitchFamily="2" charset="2"/>
+              <a:buChar char="Ø"/>
+            </a:pPr>
+            <a:r>
+              <a:rPr lang="en-BE" i="1" dirty="0" smtClean="0">
+                <a:solidFill>
+                  <a:schemeClr val="bg1"/>
+                </a:solidFill>
+                <a:latin typeface="Tahoma" panose="020B0604030504040204" pitchFamily="34" charset="0"/>
+                <a:ea typeface="Tahoma" panose="020B0604030504040204" pitchFamily="34" charset="0"/>
+                <a:cs typeface="Tahoma" panose="020B0604030504040204" pitchFamily="34" charset="0"/>
+              </a:rPr>
+              <a:t>Marco Hafid</a:t>
+            </a:r>
+            <a:endParaRPr lang="en-BE" i="1" dirty="0">
+              <a:solidFill>
+                <a:schemeClr val="bg1"/>
+              </a:solidFill>
+              <a:latin typeface="Tahoma" panose="020B0604030504040204" pitchFamily="34" charset="0"/>
+              <a:ea typeface="Tahoma" panose="020B0604030504040204" pitchFamily="34" charset="0"/>
+              <a:cs typeface="Tahoma" panose="020B0604030504040204" pitchFamily="34" charset="0"/>
+            </a:endParaRPr>
+          </a:p>
+        </p:txBody>
+      </p:sp>
+      <p:sp>
+        <p:nvSpPr>
+          <p:cNvPr id="15" name="Rectangle 14"/>
+          <p:cNvSpPr/>
+          <p:nvPr/>
+        </p:nvSpPr>
+        <p:spPr>
+          <a:xfrm>
+            <a:off x="845070" y="3585076"/>
+            <a:ext cx="5470902" cy="707886"/>
+          </a:xfrm>
+          <a:prstGeom prst="rect">
+            <a:avLst/>
+          </a:prstGeom>
+        </p:spPr>
+        <p:txBody>
+          <a:bodyPr wrap="square">
+            <a:spAutoFit/>
+          </a:bodyPr>
+          <a:lstStyle/>
+          <a:p>
+            <a:r>
+              <a:rPr lang="en-BE" sz="2000" b="1" dirty="0" smtClean="0">
+                <a:solidFill>
+                  <a:schemeClr val="bg1"/>
+                </a:solidFill>
+                <a:latin typeface="Tahoma" panose="020B0604030504040204" pitchFamily="34" charset="0"/>
+                <a:ea typeface="Tahoma" panose="020B0604030504040204" pitchFamily="34" charset="0"/>
+                <a:cs typeface="Tahoma" panose="020B0604030504040204" pitchFamily="34" charset="0"/>
+              </a:rPr>
+              <a:t>Unique, optimal investment </a:t>
+            </a:r>
+            <a:r>
+              <a:rPr lang="en-GB" sz="2000" b="1" dirty="0" err="1" smtClean="0">
+                <a:solidFill>
+                  <a:schemeClr val="bg1"/>
+                </a:solidFill>
+                <a:latin typeface="Tahoma" panose="020B0604030504040204" pitchFamily="34" charset="0"/>
+                <a:ea typeface="Tahoma" panose="020B0604030504040204" pitchFamily="34" charset="0"/>
+                <a:cs typeface="Tahoma" panose="020B0604030504040204" pitchFamily="34" charset="0"/>
+              </a:rPr>
+              <a:t>strateg</a:t>
+            </a:r>
+            <a:r>
+              <a:rPr lang="en-BE" sz="2000" b="1" dirty="0" smtClean="0">
+                <a:solidFill>
+                  <a:schemeClr val="bg1"/>
+                </a:solidFill>
+                <a:latin typeface="Tahoma" panose="020B0604030504040204" pitchFamily="34" charset="0"/>
+                <a:ea typeface="Tahoma" panose="020B0604030504040204" pitchFamily="34" charset="0"/>
+                <a:cs typeface="Tahoma" panose="020B0604030504040204" pitchFamily="34" charset="0"/>
+              </a:rPr>
+              <a:t>ies </a:t>
+            </a:r>
+            <a:br>
+              <a:rPr lang="en-BE" sz="2000" b="1" dirty="0" smtClean="0">
+                <a:solidFill>
+                  <a:schemeClr val="bg1"/>
+                </a:solidFill>
+                <a:latin typeface="Tahoma" panose="020B0604030504040204" pitchFamily="34" charset="0"/>
+                <a:ea typeface="Tahoma" panose="020B0604030504040204" pitchFamily="34" charset="0"/>
+                <a:cs typeface="Tahoma" panose="020B0604030504040204" pitchFamily="34" charset="0"/>
+              </a:rPr>
+            </a:br>
+            <a:r>
+              <a:rPr lang="en-BE" sz="2000" b="1" dirty="0" smtClean="0">
+                <a:solidFill>
+                  <a:schemeClr val="bg1"/>
+                </a:solidFill>
+                <a:latin typeface="Tahoma" panose="020B0604030504040204" pitchFamily="34" charset="0"/>
+                <a:ea typeface="Tahoma" panose="020B0604030504040204" pitchFamily="34" charset="0"/>
+                <a:cs typeface="Tahoma" panose="020B0604030504040204" pitchFamily="34" charset="0"/>
+              </a:rPr>
+              <a:t>for user-specified </a:t>
+            </a:r>
+            <a:r>
+              <a:rPr lang="en-GB" sz="2000" b="1" dirty="0" smtClean="0">
+                <a:solidFill>
+                  <a:schemeClr val="bg1"/>
+                </a:solidFill>
+                <a:latin typeface="Tahoma" panose="020B0604030504040204" pitchFamily="34" charset="0"/>
+                <a:ea typeface="Tahoma" panose="020B0604030504040204" pitchFamily="34" charset="0"/>
+                <a:cs typeface="Tahoma" panose="020B0604030504040204" pitchFamily="34" charset="0"/>
+              </a:rPr>
+              <a:t>parameters</a:t>
+            </a:r>
+            <a:endParaRPr lang="en-BE" sz="2000" b="1" dirty="0">
+              <a:solidFill>
+                <a:schemeClr val="bg1"/>
+              </a:solidFill>
+              <a:latin typeface="Tahoma" panose="020B0604030504040204" pitchFamily="34" charset="0"/>
+              <a:ea typeface="Tahoma" panose="020B0604030504040204" pitchFamily="34" charset="0"/>
+              <a:cs typeface="Tahoma" panose="020B0604030504040204" pitchFamily="34" charset="0"/>
+            </a:endParaRPr>
+          </a:p>
+        </p:txBody>
+      </p:sp>
     </p:spTree>
     <p:extLst>
       <p:ext uri="{BB962C8B-B14F-4D97-AF65-F5344CB8AC3E}">
-        <p14:creationId xmlns:p14="http://schemas.microsoft.com/office/powerpoint/2010/main" val="3211413721"/>
+        <p14:creationId xmlns:p14="http://schemas.microsoft.com/office/powerpoint/2010/main" val="134571484"/>
+      </p:ext>
+    </p:extLst>
+  </p:cSld>
+  <p:clrMapOvr>
+    <a:masterClrMapping/>
+  </p:clrMapOvr>
+  <p:timing>
+    <p:tnLst>
+      <p:par>
+        <p:cTn id="1" dur="indefinite" restart="never" nodeType="tmRoot"/>
+      </p:par>
+    </p:tnLst>
+  </p:timing>
+</p:sld>
+</file>
+
+<file path=ppt/slides/slide20.xml><?xml version="1.0" encoding="utf-8"?>
+<p:sld xmlns:a="http://schemas.openxmlformats.org/drawingml/2006/main" xmlns:r="http://schemas.openxmlformats.org/officeDocument/2006/relationships" xmlns:p="http://schemas.openxmlformats.org/presentationml/2006/main">
+  <p:cSld>
+    <p:spTree>
+      <p:nvGrpSpPr>
+        <p:cNvPr id="1" name=""/>
+        <p:cNvGrpSpPr/>
+        <p:nvPr/>
+      </p:nvGrpSpPr>
+      <p:grpSpPr>
+        <a:xfrm>
+          <a:off x="0" y="0"/>
+          <a:ext cx="0" cy="0"/>
+          <a:chOff x="0" y="0"/>
+          <a:chExt cx="0" cy="0"/>
+        </a:xfrm>
+      </p:grpSpPr>
+    </p:spTree>
+    <p:extLst>
+      <p:ext uri="{BB962C8B-B14F-4D97-AF65-F5344CB8AC3E}">
+        <p14:creationId xmlns:p14="http://schemas.microsoft.com/office/powerpoint/2010/main" val="2453554330"/>
       </p:ext>
     </p:extLst>
   </p:cSld>
@@ -4429,7 +4975,189 @@
 </p:sld>
 </file>
 
-<file path=ppt/slides/slide20.xml><?xml version="1.0" encoding="utf-8"?>
+<file path=ppt/slides/slide21.xml><?xml version="1.0" encoding="utf-8"?>
+<p:sld xmlns:a="http://schemas.openxmlformats.org/drawingml/2006/main" xmlns:r="http://schemas.openxmlformats.org/officeDocument/2006/relationships" xmlns:p="http://schemas.openxmlformats.org/presentationml/2006/main">
+  <p:cSld>
+    <p:spTree>
+      <p:nvGrpSpPr>
+        <p:cNvPr id="1" name=""/>
+        <p:cNvGrpSpPr/>
+        <p:nvPr/>
+      </p:nvGrpSpPr>
+      <p:grpSpPr>
+        <a:xfrm>
+          <a:off x="0" y="0"/>
+          <a:ext cx="0" cy="0"/>
+          <a:chOff x="0" y="0"/>
+          <a:chExt cx="0" cy="0"/>
+        </a:xfrm>
+      </p:grpSpPr>
+      <p:sp>
+        <p:nvSpPr>
+          <p:cNvPr id="4" name="Rectangle 3"/>
+          <p:cNvSpPr/>
+          <p:nvPr/>
+        </p:nvSpPr>
+        <p:spPr>
+          <a:xfrm>
+            <a:off x="891396" y="428179"/>
+            <a:ext cx="10409208" cy="369332"/>
+          </a:xfrm>
+          <a:prstGeom prst="rect">
+            <a:avLst/>
+          </a:prstGeom>
+        </p:spPr>
+        <p:txBody>
+          <a:bodyPr wrap="square">
+            <a:spAutoFit/>
+          </a:bodyPr>
+          <a:lstStyle/>
+          <a:p>
+            <a:r>
+              <a:rPr lang="en-GB" b="1" u="sng" dirty="0" smtClean="0">
+                <a:solidFill>
+                  <a:schemeClr val="accent4"/>
+                </a:solidFill>
+                <a:latin typeface="Arial" panose="020B0604020202020204" pitchFamily="34" charset="0"/>
+                <a:cs typeface="Arial" panose="020B0604020202020204" pitchFamily="34" charset="0"/>
+              </a:rPr>
+              <a:t>T</a:t>
+            </a:r>
+            <a:r>
+              <a:rPr lang="en-BE" b="1" u="sng" dirty="0" smtClean="0">
+                <a:solidFill>
+                  <a:schemeClr val="accent4"/>
+                </a:solidFill>
+                <a:latin typeface="Arial" panose="020B0604020202020204" pitchFamily="34" charset="0"/>
+                <a:cs typeface="Arial" panose="020B0604020202020204" pitchFamily="34" charset="0"/>
+              </a:rPr>
+              <a:t>hank you / Q&amp;A</a:t>
+            </a:r>
+            <a:endParaRPr lang="en-BE" b="1" u="sng" dirty="0">
+              <a:solidFill>
+                <a:schemeClr val="accent4"/>
+              </a:solidFill>
+              <a:latin typeface="Arial" panose="020B0604020202020204" pitchFamily="34" charset="0"/>
+              <a:cs typeface="Arial" panose="020B0604020202020204" pitchFamily="34" charset="0"/>
+            </a:endParaRPr>
+          </a:p>
+        </p:txBody>
+      </p:sp>
+    </p:spTree>
+    <p:extLst>
+      <p:ext uri="{BB962C8B-B14F-4D97-AF65-F5344CB8AC3E}">
+        <p14:creationId xmlns:p14="http://schemas.microsoft.com/office/powerpoint/2010/main" val="2326349846"/>
+      </p:ext>
+    </p:extLst>
+  </p:cSld>
+  <p:clrMapOvr>
+    <a:masterClrMapping/>
+  </p:clrMapOvr>
+</p:sld>
+</file>
+
+<file path=ppt/slides/slide22.xml><?xml version="1.0" encoding="utf-8"?>
+<p:sld xmlns:a="http://schemas.openxmlformats.org/drawingml/2006/main" xmlns:r="http://schemas.openxmlformats.org/officeDocument/2006/relationships" xmlns:p="http://schemas.openxmlformats.org/presentationml/2006/main">
+  <p:cSld>
+    <p:spTree>
+      <p:nvGrpSpPr>
+        <p:cNvPr id="1" name=""/>
+        <p:cNvGrpSpPr/>
+        <p:nvPr/>
+      </p:nvGrpSpPr>
+      <p:grpSpPr>
+        <a:xfrm>
+          <a:off x="0" y="0"/>
+          <a:ext cx="0" cy="0"/>
+          <a:chOff x="0" y="0"/>
+          <a:chExt cx="0" cy="0"/>
+        </a:xfrm>
+      </p:grpSpPr>
+    </p:spTree>
+    <p:extLst>
+      <p:ext uri="{BB962C8B-B14F-4D97-AF65-F5344CB8AC3E}">
+        <p14:creationId xmlns:p14="http://schemas.microsoft.com/office/powerpoint/2010/main" val="3388994060"/>
+      </p:ext>
+    </p:extLst>
+  </p:cSld>
+  <p:clrMapOvr>
+    <a:masterClrMapping/>
+  </p:clrMapOvr>
+</p:sld>
+</file>
+
+<file path=ppt/slides/slide23.xml><?xml version="1.0" encoding="utf-8"?>
+<p:sld xmlns:a="http://schemas.openxmlformats.org/drawingml/2006/main" xmlns:r="http://schemas.openxmlformats.org/officeDocument/2006/relationships" xmlns:p="http://schemas.openxmlformats.org/presentationml/2006/main">
+  <p:cSld>
+    <p:spTree>
+      <p:nvGrpSpPr>
+        <p:cNvPr id="1" name=""/>
+        <p:cNvGrpSpPr/>
+        <p:nvPr/>
+      </p:nvGrpSpPr>
+      <p:grpSpPr>
+        <a:xfrm>
+          <a:off x="0" y="0"/>
+          <a:ext cx="0" cy="0"/>
+          <a:chOff x="0" y="0"/>
+          <a:chExt cx="0" cy="0"/>
+        </a:xfrm>
+      </p:grpSpPr>
+      <p:sp>
+        <p:nvSpPr>
+          <p:cNvPr id="2" name="Rectangle 1"/>
+          <p:cNvSpPr/>
+          <p:nvPr/>
+        </p:nvSpPr>
+        <p:spPr>
+          <a:xfrm>
+            <a:off x="891396" y="428179"/>
+            <a:ext cx="10409208" cy="338554"/>
+          </a:xfrm>
+          <a:prstGeom prst="rect">
+            <a:avLst/>
+          </a:prstGeom>
+        </p:spPr>
+        <p:txBody>
+          <a:bodyPr wrap="square">
+            <a:spAutoFit/>
+          </a:bodyPr>
+          <a:lstStyle/>
+          <a:p>
+            <a:r>
+              <a:rPr lang="en-BE" sz="1600" b="1" u="sng" dirty="0" smtClean="0">
+                <a:solidFill>
+                  <a:schemeClr val="accent4"/>
+                </a:solidFill>
+                <a:latin typeface="Arial" panose="020B0604020202020204" pitchFamily="34" charset="0"/>
+                <a:cs typeface="Arial" panose="020B0604020202020204" pitchFamily="34" charset="0"/>
+              </a:rPr>
+              <a:t>APPENDIX</a:t>
+            </a:r>
+            <a:endParaRPr lang="en-GB" sz="1600" b="1" dirty="0">
+              <a:solidFill>
+                <a:schemeClr val="accent4"/>
+              </a:solidFill>
+              <a:latin typeface="Arial" panose="020B0604020202020204" pitchFamily="34" charset="0"/>
+              <a:cs typeface="Arial" panose="020B0604020202020204" pitchFamily="34" charset="0"/>
+            </a:endParaRPr>
+          </a:p>
+        </p:txBody>
+      </p:sp>
+    </p:spTree>
+    <p:extLst>
+      <p:ext uri="{BB962C8B-B14F-4D97-AF65-F5344CB8AC3E}">
+        <p14:creationId xmlns:p14="http://schemas.microsoft.com/office/powerpoint/2010/main" val="3370261199"/>
+      </p:ext>
+    </p:extLst>
+  </p:cSld>
+  <p:clrMapOvr>
+    <a:masterClrMapping/>
+  </p:clrMapOvr>
+</p:sld>
+</file>
+
+<file path=ppt/slides/slide24.xml><?xml version="1.0" encoding="utf-8"?>
 <p:sld xmlns:a="http://schemas.openxmlformats.org/drawingml/2006/main" xmlns:r="http://schemas.openxmlformats.org/officeDocument/2006/relationships" xmlns:p="http://schemas.openxmlformats.org/presentationml/2006/main">
   <p:cSld>
     <p:spTree>
@@ -4459,7 +5187,7 @@
 </p:sld>
 </file>
 
-<file path=ppt/slides/slide21.xml><?xml version="1.0" encoding="utf-8"?>
+<file path=ppt/slides/slide25.xml><?xml version="1.0" encoding="utf-8"?>
 <p:sld xmlns:a="http://schemas.openxmlformats.org/drawingml/2006/main" xmlns:r="http://schemas.openxmlformats.org/officeDocument/2006/relationships" xmlns:p="http://schemas.openxmlformats.org/presentationml/2006/main">
   <p:cSld>
     <p:spTree>
@@ -4952,7 +5680,7 @@
 </p:sld>
 </file>
 
-<file path=ppt/slides/slide22.xml><?xml version="1.0" encoding="utf-8"?>
+<file path=ppt/slides/slide26.xml><?xml version="1.0" encoding="utf-8"?>
 <p:sld xmlns:a="http://schemas.openxmlformats.org/drawingml/2006/main" xmlns:r="http://schemas.openxmlformats.org/officeDocument/2006/relationships" xmlns:p="http://schemas.openxmlformats.org/presentationml/2006/main">
   <p:cSld>
     <p:spTree>
@@ -5001,14 +5729,61 @@
       </p:grpSpPr>
       <p:sp>
         <p:nvSpPr>
-          <p:cNvPr id="2" name="Rectangle 1"/>
+          <p:cNvPr id="2" name="Title 1"/>
+          <p:cNvSpPr>
+            <a:spLocks noGrp="1"/>
+          </p:cNvSpPr>
+          <p:nvPr>
+            <p:ph type="title"/>
+          </p:nvPr>
+        </p:nvSpPr>
+        <p:spPr>
+          <a:xfrm>
+            <a:off x="838200" y="365125"/>
+            <a:ext cx="5040000" cy="1325563"/>
+          </a:xfrm>
+        </p:spPr>
+        <p:txBody>
+          <a:bodyPr>
+            <a:normAutofit/>
+          </a:bodyPr>
+          <a:lstStyle/>
+          <a:p>
+            <a:r>
+              <a:rPr lang="en-BE" sz="3600" b="1" dirty="0" smtClean="0">
+                <a:solidFill>
+                  <a:schemeClr val="accent4"/>
+                </a:solidFill>
+                <a:latin typeface="Tahoma" panose="020B0604030504040204" pitchFamily="34" charset="0"/>
+                <a:ea typeface="Tahoma" panose="020B0604030504040204" pitchFamily="34" charset="0"/>
+                <a:cs typeface="Tahoma" panose="020B0604030504040204" pitchFamily="34" charset="0"/>
+              </a:rPr>
+              <a:t>Coming up...</a:t>
+            </a:r>
+            <a:br>
+              <a:rPr lang="en-BE" sz="3600" b="1" dirty="0" smtClean="0">
+                <a:solidFill>
+                  <a:schemeClr val="accent4"/>
+                </a:solidFill>
+                <a:latin typeface="Tahoma" panose="020B0604030504040204" pitchFamily="34" charset="0"/>
+                <a:ea typeface="Tahoma" panose="020B0604030504040204" pitchFamily="34" charset="0"/>
+                <a:cs typeface="Tahoma" panose="020B0604030504040204" pitchFamily="34" charset="0"/>
+              </a:rPr>
+            </a:br>
+            <a:endParaRPr lang="en-GB" sz="3600" dirty="0"/>
+          </a:p>
+        </p:txBody>
+      </p:sp>
+      <p:sp>
+        <p:nvSpPr>
+          <p:cNvPr id="5" name="Rectangle 4"/>
           <p:cNvSpPr/>
           <p:nvPr/>
         </p:nvSpPr>
         <p:spPr>
           <a:xfrm>
-            <a:off x="891396" y="428179"/>
-            <a:ext cx="10409208" cy="6494085"/>
+            <a:off x="6320670" y="1495525"/>
+            <a:ext cx="5040000" cy="4893647"/>
           </a:xfrm>
           <a:prstGeom prst="rect">
             <a:avLst/>
@@ -5020,772 +5795,258 @@
           </a:bodyPr>
           <a:lstStyle/>
           <a:p>
-            <a:r>
-              <a:rPr lang="en-BE" b="1" u="sng" dirty="0" smtClean="0">
-                <a:solidFill>
-                  <a:schemeClr val="accent4"/>
-                </a:solidFill>
-                <a:latin typeface="Arial" panose="020B0604020202020204" pitchFamily="34" charset="0"/>
-                <a:cs typeface="Arial" panose="020B0604020202020204" pitchFamily="34" charset="0"/>
-              </a:rPr>
-              <a:t>Main research question: </a:t>
-            </a:r>
-            <a:endParaRPr lang="en-GB" b="1" u="sng" dirty="0" smtClean="0">
-              <a:solidFill>
-                <a:schemeClr val="accent4"/>
-              </a:solidFill>
-              <a:latin typeface="Arial" panose="020B0604020202020204" pitchFamily="34" charset="0"/>
-              <a:cs typeface="Arial" panose="020B0604020202020204" pitchFamily="34" charset="0"/>
-            </a:endParaRPr>
-          </a:p>
-          <a:p>
-            <a:r>
-              <a:rPr lang="en-GB" sz="1600" b="1" dirty="0">
-                <a:solidFill>
-                  <a:schemeClr val="bg1"/>
-                </a:solidFill>
-                <a:latin typeface="Arial" panose="020B0604020202020204" pitchFamily="34" charset="0"/>
-                <a:cs typeface="Arial" panose="020B0604020202020204" pitchFamily="34" charset="0"/>
-              </a:rPr>
-              <a:t>What is the unique optimal investment strategy</a:t>
-            </a:r>
-            <a:r>
-              <a:rPr lang="en-BE" sz="1600" b="1" baseline="30000" dirty="0">
-                <a:solidFill>
-                  <a:schemeClr val="bg1"/>
-                </a:solidFill>
-                <a:latin typeface="Arial" panose="020B0604020202020204" pitchFamily="34" charset="0"/>
-                <a:cs typeface="Arial" panose="020B0604020202020204" pitchFamily="34" charset="0"/>
-              </a:rPr>
-              <a:t>1</a:t>
-            </a:r>
-            <a:r>
-              <a:rPr lang="en-GB" sz="1600" b="1" dirty="0">
-                <a:solidFill>
-                  <a:schemeClr val="bg1"/>
-                </a:solidFill>
-                <a:latin typeface="Arial" panose="020B0604020202020204" pitchFamily="34" charset="0"/>
-                <a:cs typeface="Arial" panose="020B0604020202020204" pitchFamily="34" charset="0"/>
-              </a:rPr>
-              <a:t> that corresponds exactly to a given user-specified set of investment parameters</a:t>
-            </a:r>
-            <a:r>
-              <a:rPr lang="en-BE" sz="1600" b="1" dirty="0">
-                <a:solidFill>
-                  <a:schemeClr val="bg1"/>
-                </a:solidFill>
-                <a:latin typeface="Arial" panose="020B0604020202020204" pitchFamily="34" charset="0"/>
-                <a:cs typeface="Arial" panose="020B0604020202020204" pitchFamily="34" charset="0"/>
-              </a:rPr>
-              <a:t>?</a:t>
-            </a:r>
-          </a:p>
-          <a:p>
-            <a:r>
-              <a:rPr lang="en-BE" sz="1600" dirty="0" smtClean="0">
-                <a:solidFill>
-                  <a:schemeClr val="bg1"/>
-                </a:solidFill>
-                <a:latin typeface="Arial" panose="020B0604020202020204" pitchFamily="34" charset="0"/>
-                <a:cs typeface="Arial" panose="020B0604020202020204" pitchFamily="34" charset="0"/>
-              </a:rPr>
-              <a:t> </a:t>
-            </a:r>
-            <a:endParaRPr lang="en-GB" sz="1600" dirty="0" smtClean="0">
-              <a:solidFill>
-                <a:schemeClr val="bg1"/>
-              </a:solidFill>
-              <a:latin typeface="Arial" panose="020B0604020202020204" pitchFamily="34" charset="0"/>
-              <a:cs typeface="Arial" panose="020B0604020202020204" pitchFamily="34" charset="0"/>
-            </a:endParaRPr>
-          </a:p>
-          <a:p>
-            <a:r>
-              <a:rPr lang="en-BE" b="1" u="sng" dirty="0" smtClean="0">
-                <a:solidFill>
-                  <a:schemeClr val="accent4"/>
-                </a:solidFill>
-                <a:latin typeface="Arial" panose="020B0604020202020204" pitchFamily="34" charset="0"/>
-                <a:cs typeface="Arial" panose="020B0604020202020204" pitchFamily="34" charset="0"/>
-              </a:rPr>
-              <a:t>Sub-questions: </a:t>
-            </a:r>
-          </a:p>
-          <a:p>
             <a:pPr marL="457200" indent="-457200">
-              <a:buFont typeface="+mj-lt"/>
               <a:buAutoNum type="arabicPeriod"/>
             </a:pPr>
             <a:r>
-              <a:rPr lang="en-GB" sz="1600" b="1" dirty="0" smtClean="0">
-                <a:solidFill>
-                  <a:schemeClr val="bg1"/>
-                </a:solidFill>
-                <a:latin typeface="Arial" panose="020B0604020202020204" pitchFamily="34" charset="0"/>
-                <a:cs typeface="Arial" panose="020B0604020202020204" pitchFamily="34" charset="0"/>
-              </a:rPr>
-              <a:t>What are relevant </a:t>
-            </a:r>
-            <a:r>
-              <a:rPr lang="en-BE" sz="1600" b="1" dirty="0" smtClean="0">
-                <a:solidFill>
-                  <a:schemeClr val="bg1"/>
-                </a:solidFill>
-                <a:latin typeface="Arial" panose="020B0604020202020204" pitchFamily="34" charset="0"/>
-                <a:cs typeface="Arial" panose="020B0604020202020204" pitchFamily="34" charset="0"/>
-              </a:rPr>
-              <a:t>investment parameters </a:t>
-            </a:r>
-            <a:r>
-              <a:rPr lang="en-GB" sz="1600" dirty="0" smtClean="0">
-                <a:solidFill>
-                  <a:schemeClr val="bg1"/>
-                </a:solidFill>
-                <a:latin typeface="Arial" panose="020B0604020202020204" pitchFamily="34" charset="0"/>
-                <a:cs typeface="Arial" panose="020B0604020202020204" pitchFamily="34" charset="0"/>
-              </a:rPr>
-              <a:t>that determine optimal </a:t>
-            </a:r>
-            <a:r>
-              <a:rPr lang="en-BE" sz="1600" dirty="0" smtClean="0">
-                <a:solidFill>
-                  <a:schemeClr val="bg1"/>
-                </a:solidFill>
-                <a:latin typeface="Arial" panose="020B0604020202020204" pitchFamily="34" charset="0"/>
-                <a:cs typeface="Arial" panose="020B0604020202020204" pitchFamily="34" charset="0"/>
-              </a:rPr>
-              <a:t>corresponding </a:t>
-            </a:r>
-            <a:r>
-              <a:rPr lang="en-GB" sz="1600" dirty="0" smtClean="0">
-                <a:solidFill>
-                  <a:schemeClr val="bg1"/>
-                </a:solidFill>
-                <a:latin typeface="Arial" panose="020B0604020202020204" pitchFamily="34" charset="0"/>
-                <a:cs typeface="Arial" panose="020B0604020202020204" pitchFamily="34" charset="0"/>
-              </a:rPr>
-              <a:t>investment strategy (desired investment objectives, time horizon, future deposits/withdrawals, risk constraints, ESG criteria, asset class restrictions, geographic restrictions, etc.)?</a:t>
-            </a:r>
-            <a:endParaRPr lang="en-BE" sz="1600" dirty="0" smtClean="0">
-              <a:solidFill>
-                <a:schemeClr val="bg1"/>
-              </a:solidFill>
-              <a:latin typeface="Arial" panose="020B0604020202020204" pitchFamily="34" charset="0"/>
-              <a:cs typeface="Arial" panose="020B0604020202020204" pitchFamily="34" charset="0"/>
-            </a:endParaRPr>
+              <a:rPr lang="en-BE" sz="2400" b="1" dirty="0" smtClean="0">
+                <a:solidFill>
+                  <a:schemeClr val="bg1"/>
+                </a:solidFill>
+                <a:latin typeface="Tahoma" panose="020B0604030504040204" pitchFamily="34" charset="0"/>
+                <a:ea typeface="Tahoma" panose="020B0604030504040204" pitchFamily="34" charset="0"/>
+                <a:cs typeface="Tahoma" panose="020B0604030504040204" pitchFamily="34" charset="0"/>
+              </a:rPr>
+              <a:t>Topic</a:t>
+            </a:r>
           </a:p>
           <a:p>
             <a:pPr marL="457200" indent="-457200">
-              <a:buFont typeface="+mj-lt"/>
               <a:buAutoNum type="arabicPeriod"/>
             </a:pPr>
-            <a:r>
-              <a:rPr lang="en-GB" sz="1600" b="1" dirty="0" smtClean="0">
-                <a:solidFill>
-                  <a:schemeClr val="bg1"/>
-                </a:solidFill>
-                <a:latin typeface="Arial" panose="020B0604020202020204" pitchFamily="34" charset="0"/>
-                <a:cs typeface="Arial" panose="020B0604020202020204" pitchFamily="34" charset="0"/>
-              </a:rPr>
-              <a:t>Which securities</a:t>
-            </a:r>
-            <a:r>
-              <a:rPr lang="en-GB" sz="1600" b="1" baseline="30000" dirty="0" smtClean="0">
-                <a:solidFill>
-                  <a:schemeClr val="bg1"/>
-                </a:solidFill>
-                <a:latin typeface="Arial" panose="020B0604020202020204" pitchFamily="34" charset="0"/>
-                <a:cs typeface="Arial" panose="020B0604020202020204" pitchFamily="34" charset="0"/>
-              </a:rPr>
-              <a:t>2</a:t>
-            </a:r>
-            <a:r>
-              <a:rPr lang="en-GB" sz="1600" b="1" dirty="0" smtClean="0">
-                <a:solidFill>
-                  <a:schemeClr val="bg1"/>
-                </a:solidFill>
-                <a:latin typeface="Arial" panose="020B0604020202020204" pitchFamily="34" charset="0"/>
-                <a:cs typeface="Arial" panose="020B0604020202020204" pitchFamily="34" charset="0"/>
-              </a:rPr>
-              <a:t> should be considered </a:t>
-            </a:r>
-            <a:r>
-              <a:rPr lang="en-GB" sz="1600" dirty="0" smtClean="0">
-                <a:solidFill>
-                  <a:schemeClr val="bg1"/>
-                </a:solidFill>
-                <a:latin typeface="Arial" panose="020B0604020202020204" pitchFamily="34" charset="0"/>
-                <a:cs typeface="Arial" panose="020B0604020202020204" pitchFamily="34" charset="0"/>
-              </a:rPr>
-              <a:t>for the investment universe?</a:t>
-            </a:r>
-            <a:endParaRPr lang="en-BE" sz="1600" dirty="0" smtClean="0">
+            <a:endParaRPr lang="en-BE" sz="2400" b="1" dirty="0">
               <a:solidFill>
                 <a:schemeClr val="bg1"/>
               </a:solidFill>
-              <a:latin typeface="Arial" panose="020B0604020202020204" pitchFamily="34" charset="0"/>
-              <a:cs typeface="Arial" panose="020B0604020202020204" pitchFamily="34" charset="0"/>
+              <a:latin typeface="Tahoma" panose="020B0604030504040204" pitchFamily="34" charset="0"/>
+              <a:ea typeface="Tahoma" panose="020B0604030504040204" pitchFamily="34" charset="0"/>
+              <a:cs typeface="Tahoma" panose="020B0604030504040204" pitchFamily="34" charset="0"/>
             </a:endParaRPr>
           </a:p>
           <a:p>
             <a:pPr marL="457200" indent="-457200">
-              <a:buFont typeface="+mj-lt"/>
               <a:buAutoNum type="arabicPeriod"/>
             </a:pPr>
             <a:r>
-              <a:rPr lang="en-GB" sz="1600" b="1" dirty="0" smtClean="0">
-                <a:solidFill>
-                  <a:schemeClr val="bg1"/>
-                </a:solidFill>
-                <a:latin typeface="Arial" panose="020B0604020202020204" pitchFamily="34" charset="0"/>
-                <a:cs typeface="Arial" panose="020B0604020202020204" pitchFamily="34" charset="0"/>
-              </a:rPr>
-              <a:t>What are the desired criteria </a:t>
-            </a:r>
-            <a:r>
-              <a:rPr lang="en-GB" sz="1600" dirty="0" smtClean="0">
-                <a:solidFill>
-                  <a:schemeClr val="bg1"/>
-                </a:solidFill>
-                <a:latin typeface="Arial" panose="020B0604020202020204" pitchFamily="34" charset="0"/>
-                <a:cs typeface="Arial" panose="020B0604020202020204" pitchFamily="34" charset="0"/>
-              </a:rPr>
-              <a:t>for model accuracy and computational efficiency?</a:t>
-            </a:r>
-            <a:r>
-              <a:rPr lang="en-BE" sz="1600" dirty="0">
-                <a:solidFill>
-                  <a:schemeClr val="bg1"/>
-                </a:solidFill>
-                <a:latin typeface="Arial" panose="020B0604020202020204" pitchFamily="34" charset="0"/>
-                <a:cs typeface="Arial" panose="020B0604020202020204" pitchFamily="34" charset="0"/>
-              </a:rPr>
-              <a:t/>
-            </a:r>
-            <a:br>
-              <a:rPr lang="en-BE" sz="1600" dirty="0">
-                <a:solidFill>
-                  <a:schemeClr val="bg1"/>
-                </a:solidFill>
-                <a:latin typeface="Arial" panose="020B0604020202020204" pitchFamily="34" charset="0"/>
-                <a:cs typeface="Arial" panose="020B0604020202020204" pitchFamily="34" charset="0"/>
-              </a:rPr>
-            </a:br>
-            <a:r>
-              <a:rPr lang="en-GB" sz="1600" dirty="0" smtClean="0">
-                <a:solidFill>
-                  <a:schemeClr val="bg1"/>
-                </a:solidFill>
-                <a:latin typeface="Arial" panose="020B0604020202020204" pitchFamily="34" charset="0"/>
-                <a:cs typeface="Arial" panose="020B0604020202020204" pitchFamily="34" charset="0"/>
-              </a:rPr>
-              <a:t>How to </a:t>
-            </a:r>
-            <a:r>
-              <a:rPr lang="en-GB" sz="1600" b="1" dirty="0" smtClean="0">
-                <a:solidFill>
-                  <a:schemeClr val="bg1"/>
-                </a:solidFill>
-                <a:latin typeface="Arial" panose="020B0604020202020204" pitchFamily="34" charset="0"/>
-                <a:cs typeface="Arial" panose="020B0604020202020204" pitchFamily="34" charset="0"/>
-              </a:rPr>
-              <a:t>balance </a:t>
-            </a:r>
-            <a:r>
-              <a:rPr lang="en-BE" sz="1600" b="1" dirty="0" smtClean="0">
-                <a:solidFill>
-                  <a:schemeClr val="bg1"/>
-                </a:solidFill>
-                <a:latin typeface="Arial" panose="020B0604020202020204" pitchFamily="34" charset="0"/>
-                <a:cs typeface="Arial" panose="020B0604020202020204" pitchFamily="34" charset="0"/>
-              </a:rPr>
-              <a:t>these two factors</a:t>
-            </a:r>
-            <a:r>
-              <a:rPr lang="en-GB" sz="1600" dirty="0" smtClean="0">
-                <a:solidFill>
-                  <a:schemeClr val="bg1"/>
-                </a:solidFill>
-                <a:latin typeface="Arial" panose="020B0604020202020204" pitchFamily="34" charset="0"/>
-                <a:cs typeface="Arial" panose="020B0604020202020204" pitchFamily="34" charset="0"/>
-              </a:rPr>
-              <a:t>?</a:t>
-            </a:r>
-            <a:endParaRPr lang="en-BE" sz="1600" dirty="0" smtClean="0">
-              <a:solidFill>
-                <a:schemeClr val="bg1"/>
-              </a:solidFill>
-              <a:latin typeface="Arial" panose="020B0604020202020204" pitchFamily="34" charset="0"/>
-              <a:cs typeface="Arial" panose="020B0604020202020204" pitchFamily="34" charset="0"/>
-            </a:endParaRPr>
+              <a:rPr lang="en-BE" sz="2400" b="1" dirty="0" smtClean="0">
+                <a:solidFill>
+                  <a:schemeClr val="bg1"/>
+                </a:solidFill>
+                <a:latin typeface="Tahoma" panose="020B0604030504040204" pitchFamily="34" charset="0"/>
+                <a:ea typeface="Tahoma" panose="020B0604030504040204" pitchFamily="34" charset="0"/>
+                <a:cs typeface="Tahoma" panose="020B0604030504040204" pitchFamily="34" charset="0"/>
+              </a:rPr>
+              <a:t>Topic</a:t>
+            </a:r>
           </a:p>
           <a:p>
             <a:pPr marL="457200" indent="-457200">
-              <a:buFont typeface="+mj-lt"/>
               <a:buAutoNum type="arabicPeriod"/>
             </a:pPr>
-            <a:r>
-              <a:rPr lang="en-GB" sz="1600" b="1" dirty="0" smtClean="0">
-                <a:solidFill>
-                  <a:schemeClr val="bg1"/>
-                </a:solidFill>
-                <a:latin typeface="Arial" panose="020B0604020202020204" pitchFamily="34" charset="0"/>
-                <a:cs typeface="Arial" panose="020B0604020202020204" pitchFamily="34" charset="0"/>
-              </a:rPr>
-              <a:t>What is the optimal approach to restricting the possible combinations of securities</a:t>
-            </a:r>
-            <a:r>
-              <a:rPr lang="en-GB" sz="1600" b="1" baseline="30000" dirty="0" smtClean="0">
-                <a:solidFill>
-                  <a:schemeClr val="bg1"/>
-                </a:solidFill>
-                <a:latin typeface="Arial" panose="020B0604020202020204" pitchFamily="34" charset="0"/>
-                <a:cs typeface="Arial" panose="020B0604020202020204" pitchFamily="34" charset="0"/>
-              </a:rPr>
-              <a:t>3</a:t>
-            </a:r>
-            <a:r>
-              <a:rPr lang="en-GB" sz="1600" b="1" dirty="0" smtClean="0">
-                <a:solidFill>
-                  <a:schemeClr val="bg1"/>
-                </a:solidFill>
-                <a:latin typeface="Arial" panose="020B0604020202020204" pitchFamily="34" charset="0"/>
-                <a:cs typeface="Arial" panose="020B0604020202020204" pitchFamily="34" charset="0"/>
-              </a:rPr>
-              <a:t> </a:t>
-            </a:r>
-            <a:r>
-              <a:rPr lang="en-GB" sz="1600" dirty="0" smtClean="0">
-                <a:solidFill>
-                  <a:schemeClr val="bg1"/>
-                </a:solidFill>
-                <a:latin typeface="Arial" panose="020B0604020202020204" pitchFamily="34" charset="0"/>
-                <a:cs typeface="Arial" panose="020B0604020202020204" pitchFamily="34" charset="0"/>
-              </a:rPr>
-              <a:t>(so that model accuracy and computational efficiency are well-balanced)?</a:t>
-            </a:r>
-            <a:endParaRPr lang="en-BE" sz="1600" dirty="0" smtClean="0">
+            <a:endParaRPr lang="en-BE" sz="2400" b="1" dirty="0">
               <a:solidFill>
                 <a:schemeClr val="bg1"/>
               </a:solidFill>
-              <a:latin typeface="Arial" panose="020B0604020202020204" pitchFamily="34" charset="0"/>
-              <a:cs typeface="Arial" panose="020B0604020202020204" pitchFamily="34" charset="0"/>
+              <a:latin typeface="Tahoma" panose="020B0604030504040204" pitchFamily="34" charset="0"/>
+              <a:ea typeface="Tahoma" panose="020B0604030504040204" pitchFamily="34" charset="0"/>
+              <a:cs typeface="Tahoma" panose="020B0604030504040204" pitchFamily="34" charset="0"/>
             </a:endParaRPr>
           </a:p>
           <a:p>
             <a:pPr marL="457200" indent="-457200">
-              <a:buFont typeface="+mj-lt"/>
               <a:buAutoNum type="arabicPeriod"/>
             </a:pPr>
             <a:r>
-              <a:rPr lang="en-GB" sz="1600" b="1" dirty="0" smtClean="0">
-                <a:solidFill>
-                  <a:schemeClr val="bg1"/>
-                </a:solidFill>
-                <a:latin typeface="Arial" panose="020B0604020202020204" pitchFamily="34" charset="0"/>
-                <a:cs typeface="Arial" panose="020B0604020202020204" pitchFamily="34" charset="0"/>
-              </a:rPr>
-              <a:t>How to determine an optimal investment strategy by comparing equal-length portfolio return series</a:t>
-            </a:r>
-            <a:r>
-              <a:rPr lang="en-GB" sz="1600" b="1" baseline="30000" dirty="0" smtClean="0">
-                <a:solidFill>
-                  <a:schemeClr val="bg1"/>
-                </a:solidFill>
-                <a:latin typeface="Arial" panose="020B0604020202020204" pitchFamily="34" charset="0"/>
-                <a:cs typeface="Arial" panose="020B0604020202020204" pitchFamily="34" charset="0"/>
-              </a:rPr>
-              <a:t>4</a:t>
-            </a:r>
-            <a:r>
-              <a:rPr lang="en-GB" sz="1600" b="1" dirty="0" smtClean="0">
-                <a:solidFill>
-                  <a:schemeClr val="bg1"/>
-                </a:solidFill>
-                <a:latin typeface="Arial" panose="020B0604020202020204" pitchFamily="34" charset="0"/>
-                <a:cs typeface="Arial" panose="020B0604020202020204" pitchFamily="34" charset="0"/>
-              </a:rPr>
-              <a:t>  of each candidate investment strategy</a:t>
-            </a:r>
-            <a:r>
-              <a:rPr lang="en-GB" sz="1600" b="1" baseline="30000" dirty="0" smtClean="0">
-                <a:solidFill>
-                  <a:schemeClr val="bg1"/>
-                </a:solidFill>
-                <a:latin typeface="Arial" panose="020B0604020202020204" pitchFamily="34" charset="0"/>
-                <a:cs typeface="Arial" panose="020B0604020202020204" pitchFamily="34" charset="0"/>
-              </a:rPr>
-              <a:t>5</a:t>
-            </a:r>
-            <a:r>
-              <a:rPr lang="en-GB" sz="1600" dirty="0" smtClean="0">
-                <a:solidFill>
-                  <a:schemeClr val="bg1"/>
-                </a:solidFill>
-                <a:latin typeface="Arial" panose="020B0604020202020204" pitchFamily="34" charset="0"/>
-                <a:cs typeface="Arial" panose="020B0604020202020204" pitchFamily="34" charset="0"/>
-              </a:rPr>
-              <a:t>? </a:t>
-            </a:r>
-            <a:r>
-              <a:rPr lang="en-BE" sz="1600" dirty="0" smtClean="0">
-                <a:solidFill>
-                  <a:schemeClr val="bg1"/>
-                </a:solidFill>
-                <a:latin typeface="Arial" panose="020B0604020202020204" pitchFamily="34" charset="0"/>
-                <a:cs typeface="Arial" panose="020B0604020202020204" pitchFamily="34" charset="0"/>
-              </a:rPr>
-              <a:t/>
-            </a:r>
-            <a:br>
-              <a:rPr lang="en-BE" sz="1600" dirty="0" smtClean="0">
-                <a:solidFill>
-                  <a:schemeClr val="bg1"/>
-                </a:solidFill>
-                <a:latin typeface="Arial" panose="020B0604020202020204" pitchFamily="34" charset="0"/>
-                <a:cs typeface="Arial" panose="020B0604020202020204" pitchFamily="34" charset="0"/>
-              </a:rPr>
-            </a:br>
-            <a:r>
-              <a:rPr lang="en-GB" sz="1600" dirty="0" smtClean="0">
-                <a:solidFill>
-                  <a:schemeClr val="bg1"/>
-                </a:solidFill>
-                <a:latin typeface="Arial" panose="020B0604020202020204" pitchFamily="34" charset="0"/>
-                <a:cs typeface="Arial" panose="020B0604020202020204" pitchFamily="34" charset="0"/>
-              </a:rPr>
-              <a:t>How do we include measures such as maximum drawdown, drawdown length and conditional </a:t>
-            </a:r>
-            <a:r>
-              <a:rPr lang="en-GB" sz="1600" dirty="0" err="1" smtClean="0">
-                <a:solidFill>
-                  <a:schemeClr val="bg1"/>
-                </a:solidFill>
-                <a:latin typeface="Arial" panose="020B0604020202020204" pitchFamily="34" charset="0"/>
-                <a:cs typeface="Arial" panose="020B0604020202020204" pitchFamily="34" charset="0"/>
-              </a:rPr>
-              <a:t>VaR</a:t>
-            </a:r>
-            <a:r>
-              <a:rPr lang="en-GB" sz="1600" dirty="0" smtClean="0">
-                <a:solidFill>
-                  <a:schemeClr val="bg1"/>
-                </a:solidFill>
-                <a:latin typeface="Arial" panose="020B0604020202020204" pitchFamily="34" charset="0"/>
-                <a:cs typeface="Arial" panose="020B0604020202020204" pitchFamily="34" charset="0"/>
-              </a:rPr>
-              <a:t> into such an evaluation?</a:t>
-            </a:r>
-            <a:endParaRPr lang="en-BE" sz="1600" dirty="0" smtClean="0">
-              <a:solidFill>
-                <a:schemeClr val="bg1"/>
-              </a:solidFill>
-              <a:latin typeface="Arial" panose="020B0604020202020204" pitchFamily="34" charset="0"/>
-              <a:cs typeface="Arial" panose="020B0604020202020204" pitchFamily="34" charset="0"/>
-            </a:endParaRPr>
+              <a:rPr lang="en-BE" sz="2400" b="1" dirty="0">
+                <a:solidFill>
+                  <a:schemeClr val="bg1"/>
+                </a:solidFill>
+                <a:latin typeface="Tahoma" panose="020B0604030504040204" pitchFamily="34" charset="0"/>
+                <a:ea typeface="Tahoma" panose="020B0604030504040204" pitchFamily="34" charset="0"/>
+                <a:cs typeface="Tahoma" panose="020B0604030504040204" pitchFamily="34" charset="0"/>
+              </a:rPr>
+              <a:t>Topic</a:t>
+            </a:r>
           </a:p>
           <a:p>
             <a:pPr marL="457200" indent="-457200">
-              <a:buFont typeface="+mj-lt"/>
               <a:buAutoNum type="arabicPeriod"/>
             </a:pPr>
-            <a:r>
-              <a:rPr lang="en-GB" sz="1600" b="1" dirty="0" smtClean="0">
-                <a:solidFill>
-                  <a:schemeClr val="bg1"/>
-                </a:solidFill>
-                <a:latin typeface="Arial" panose="020B0604020202020204" pitchFamily="34" charset="0"/>
-                <a:cs typeface="Arial" panose="020B0604020202020204" pitchFamily="34" charset="0"/>
-              </a:rPr>
-              <a:t>What are the optimal estimation method</a:t>
-            </a:r>
-            <a:r>
-              <a:rPr lang="en-GB" sz="1600" b="1" baseline="30000" dirty="0" smtClean="0">
-                <a:solidFill>
-                  <a:schemeClr val="bg1"/>
-                </a:solidFill>
-                <a:latin typeface="Arial" panose="020B0604020202020204" pitchFamily="34" charset="0"/>
-                <a:cs typeface="Arial" panose="020B0604020202020204" pitchFamily="34" charset="0"/>
-              </a:rPr>
-              <a:t>6</a:t>
-            </a:r>
-            <a:r>
-              <a:rPr lang="en-GB" sz="1600" b="1" dirty="0" smtClean="0">
-                <a:solidFill>
-                  <a:schemeClr val="bg1"/>
-                </a:solidFill>
-                <a:latin typeface="Arial" panose="020B0604020202020204" pitchFamily="34" charset="0"/>
-                <a:cs typeface="Arial" panose="020B0604020202020204" pitchFamily="34" charset="0"/>
-              </a:rPr>
-              <a:t> and corresponding specification</a:t>
-            </a:r>
-            <a:r>
-              <a:rPr lang="en-GB" sz="1600" b="1" baseline="30000" dirty="0" smtClean="0">
-                <a:solidFill>
-                  <a:schemeClr val="bg1"/>
-                </a:solidFill>
-                <a:latin typeface="Arial" panose="020B0604020202020204" pitchFamily="34" charset="0"/>
-                <a:cs typeface="Arial" panose="020B0604020202020204" pitchFamily="34" charset="0"/>
-              </a:rPr>
-              <a:t>7</a:t>
-            </a:r>
-            <a:r>
-              <a:rPr lang="en-GB" sz="1600" b="1" dirty="0" smtClean="0">
-                <a:solidFill>
-                  <a:schemeClr val="bg1"/>
-                </a:solidFill>
-                <a:latin typeface="Arial" panose="020B0604020202020204" pitchFamily="34" charset="0"/>
-                <a:cs typeface="Arial" panose="020B0604020202020204" pitchFamily="34" charset="0"/>
-              </a:rPr>
-              <a:t> </a:t>
-            </a:r>
-            <a:r>
-              <a:rPr lang="en-GB" sz="1600" dirty="0" smtClean="0">
-                <a:solidFill>
-                  <a:schemeClr val="bg1"/>
-                </a:solidFill>
-                <a:latin typeface="Arial" panose="020B0604020202020204" pitchFamily="34" charset="0"/>
-                <a:cs typeface="Arial" panose="020B0604020202020204" pitchFamily="34" charset="0"/>
-              </a:rPr>
-              <a:t>for determining the optimal investment strategy? </a:t>
-            </a:r>
-            <a:endParaRPr lang="en-BE" sz="1600" dirty="0" smtClean="0">
+            <a:endParaRPr lang="en-BE" sz="2400" b="1" dirty="0" smtClean="0">
               <a:solidFill>
                 <a:schemeClr val="bg1"/>
               </a:solidFill>
-              <a:latin typeface="Arial" panose="020B0604020202020204" pitchFamily="34" charset="0"/>
-              <a:cs typeface="Arial" panose="020B0604020202020204" pitchFamily="34" charset="0"/>
+              <a:latin typeface="Tahoma" panose="020B0604030504040204" pitchFamily="34" charset="0"/>
+              <a:ea typeface="Tahoma" panose="020B0604030504040204" pitchFamily="34" charset="0"/>
+              <a:cs typeface="Tahoma" panose="020B0604030504040204" pitchFamily="34" charset="0"/>
             </a:endParaRPr>
           </a:p>
           <a:p>
             <a:pPr marL="457200" indent="-457200">
-              <a:buFont typeface="+mj-lt"/>
               <a:buAutoNum type="arabicPeriod"/>
             </a:pPr>
             <a:r>
-              <a:rPr lang="en-GB" sz="1600" b="1" dirty="0" smtClean="0">
-                <a:solidFill>
-                  <a:schemeClr val="bg1"/>
-                </a:solidFill>
-                <a:latin typeface="Arial" panose="020B0604020202020204" pitchFamily="34" charset="0"/>
-                <a:cs typeface="Arial" panose="020B0604020202020204" pitchFamily="34" charset="0"/>
-              </a:rPr>
-              <a:t>How to validate the robustness and statistical reliability </a:t>
-            </a:r>
-            <a:r>
-              <a:rPr lang="en-GB" sz="1600" dirty="0" smtClean="0">
-                <a:solidFill>
-                  <a:schemeClr val="bg1"/>
-                </a:solidFill>
-                <a:latin typeface="Arial" panose="020B0604020202020204" pitchFamily="34" charset="0"/>
-                <a:cs typeface="Arial" panose="020B0604020202020204" pitchFamily="34" charset="0"/>
-              </a:rPr>
-              <a:t>of the </a:t>
-            </a:r>
-            <a:r>
-              <a:rPr lang="en-BE" sz="1600" dirty="0" smtClean="0">
-                <a:solidFill>
-                  <a:schemeClr val="bg1"/>
-                </a:solidFill>
-                <a:latin typeface="Arial" panose="020B0604020202020204" pitchFamily="34" charset="0"/>
-                <a:cs typeface="Arial" panose="020B0604020202020204" pitchFamily="34" charset="0"/>
-              </a:rPr>
-              <a:t>optimal </a:t>
-            </a:r>
-            <a:r>
-              <a:rPr lang="en-GB" sz="1600" dirty="0" smtClean="0">
-                <a:solidFill>
-                  <a:schemeClr val="bg1"/>
-                </a:solidFill>
-                <a:latin typeface="Arial" panose="020B0604020202020204" pitchFamily="34" charset="0"/>
-                <a:cs typeface="Arial" panose="020B0604020202020204" pitchFamily="34" charset="0"/>
-              </a:rPr>
-              <a:t>investment strategy?</a:t>
+              <a:rPr lang="en-BE" sz="2400" b="1" dirty="0">
+                <a:solidFill>
+                  <a:schemeClr val="bg1"/>
+                </a:solidFill>
+                <a:latin typeface="Tahoma" panose="020B0604030504040204" pitchFamily="34" charset="0"/>
+                <a:ea typeface="Tahoma" panose="020B0604030504040204" pitchFamily="34" charset="0"/>
+                <a:cs typeface="Tahoma" panose="020B0604030504040204" pitchFamily="34" charset="0"/>
+              </a:rPr>
+              <a:t>Topic</a:t>
             </a:r>
           </a:p>
           <a:p>
             <a:pPr marL="457200" indent="-457200">
-              <a:buFont typeface="+mj-lt"/>
               <a:buAutoNum type="arabicPeriod"/>
             </a:pPr>
-            <a:r>
-              <a:rPr lang="en-GB" sz="1600" b="1" dirty="0" smtClean="0">
-                <a:solidFill>
-                  <a:schemeClr val="bg1"/>
-                </a:solidFill>
-                <a:latin typeface="Arial" panose="020B0604020202020204" pitchFamily="34" charset="0"/>
-                <a:cs typeface="Arial" panose="020B0604020202020204" pitchFamily="34" charset="0"/>
-              </a:rPr>
-              <a:t>How to account for inflation and foreign exchange </a:t>
-            </a:r>
-            <a:r>
-              <a:rPr lang="en-GB" sz="1600" b="1" dirty="0" err="1" smtClean="0">
-                <a:solidFill>
-                  <a:schemeClr val="bg1"/>
-                </a:solidFill>
-                <a:latin typeface="Arial" panose="020B0604020202020204" pitchFamily="34" charset="0"/>
-                <a:cs typeface="Arial" panose="020B0604020202020204" pitchFamily="34" charset="0"/>
-              </a:rPr>
-              <a:t>movemen</a:t>
-            </a:r>
-            <a:r>
-              <a:rPr lang="en-BE" sz="1600" b="1" dirty="0" smtClean="0">
-                <a:solidFill>
-                  <a:schemeClr val="bg1"/>
-                </a:solidFill>
-                <a:latin typeface="Arial" panose="020B0604020202020204" pitchFamily="34" charset="0"/>
-                <a:cs typeface="Arial" panose="020B0604020202020204" pitchFamily="34" charset="0"/>
-              </a:rPr>
-              <a:t>t</a:t>
-            </a:r>
-            <a:r>
-              <a:rPr lang="en-GB" sz="1600" b="1" dirty="0" smtClean="0">
-                <a:solidFill>
-                  <a:schemeClr val="bg1"/>
-                </a:solidFill>
-                <a:latin typeface="Arial" panose="020B0604020202020204" pitchFamily="34" charset="0"/>
-                <a:cs typeface="Arial" panose="020B0604020202020204" pitchFamily="34" charset="0"/>
-              </a:rPr>
-              <a:t>s </a:t>
-            </a:r>
-            <a:r>
-              <a:rPr lang="en-GB" sz="1600" dirty="0" smtClean="0">
-                <a:solidFill>
-                  <a:schemeClr val="bg1"/>
-                </a:solidFill>
-                <a:latin typeface="Arial" panose="020B0604020202020204" pitchFamily="34" charset="0"/>
-                <a:cs typeface="Arial" panose="020B0604020202020204" pitchFamily="34" charset="0"/>
-              </a:rPr>
-              <a:t>when determining the optimal investment strategy?</a:t>
-            </a:r>
-            <a:endParaRPr lang="en-BE" sz="1600" dirty="0" smtClean="0">
+            <a:endParaRPr lang="en-BE" sz="2400" b="1" dirty="0" smtClean="0">
               <a:solidFill>
                 <a:schemeClr val="bg1"/>
               </a:solidFill>
-              <a:latin typeface="Arial" panose="020B0604020202020204" pitchFamily="34" charset="0"/>
-              <a:cs typeface="Arial" panose="020B0604020202020204" pitchFamily="34" charset="0"/>
+              <a:latin typeface="Tahoma" panose="020B0604030504040204" pitchFamily="34" charset="0"/>
+              <a:ea typeface="Tahoma" panose="020B0604030504040204" pitchFamily="34" charset="0"/>
+              <a:cs typeface="Tahoma" panose="020B0604030504040204" pitchFamily="34" charset="0"/>
             </a:endParaRPr>
           </a:p>
           <a:p>
             <a:pPr marL="457200" indent="-457200">
-              <a:buFont typeface="+mj-lt"/>
               <a:buAutoNum type="arabicPeriod"/>
             </a:pPr>
             <a:r>
-              <a:rPr lang="en-GB" sz="1600" b="1" dirty="0" smtClean="0">
-                <a:solidFill>
-                  <a:schemeClr val="bg1"/>
-                </a:solidFill>
-                <a:latin typeface="Arial" panose="020B0604020202020204" pitchFamily="34" charset="0"/>
-                <a:cs typeface="Arial" panose="020B0604020202020204" pitchFamily="34" charset="0"/>
-              </a:rPr>
-              <a:t>What are the theoretical underpinnings and assumptions </a:t>
-            </a:r>
-            <a:r>
-              <a:rPr lang="en-GB" sz="1600" dirty="0" smtClean="0">
-                <a:solidFill>
-                  <a:schemeClr val="bg1"/>
-                </a:solidFill>
-                <a:latin typeface="Arial" panose="020B0604020202020204" pitchFamily="34" charset="0"/>
-                <a:cs typeface="Arial" panose="020B0604020202020204" pitchFamily="34" charset="0"/>
-              </a:rPr>
-              <a:t>of the optimization model?</a:t>
+              <a:rPr lang="en-BE" sz="2400" b="1" dirty="0">
+                <a:solidFill>
+                  <a:schemeClr val="bg1"/>
+                </a:solidFill>
+                <a:latin typeface="Tahoma" panose="020B0604030504040204" pitchFamily="34" charset="0"/>
+                <a:ea typeface="Tahoma" panose="020B0604030504040204" pitchFamily="34" charset="0"/>
+                <a:cs typeface="Tahoma" panose="020B0604030504040204" pitchFamily="34" charset="0"/>
+              </a:rPr>
+              <a:t>Topic</a:t>
             </a:r>
           </a:p>
           <a:p>
             <a:pPr marL="457200" indent="-457200">
-              <a:buFont typeface="+mj-lt"/>
               <a:buAutoNum type="arabicPeriod"/>
             </a:pPr>
-            <a:r>
-              <a:rPr lang="en-GB" sz="1600" b="1" dirty="0" smtClean="0">
-                <a:solidFill>
-                  <a:schemeClr val="bg1"/>
-                </a:solidFill>
-                <a:latin typeface="Arial" panose="020B0604020202020204" pitchFamily="34" charset="0"/>
-                <a:cs typeface="Arial" panose="020B0604020202020204" pitchFamily="34" charset="0"/>
-              </a:rPr>
-              <a:t>What are potential drawbacks and limitations</a:t>
-            </a:r>
-            <a:r>
-              <a:rPr lang="en-GB" sz="1600" dirty="0" smtClean="0">
-                <a:solidFill>
-                  <a:schemeClr val="bg1"/>
-                </a:solidFill>
-                <a:latin typeface="Arial" panose="020B0604020202020204" pitchFamily="34" charset="0"/>
-                <a:cs typeface="Arial" panose="020B0604020202020204" pitchFamily="34" charset="0"/>
-              </a:rPr>
-              <a:t> of the model when applied to real-life investments</a:t>
-            </a:r>
-            <a:r>
-              <a:rPr lang="en-BE" sz="1600" dirty="0" smtClean="0">
-                <a:solidFill>
-                  <a:schemeClr val="bg1"/>
-                </a:solidFill>
-                <a:latin typeface="Arial" panose="020B0604020202020204" pitchFamily="34" charset="0"/>
-                <a:cs typeface="Arial" panose="020B0604020202020204" pitchFamily="34" charset="0"/>
-              </a:rPr>
-              <a:t>?</a:t>
-            </a:r>
-            <a:br>
-              <a:rPr lang="en-BE" sz="1600" dirty="0" smtClean="0">
-                <a:solidFill>
-                  <a:schemeClr val="bg1"/>
-                </a:solidFill>
-                <a:latin typeface="Arial" panose="020B0604020202020204" pitchFamily="34" charset="0"/>
-                <a:cs typeface="Arial" panose="020B0604020202020204" pitchFamily="34" charset="0"/>
-              </a:rPr>
-            </a:br>
-            <a:r>
-              <a:rPr lang="en-BE" sz="1600" b="1" dirty="0" smtClean="0">
-                <a:solidFill>
-                  <a:schemeClr val="bg1"/>
-                </a:solidFill>
-                <a:latin typeface="Arial" panose="020B0604020202020204" pitchFamily="34" charset="0"/>
-                <a:cs typeface="Arial" panose="020B0604020202020204" pitchFamily="34" charset="0"/>
-              </a:rPr>
-              <a:t>How </a:t>
-            </a:r>
-            <a:r>
-              <a:rPr lang="en-GB" sz="1600" b="1" dirty="0" smtClean="0">
-                <a:solidFill>
-                  <a:schemeClr val="bg1"/>
-                </a:solidFill>
-                <a:latin typeface="Arial" panose="020B0604020202020204" pitchFamily="34" charset="0"/>
-                <a:cs typeface="Arial" panose="020B0604020202020204" pitchFamily="34" charset="0"/>
-              </a:rPr>
-              <a:t>can these be addressed or mitigated</a:t>
-            </a:r>
-            <a:r>
-              <a:rPr lang="en-GB" sz="1600" dirty="0" smtClean="0">
-                <a:solidFill>
-                  <a:schemeClr val="bg1"/>
-                </a:solidFill>
-                <a:latin typeface="Arial" panose="020B0604020202020204" pitchFamily="34" charset="0"/>
-                <a:cs typeface="Arial" panose="020B0604020202020204" pitchFamily="34" charset="0"/>
-              </a:rPr>
-              <a:t>?</a:t>
-            </a:r>
-            <a:endParaRPr lang="en-GB" sz="1600" dirty="0">
+            <a:endParaRPr lang="en-BE" sz="2400" b="1" dirty="0" smtClean="0">
               <a:solidFill>
                 <a:schemeClr val="bg1"/>
               </a:solidFill>
-              <a:latin typeface="Arial" panose="020B0604020202020204" pitchFamily="34" charset="0"/>
-              <a:cs typeface="Arial" panose="020B0604020202020204" pitchFamily="34" charset="0"/>
-            </a:endParaRPr>
-          </a:p>
-        </p:txBody>
-      </p:sp>
+              <a:latin typeface="Tahoma" panose="020B0604030504040204" pitchFamily="34" charset="0"/>
+              <a:ea typeface="Tahoma" panose="020B0604030504040204" pitchFamily="34" charset="0"/>
+              <a:cs typeface="Tahoma" panose="020B0604030504040204" pitchFamily="34" charset="0"/>
+            </a:endParaRPr>
+          </a:p>
+          <a:p>
+            <a:pPr marL="457200" indent="-457200">
+              <a:buAutoNum type="arabicPeriod"/>
+            </a:pPr>
+            <a:r>
+              <a:rPr lang="en-BE" sz="2400" b="1" dirty="0">
+                <a:solidFill>
+                  <a:schemeClr val="bg1"/>
+                </a:solidFill>
+                <a:latin typeface="Tahoma" panose="020B0604030504040204" pitchFamily="34" charset="0"/>
+                <a:ea typeface="Tahoma" panose="020B0604030504040204" pitchFamily="34" charset="0"/>
+                <a:cs typeface="Tahoma" panose="020B0604030504040204" pitchFamily="34" charset="0"/>
+              </a:rPr>
+              <a:t>Topic</a:t>
+            </a:r>
+          </a:p>
+          <a:p>
+            <a:pPr marL="457200" indent="-457200">
+              <a:buAutoNum type="arabicPeriod"/>
+            </a:pPr>
+            <a:endParaRPr lang="en-BE" sz="2400" b="1" dirty="0" smtClean="0">
+              <a:solidFill>
+                <a:schemeClr val="bg1"/>
+              </a:solidFill>
+              <a:latin typeface="Tahoma" panose="020B0604030504040204" pitchFamily="34" charset="0"/>
+              <a:ea typeface="Tahoma" panose="020B0604030504040204" pitchFamily="34" charset="0"/>
+              <a:cs typeface="Tahoma" panose="020B0604030504040204" pitchFamily="34" charset="0"/>
+            </a:endParaRPr>
+          </a:p>
+          <a:p>
+            <a:pPr marL="457200" indent="-457200">
+              <a:buAutoNum type="arabicPeriod"/>
+            </a:pPr>
+            <a:r>
+              <a:rPr lang="en-BE" sz="2400" b="1" dirty="0" smtClean="0">
+                <a:solidFill>
+                  <a:schemeClr val="bg1"/>
+                </a:solidFill>
+                <a:latin typeface="Tahoma" panose="020B0604030504040204" pitchFamily="34" charset="0"/>
+                <a:ea typeface="Tahoma" panose="020B0604030504040204" pitchFamily="34" charset="0"/>
+                <a:cs typeface="Tahoma" panose="020B0604030504040204" pitchFamily="34" charset="0"/>
+              </a:rPr>
+              <a:t>Topic</a:t>
+            </a:r>
+          </a:p>
+        </p:txBody>
+      </p:sp>
+      <p:pic>
+        <p:nvPicPr>
+          <p:cNvPr id="13" name="Content Placeholder 10"/>
+          <p:cNvPicPr>
+            <a:picLocks noChangeAspect="1"/>
+          </p:cNvPicPr>
+          <p:nvPr/>
+        </p:nvPicPr>
+        <p:blipFill>
+          <a:blip r:embed="rId2">
+            <a:extLst>
+              <a:ext uri="{28A0092B-C50C-407E-A947-70E740481C1C}">
+                <a14:useLocalDpi xmlns:a14="http://schemas.microsoft.com/office/drawing/2010/main" val="0"/>
+              </a:ext>
+            </a:extLst>
+          </a:blip>
+          <a:stretch>
+            <a:fillRect/>
+          </a:stretch>
+        </p:blipFill>
+        <p:spPr>
+          <a:xfrm flipH="1">
+            <a:off x="838200" y="1495525"/>
+            <a:ext cx="4680000" cy="4680000"/>
+          </a:xfrm>
+          <a:prstGeom prst="rect">
+            <a:avLst/>
+          </a:prstGeom>
+          <a:ln>
+            <a:noFill/>
+          </a:ln>
+          <a:effectLst>
+            <a:softEdge rad="112500"/>
+          </a:effectLst>
+        </p:spPr>
+      </p:pic>
     </p:spTree>
     <p:extLst>
       <p:ext uri="{BB962C8B-B14F-4D97-AF65-F5344CB8AC3E}">
-        <p14:creationId xmlns:p14="http://schemas.microsoft.com/office/powerpoint/2010/main" val="683710211"/>
+        <p14:creationId xmlns:p14="http://schemas.microsoft.com/office/powerpoint/2010/main" val="3878202516"/>
       </p:ext>
     </p:extLst>
   </p:cSld>
   <p:clrMapOvr>
     <a:masterClrMapping/>
   </p:clrMapOvr>
+  <mc:AlternateContent xmlns:mc="http://schemas.openxmlformats.org/markup-compatibility/2006">
+    <mc:Choice xmlns:p14="http://schemas.microsoft.com/office/powerpoint/2010/main" Requires="p14">
+      <p:transition p14:dur="0"/>
+    </mc:Choice>
+    <mc:Fallback>
+      <p:transition/>
+    </mc:Fallback>
+  </mc:AlternateContent>
+  <p:timing>
+    <p:tnLst>
+      <p:par>
+        <p:cTn id="1" dur="indefinite" restart="never" nodeType="tmRoot"/>
+      </p:par>
+    </p:tnLst>
+  </p:timing>
 </p:sld>
 </file>
 
@@ -5809,13 +6070,20 @@
     </p:spTree>
     <p:extLst>
       <p:ext uri="{BB962C8B-B14F-4D97-AF65-F5344CB8AC3E}">
-        <p14:creationId xmlns:p14="http://schemas.microsoft.com/office/powerpoint/2010/main" val="3262259022"/>
+        <p14:creationId xmlns:p14="http://schemas.microsoft.com/office/powerpoint/2010/main" val="2564304420"/>
       </p:ext>
     </p:extLst>
   </p:cSld>
   <p:clrMapOvr>
     <a:masterClrMapping/>
   </p:clrMapOvr>
+  <p:timing>
+    <p:tnLst>
+      <p:par>
+        <p:cTn id="1" dur="indefinite" restart="never" nodeType="tmRoot"/>
+      </p:par>
+    </p:tnLst>
+  </p:timing>
 </p:sld>
 </file>
 
@@ -5836,435 +6104,10 @@
           <a:chExt cx="0" cy="0"/>
         </a:xfrm>
       </p:grpSpPr>
-      <p:sp>
-        <p:nvSpPr>
-          <p:cNvPr id="4" name="Rectangle 3"/>
-          <p:cNvSpPr/>
-          <p:nvPr/>
-        </p:nvSpPr>
-        <p:spPr>
-          <a:xfrm>
-            <a:off x="891396" y="428179"/>
-            <a:ext cx="10409208" cy="5355312"/>
-          </a:xfrm>
-          <a:prstGeom prst="rect">
-            <a:avLst/>
-          </a:prstGeom>
-        </p:spPr>
-        <p:txBody>
-          <a:bodyPr wrap="square">
-            <a:spAutoFit/>
-          </a:bodyPr>
-          <a:lstStyle/>
-          <a:p>
-            <a:r>
-              <a:rPr lang="en-GB" b="1" u="sng" dirty="0">
-                <a:solidFill>
-                  <a:schemeClr val="accent4"/>
-                </a:solidFill>
-                <a:latin typeface="Arial" panose="020B0604020202020204" pitchFamily="34" charset="0"/>
-                <a:cs typeface="Arial" panose="020B0604020202020204" pitchFamily="34" charset="0"/>
-              </a:rPr>
-              <a:t>Introduction: </a:t>
-            </a:r>
-            <a:endParaRPr lang="en-BE" b="1" u="sng" dirty="0">
-              <a:solidFill>
-                <a:schemeClr val="accent4"/>
-              </a:solidFill>
-              <a:latin typeface="Arial" panose="020B0604020202020204" pitchFamily="34" charset="0"/>
-              <a:cs typeface="Arial" panose="020B0604020202020204" pitchFamily="34" charset="0"/>
-            </a:endParaRPr>
-          </a:p>
-          <a:p>
-            <a:r>
-              <a:rPr lang="en-GB" dirty="0" smtClean="0">
-                <a:solidFill>
-                  <a:schemeClr val="bg1"/>
-                </a:solidFill>
-                <a:latin typeface="Arial" panose="020B0604020202020204" pitchFamily="34" charset="0"/>
-                <a:cs typeface="Arial" panose="020B0604020202020204" pitchFamily="34" charset="0"/>
-              </a:rPr>
-              <a:t>This </a:t>
-            </a:r>
-            <a:r>
-              <a:rPr lang="en-GB" dirty="0">
-                <a:solidFill>
-                  <a:schemeClr val="bg1"/>
-                </a:solidFill>
-                <a:latin typeface="Arial" panose="020B0604020202020204" pitchFamily="34" charset="0"/>
-                <a:cs typeface="Arial" panose="020B0604020202020204" pitchFamily="34" charset="0"/>
-              </a:rPr>
-              <a:t>section should introduce the topic, provide some background, </a:t>
-            </a:r>
-            <a:endParaRPr lang="en-BE" dirty="0" smtClean="0">
-              <a:solidFill>
-                <a:schemeClr val="bg1"/>
-              </a:solidFill>
-              <a:latin typeface="Arial" panose="020B0604020202020204" pitchFamily="34" charset="0"/>
-              <a:cs typeface="Arial" panose="020B0604020202020204" pitchFamily="34" charset="0"/>
-            </a:endParaRPr>
-          </a:p>
-          <a:p>
-            <a:r>
-              <a:rPr lang="en-GB" dirty="0" smtClean="0">
-                <a:solidFill>
-                  <a:schemeClr val="bg1"/>
-                </a:solidFill>
-                <a:latin typeface="Arial" panose="020B0604020202020204" pitchFamily="34" charset="0"/>
-                <a:cs typeface="Arial" panose="020B0604020202020204" pitchFamily="34" charset="0"/>
-              </a:rPr>
-              <a:t>and </a:t>
-            </a:r>
-            <a:r>
-              <a:rPr lang="en-GB" dirty="0">
-                <a:solidFill>
-                  <a:schemeClr val="bg1"/>
-                </a:solidFill>
-                <a:latin typeface="Arial" panose="020B0604020202020204" pitchFamily="34" charset="0"/>
-                <a:cs typeface="Arial" panose="020B0604020202020204" pitchFamily="34" charset="0"/>
-              </a:rPr>
-              <a:t>clearly state the research question. </a:t>
-            </a:r>
-            <a:endParaRPr lang="en-BE" dirty="0" smtClean="0">
-              <a:solidFill>
-                <a:schemeClr val="bg1"/>
-              </a:solidFill>
-              <a:latin typeface="Arial" panose="020B0604020202020204" pitchFamily="34" charset="0"/>
-              <a:cs typeface="Arial" panose="020B0604020202020204" pitchFamily="34" charset="0"/>
-            </a:endParaRPr>
-          </a:p>
-          <a:p>
-            <a:r>
-              <a:rPr lang="en-GB" dirty="0" smtClean="0">
-                <a:solidFill>
-                  <a:schemeClr val="bg1"/>
-                </a:solidFill>
-                <a:latin typeface="Arial" panose="020B0604020202020204" pitchFamily="34" charset="0"/>
-                <a:cs typeface="Arial" panose="020B0604020202020204" pitchFamily="34" charset="0"/>
-              </a:rPr>
-              <a:t>It </a:t>
-            </a:r>
-            <a:r>
-              <a:rPr lang="en-GB" dirty="0">
-                <a:solidFill>
-                  <a:schemeClr val="bg1"/>
-                </a:solidFill>
-                <a:latin typeface="Arial" panose="020B0604020202020204" pitchFamily="34" charset="0"/>
-                <a:cs typeface="Arial" panose="020B0604020202020204" pitchFamily="34" charset="0"/>
-              </a:rPr>
-              <a:t>should also mention the data sources used in the study </a:t>
-            </a:r>
-            <a:endParaRPr lang="en-BE" dirty="0" smtClean="0">
-              <a:solidFill>
-                <a:schemeClr val="bg1"/>
-              </a:solidFill>
-              <a:latin typeface="Arial" panose="020B0604020202020204" pitchFamily="34" charset="0"/>
-              <a:cs typeface="Arial" panose="020B0604020202020204" pitchFamily="34" charset="0"/>
-            </a:endParaRPr>
-          </a:p>
-          <a:p>
-            <a:r>
-              <a:rPr lang="en-GB" dirty="0" smtClean="0">
-                <a:solidFill>
-                  <a:schemeClr val="bg1"/>
-                </a:solidFill>
-                <a:latin typeface="Arial" panose="020B0604020202020204" pitchFamily="34" charset="0"/>
-                <a:cs typeface="Arial" panose="020B0604020202020204" pitchFamily="34" charset="0"/>
-              </a:rPr>
-              <a:t>and </a:t>
-            </a:r>
-            <a:r>
-              <a:rPr lang="en-GB" dirty="0">
-                <a:solidFill>
-                  <a:schemeClr val="bg1"/>
-                </a:solidFill>
-                <a:latin typeface="Arial" panose="020B0604020202020204" pitchFamily="34" charset="0"/>
-                <a:cs typeface="Arial" panose="020B0604020202020204" pitchFamily="34" charset="0"/>
-              </a:rPr>
-              <a:t>provide a brief summary of the methods and results</a:t>
-            </a:r>
-            <a:r>
-              <a:rPr lang="en-GB" dirty="0" smtClean="0">
-                <a:solidFill>
-                  <a:schemeClr val="bg1"/>
-                </a:solidFill>
-                <a:latin typeface="Arial" panose="020B0604020202020204" pitchFamily="34" charset="0"/>
-                <a:cs typeface="Arial" panose="020B0604020202020204" pitchFamily="34" charset="0"/>
-              </a:rPr>
-              <a:t>.</a:t>
-            </a:r>
-            <a:endParaRPr lang="en-BE" dirty="0" smtClean="0">
-              <a:solidFill>
-                <a:schemeClr val="bg1"/>
-              </a:solidFill>
-              <a:latin typeface="Arial" panose="020B0604020202020204" pitchFamily="34" charset="0"/>
-              <a:cs typeface="Arial" panose="020B0604020202020204" pitchFamily="34" charset="0"/>
-            </a:endParaRPr>
-          </a:p>
-          <a:p>
-            <a:endParaRPr lang="en-BE" dirty="0">
-              <a:solidFill>
-                <a:schemeClr val="bg1"/>
-              </a:solidFill>
-              <a:latin typeface="Arial" panose="020B0604020202020204" pitchFamily="34" charset="0"/>
-              <a:cs typeface="Arial" panose="020B0604020202020204" pitchFamily="34" charset="0"/>
-            </a:endParaRPr>
-          </a:p>
-          <a:p>
-            <a:r>
-              <a:rPr lang="en-GB" dirty="0">
-                <a:solidFill>
-                  <a:schemeClr val="bg1"/>
-                </a:solidFill>
-                <a:latin typeface="Arial" panose="020B0604020202020204" pitchFamily="34" charset="0"/>
-                <a:cs typeface="Arial" panose="020B0604020202020204" pitchFamily="34" charset="0"/>
-              </a:rPr>
-              <a:t># Introduction (max. 500 words</a:t>
-            </a:r>
-            <a:r>
-              <a:rPr lang="en-GB" dirty="0" smtClean="0">
-                <a:solidFill>
-                  <a:schemeClr val="bg1"/>
-                </a:solidFill>
-                <a:latin typeface="Arial" panose="020B0604020202020204" pitchFamily="34" charset="0"/>
-                <a:cs typeface="Arial" panose="020B0604020202020204" pitchFamily="34" charset="0"/>
-              </a:rPr>
-              <a:t>)</a:t>
-            </a:r>
-            <a:endParaRPr lang="en-BE" dirty="0" smtClean="0">
-              <a:solidFill>
-                <a:schemeClr val="bg1"/>
-              </a:solidFill>
-              <a:latin typeface="Arial" panose="020B0604020202020204" pitchFamily="34" charset="0"/>
-              <a:cs typeface="Arial" panose="020B0604020202020204" pitchFamily="34" charset="0"/>
-            </a:endParaRPr>
-          </a:p>
-          <a:p>
-            <a:r>
-              <a:rPr lang="en-GB" dirty="0" smtClean="0">
-                <a:solidFill>
-                  <a:schemeClr val="bg1"/>
-                </a:solidFill>
-                <a:latin typeface="Arial" panose="020B0604020202020204" pitchFamily="34" charset="0"/>
-                <a:cs typeface="Arial" panose="020B0604020202020204" pitchFamily="34" charset="0"/>
-              </a:rPr>
-              <a:t>X</a:t>
-            </a:r>
-            <a:r>
-              <a:rPr lang="en-BE" dirty="0" smtClean="0">
-                <a:solidFill>
-                  <a:schemeClr val="bg1"/>
-                </a:solidFill>
-                <a:latin typeface="Arial" panose="020B0604020202020204" pitchFamily="34" charset="0"/>
-                <a:cs typeface="Arial" panose="020B0604020202020204" pitchFamily="34" charset="0"/>
-              </a:rPr>
-              <a:t>xx</a:t>
-            </a:r>
-          </a:p>
-          <a:p>
-            <a:endParaRPr lang="en-GB" dirty="0">
-              <a:solidFill>
-                <a:schemeClr val="bg1"/>
-              </a:solidFill>
-              <a:latin typeface="Arial" panose="020B0604020202020204" pitchFamily="34" charset="0"/>
-              <a:cs typeface="Arial" panose="020B0604020202020204" pitchFamily="34" charset="0"/>
-            </a:endParaRPr>
-          </a:p>
-          <a:p>
-            <a:r>
-              <a:rPr lang="en-GB" dirty="0">
-                <a:solidFill>
-                  <a:schemeClr val="bg1"/>
-                </a:solidFill>
-                <a:latin typeface="Arial" panose="020B0604020202020204" pitchFamily="34" charset="0"/>
-                <a:cs typeface="Arial" panose="020B0604020202020204" pitchFamily="34" charset="0"/>
-              </a:rPr>
-              <a:t>## Research </a:t>
-            </a:r>
-            <a:r>
-              <a:rPr lang="en-GB" dirty="0" smtClean="0">
-                <a:solidFill>
-                  <a:schemeClr val="bg1"/>
-                </a:solidFill>
-                <a:latin typeface="Arial" panose="020B0604020202020204" pitchFamily="34" charset="0"/>
-                <a:cs typeface="Arial" panose="020B0604020202020204" pitchFamily="34" charset="0"/>
-              </a:rPr>
-              <a:t>Question</a:t>
-            </a:r>
-            <a:endParaRPr lang="en-BE" dirty="0" smtClean="0">
-              <a:solidFill>
-                <a:schemeClr val="bg1"/>
-              </a:solidFill>
-              <a:latin typeface="Arial" panose="020B0604020202020204" pitchFamily="34" charset="0"/>
-              <a:cs typeface="Arial" panose="020B0604020202020204" pitchFamily="34" charset="0"/>
-            </a:endParaRPr>
-          </a:p>
-          <a:p>
-            <a:r>
-              <a:rPr lang="en-GB" dirty="0" smtClean="0">
-                <a:solidFill>
-                  <a:schemeClr val="bg1"/>
-                </a:solidFill>
-                <a:latin typeface="Arial" panose="020B0604020202020204" pitchFamily="34" charset="0"/>
-                <a:cs typeface="Arial" panose="020B0604020202020204" pitchFamily="34" charset="0"/>
-              </a:rPr>
-              <a:t>X</a:t>
-            </a:r>
-            <a:r>
-              <a:rPr lang="en-BE" dirty="0" smtClean="0">
-                <a:solidFill>
-                  <a:schemeClr val="bg1"/>
-                </a:solidFill>
-                <a:latin typeface="Arial" panose="020B0604020202020204" pitchFamily="34" charset="0"/>
-                <a:cs typeface="Arial" panose="020B0604020202020204" pitchFamily="34" charset="0"/>
-              </a:rPr>
-              <a:t>xx</a:t>
-            </a:r>
-          </a:p>
-          <a:p>
-            <a:endParaRPr lang="en-GB" dirty="0">
-              <a:solidFill>
-                <a:schemeClr val="bg1"/>
-              </a:solidFill>
-              <a:latin typeface="Arial" panose="020B0604020202020204" pitchFamily="34" charset="0"/>
-              <a:cs typeface="Arial" panose="020B0604020202020204" pitchFamily="34" charset="0"/>
-            </a:endParaRPr>
-          </a:p>
-          <a:p>
-            <a:r>
-              <a:rPr lang="en-GB" dirty="0">
-                <a:solidFill>
-                  <a:schemeClr val="bg1"/>
-                </a:solidFill>
-                <a:latin typeface="Arial" panose="020B0604020202020204" pitchFamily="34" charset="0"/>
-                <a:cs typeface="Arial" panose="020B0604020202020204" pitchFamily="34" charset="0"/>
-              </a:rPr>
-              <a:t>## Data Source(s</a:t>
-            </a:r>
-            <a:r>
-              <a:rPr lang="en-GB" dirty="0" smtClean="0">
-                <a:solidFill>
-                  <a:schemeClr val="bg1"/>
-                </a:solidFill>
-                <a:latin typeface="Arial" panose="020B0604020202020204" pitchFamily="34" charset="0"/>
-                <a:cs typeface="Arial" panose="020B0604020202020204" pitchFamily="34" charset="0"/>
-              </a:rPr>
-              <a:t>)</a:t>
-            </a:r>
-            <a:endParaRPr lang="en-BE" dirty="0" smtClean="0">
-              <a:solidFill>
-                <a:schemeClr val="bg1"/>
-              </a:solidFill>
-              <a:latin typeface="Arial" panose="020B0604020202020204" pitchFamily="34" charset="0"/>
-              <a:cs typeface="Arial" panose="020B0604020202020204" pitchFamily="34" charset="0"/>
-            </a:endParaRPr>
-          </a:p>
-          <a:p>
-            <a:r>
-              <a:rPr lang="en-GB" dirty="0" smtClean="0">
-                <a:solidFill>
-                  <a:schemeClr val="bg1"/>
-                </a:solidFill>
-                <a:latin typeface="Arial" panose="020B0604020202020204" pitchFamily="34" charset="0"/>
-                <a:cs typeface="Arial" panose="020B0604020202020204" pitchFamily="34" charset="0"/>
-              </a:rPr>
-              <a:t>X</a:t>
-            </a:r>
-            <a:r>
-              <a:rPr lang="en-BE" dirty="0" smtClean="0">
-                <a:solidFill>
-                  <a:schemeClr val="bg1"/>
-                </a:solidFill>
-                <a:latin typeface="Arial" panose="020B0604020202020204" pitchFamily="34" charset="0"/>
-                <a:cs typeface="Arial" panose="020B0604020202020204" pitchFamily="34" charset="0"/>
-              </a:rPr>
-              <a:t>xx</a:t>
-            </a:r>
-          </a:p>
-          <a:p>
-            <a:endParaRPr lang="en-GB" dirty="0">
-              <a:solidFill>
-                <a:schemeClr val="bg1"/>
-              </a:solidFill>
-              <a:latin typeface="Arial" panose="020B0604020202020204" pitchFamily="34" charset="0"/>
-              <a:cs typeface="Arial" panose="020B0604020202020204" pitchFamily="34" charset="0"/>
-            </a:endParaRPr>
-          </a:p>
-          <a:p>
-            <a:r>
-              <a:rPr lang="en-GB" dirty="0">
-                <a:solidFill>
-                  <a:schemeClr val="bg1"/>
-                </a:solidFill>
-                <a:latin typeface="Arial" panose="020B0604020202020204" pitchFamily="34" charset="0"/>
-                <a:cs typeface="Arial" panose="020B0604020202020204" pitchFamily="34" charset="0"/>
-              </a:rPr>
-              <a:t>## Summary of Methods and </a:t>
-            </a:r>
-            <a:r>
-              <a:rPr lang="en-GB" dirty="0" smtClean="0">
-                <a:solidFill>
-                  <a:schemeClr val="bg1"/>
-                </a:solidFill>
-                <a:latin typeface="Arial" panose="020B0604020202020204" pitchFamily="34" charset="0"/>
-                <a:cs typeface="Arial" panose="020B0604020202020204" pitchFamily="34" charset="0"/>
-              </a:rPr>
-              <a:t>Results</a:t>
-            </a:r>
-            <a:endParaRPr lang="en-BE" dirty="0" smtClean="0">
-              <a:solidFill>
-                <a:schemeClr val="bg1"/>
-              </a:solidFill>
-              <a:latin typeface="Arial" panose="020B0604020202020204" pitchFamily="34" charset="0"/>
-              <a:cs typeface="Arial" panose="020B0604020202020204" pitchFamily="34" charset="0"/>
-            </a:endParaRPr>
-          </a:p>
-          <a:p>
-            <a:r>
-              <a:rPr lang="en-GB" dirty="0" smtClean="0">
-                <a:solidFill>
-                  <a:schemeClr val="bg1"/>
-                </a:solidFill>
-                <a:latin typeface="Arial" panose="020B0604020202020204" pitchFamily="34" charset="0"/>
-                <a:cs typeface="Arial" panose="020B0604020202020204" pitchFamily="34" charset="0"/>
-              </a:rPr>
-              <a:t>X</a:t>
-            </a:r>
-            <a:r>
-              <a:rPr lang="en-BE" dirty="0" smtClean="0">
-                <a:solidFill>
-                  <a:schemeClr val="bg1"/>
-                </a:solidFill>
-                <a:latin typeface="Arial" panose="020B0604020202020204" pitchFamily="34" charset="0"/>
-                <a:cs typeface="Arial" panose="020B0604020202020204" pitchFamily="34" charset="0"/>
-              </a:rPr>
-              <a:t>xx</a:t>
-            </a:r>
-          </a:p>
-          <a:p>
-            <a:endParaRPr lang="en-BE" dirty="0">
-              <a:solidFill>
-                <a:schemeClr val="bg1"/>
-              </a:solidFill>
-              <a:latin typeface="Arial" panose="020B0604020202020204" pitchFamily="34" charset="0"/>
-              <a:cs typeface="Arial" panose="020B0604020202020204" pitchFamily="34" charset="0"/>
-            </a:endParaRPr>
-          </a:p>
-          <a:p>
-            <a:endParaRPr lang="en-BE" dirty="0" smtClean="0">
-              <a:solidFill>
-                <a:schemeClr val="bg1"/>
-              </a:solidFill>
-              <a:latin typeface="Arial" panose="020B0604020202020204" pitchFamily="34" charset="0"/>
-              <a:cs typeface="Arial" panose="020B0604020202020204" pitchFamily="34" charset="0"/>
-            </a:endParaRPr>
-          </a:p>
-        </p:txBody>
-      </p:sp>
     </p:spTree>
     <p:extLst>
       <p:ext uri="{BB962C8B-B14F-4D97-AF65-F5344CB8AC3E}">
-        <p14:creationId xmlns:p14="http://schemas.microsoft.com/office/powerpoint/2010/main" val="171768344"/>
+        <p14:creationId xmlns:p14="http://schemas.microsoft.com/office/powerpoint/2010/main" val="521628975"/>
       </p:ext>
     </p:extLst>
   </p:cSld>
@@ -6294,7 +6137,7 @@
     </p:spTree>
     <p:extLst>
       <p:ext uri="{BB962C8B-B14F-4D97-AF65-F5344CB8AC3E}">
-        <p14:creationId xmlns:p14="http://schemas.microsoft.com/office/powerpoint/2010/main" val="3245249009"/>
+        <p14:creationId xmlns:p14="http://schemas.microsoft.com/office/powerpoint/2010/main" val="3928226841"/>
       </p:ext>
     </p:extLst>
   </p:cSld>
@@ -6330,7 +6173,7 @@
         <p:spPr>
           <a:xfrm>
             <a:off x="891396" y="428179"/>
-            <a:ext cx="10409208" cy="2862322"/>
+            <a:ext cx="10409208" cy="5355312"/>
           </a:xfrm>
           <a:prstGeom prst="rect">
             <a:avLst/>
@@ -6350,7 +6193,7 @@
                 <a:latin typeface="Arial" panose="020B0604020202020204" pitchFamily="34" charset="0"/>
                 <a:cs typeface="Arial" panose="020B0604020202020204" pitchFamily="34" charset="0"/>
               </a:rPr>
-              <a:t>Data Collection and Data Storage: </a:t>
+              <a:t>Introduction: </a:t>
             </a:r>
             <a:endParaRPr lang="en-BE" b="1" u="sng" dirty="0">
               <a:solidFill>
@@ -6369,7 +6212,7 @@
                 <a:latin typeface="Arial" panose="020B0604020202020204" pitchFamily="34" charset="0"/>
                 <a:cs typeface="Arial" panose="020B0604020202020204" pitchFamily="34" charset="0"/>
               </a:rPr>
-              <a:t>Discuss </a:t>
+              <a:t>This </a:t>
             </a:r>
             <a:r>
               <a:rPr lang="en-GB" dirty="0">
@@ -6379,7 +6222,7 @@
                 <a:latin typeface="Arial" panose="020B0604020202020204" pitchFamily="34" charset="0"/>
                 <a:cs typeface="Arial" panose="020B0604020202020204" pitchFamily="34" charset="0"/>
               </a:rPr>
-              <a:t>your approach to data collection, </a:t>
+              <a:t>section should introduce the topic, provide some background, </a:t>
             </a:r>
             <a:endParaRPr lang="en-BE" dirty="0" smtClean="0">
               <a:solidFill>
@@ -6398,7 +6241,7 @@
                 <a:latin typeface="Arial" panose="020B0604020202020204" pitchFamily="34" charset="0"/>
                 <a:cs typeface="Arial" panose="020B0604020202020204" pitchFamily="34" charset="0"/>
               </a:rPr>
-              <a:t>the </a:t>
+              <a:t>and </a:t>
             </a:r>
             <a:r>
               <a:rPr lang="en-GB" dirty="0">
@@ -6408,7 +6251,7 @@
                 <a:latin typeface="Arial" panose="020B0604020202020204" pitchFamily="34" charset="0"/>
                 <a:cs typeface="Arial" panose="020B0604020202020204" pitchFamily="34" charset="0"/>
               </a:rPr>
-              <a:t>challenges faced, </a:t>
+              <a:t>clearly state the research question. </a:t>
             </a:r>
             <a:endParaRPr lang="en-BE" dirty="0" smtClean="0">
               <a:solidFill>
@@ -6427,7 +6270,7 @@
                 <a:latin typeface="Arial" panose="020B0604020202020204" pitchFamily="34" charset="0"/>
                 <a:cs typeface="Arial" panose="020B0604020202020204" pitchFamily="34" charset="0"/>
               </a:rPr>
-              <a:t>and </a:t>
+              <a:t>It </a:t>
             </a:r>
             <a:r>
               <a:rPr lang="en-GB" dirty="0">
@@ -6437,7 +6280,7 @@
                 <a:latin typeface="Arial" panose="020B0604020202020204" pitchFamily="34" charset="0"/>
                 <a:cs typeface="Arial" panose="020B0604020202020204" pitchFamily="34" charset="0"/>
               </a:rPr>
-              <a:t>how you overcame them. </a:t>
+              <a:t>should also mention the data sources used in the study </a:t>
             </a:r>
             <a:endParaRPr lang="en-BE" dirty="0" smtClean="0">
               <a:solidFill>
@@ -6456,7 +6299,7 @@
                 <a:latin typeface="Arial" panose="020B0604020202020204" pitchFamily="34" charset="0"/>
                 <a:cs typeface="Arial" panose="020B0604020202020204" pitchFamily="34" charset="0"/>
               </a:rPr>
-              <a:t>You </a:t>
+              <a:t>and </a:t>
             </a:r>
             <a:r>
               <a:rPr lang="en-GB" dirty="0">
@@ -6466,7 +6309,7 @@
                 <a:latin typeface="Arial" panose="020B0604020202020204" pitchFamily="34" charset="0"/>
                 <a:cs typeface="Arial" panose="020B0604020202020204" pitchFamily="34" charset="0"/>
               </a:rPr>
-              <a:t>should also detail how and why you stored the raw data in a certain way</a:t>
+              <a:t>provide a brief summary of the methods and results</a:t>
             </a:r>
             <a:r>
               <a:rPr lang="en-GB" dirty="0" smtClean="0">
@@ -6504,7 +6347,7 @@
                 <a:latin typeface="Arial" panose="020B0604020202020204" pitchFamily="34" charset="0"/>
                 <a:cs typeface="Arial" panose="020B0604020202020204" pitchFamily="34" charset="0"/>
               </a:rPr>
-              <a:t>&lt;!-- Describe how you approach the data collection procedure. In your research setting, what were the challenges regarding collecting the raw data. How did you solve these challenges? How do you store the raw data and why?  </a:t>
+              <a:t># Introduction (max. 500 words</a:t>
             </a:r>
             <a:r>
               <a:rPr lang="en-GB" dirty="0" smtClean="0">
@@ -6514,7 +6357,7 @@
                 <a:latin typeface="Arial" panose="020B0604020202020204" pitchFamily="34" charset="0"/>
                 <a:cs typeface="Arial" panose="020B0604020202020204" pitchFamily="34" charset="0"/>
               </a:rPr>
-              <a:t>--&gt;</a:t>
+              <a:t>)</a:t>
             </a:r>
             <a:endParaRPr lang="en-BE" dirty="0" smtClean="0">
               <a:solidFill>
@@ -6526,6 +6369,16 @@
           </a:p>
           <a:p>
             <a:r>
+              <a:rPr lang="en-GB" dirty="0" smtClean="0">
+                <a:solidFill>
+                  <a:schemeClr val="bg1"/>
+                </a:solidFill>
+                <a:latin typeface="Arial" panose="020B0604020202020204" pitchFamily="34" charset="0"/>
+                <a:cs typeface="Arial" panose="020B0604020202020204" pitchFamily="34" charset="0"/>
+              </a:rPr>
+              <a:t>X</a:t>
+            </a:r>
+            <a:r>
               <a:rPr lang="en-BE" dirty="0" smtClean="0">
                 <a:solidFill>
                   <a:schemeClr val="bg1"/>
@@ -6533,21 +6386,226 @@
                 <a:latin typeface="Arial" panose="020B0604020202020204" pitchFamily="34" charset="0"/>
                 <a:cs typeface="Arial" panose="020B0604020202020204" pitchFamily="34" charset="0"/>
               </a:rPr>
-              <a:t>Xxx</a:t>
-            </a:r>
+              <a:t>xx</a:t>
+            </a:r>
+          </a:p>
+          <a:p>
+            <a:endParaRPr lang="en-GB" dirty="0">
+              <a:solidFill>
+                <a:schemeClr val="bg1"/>
+              </a:solidFill>
+              <a:latin typeface="Arial" panose="020B0604020202020204" pitchFamily="34" charset="0"/>
+              <a:cs typeface="Arial" panose="020B0604020202020204" pitchFamily="34" charset="0"/>
+            </a:endParaRPr>
+          </a:p>
+          <a:p>
+            <a:r>
+              <a:rPr lang="en-GB" dirty="0">
+                <a:solidFill>
+                  <a:schemeClr val="bg1"/>
+                </a:solidFill>
+                <a:latin typeface="Arial" panose="020B0604020202020204" pitchFamily="34" charset="0"/>
+                <a:cs typeface="Arial" panose="020B0604020202020204" pitchFamily="34" charset="0"/>
+              </a:rPr>
+              <a:t>## Research </a:t>
+            </a:r>
+            <a:r>
+              <a:rPr lang="en-GB" dirty="0" smtClean="0">
+                <a:solidFill>
+                  <a:schemeClr val="bg1"/>
+                </a:solidFill>
+                <a:latin typeface="Arial" panose="020B0604020202020204" pitchFamily="34" charset="0"/>
+                <a:cs typeface="Arial" panose="020B0604020202020204" pitchFamily="34" charset="0"/>
+              </a:rPr>
+              <a:t>Question</a:t>
+            </a:r>
+            <a:endParaRPr lang="en-BE" dirty="0" smtClean="0">
+              <a:solidFill>
+                <a:schemeClr val="bg1"/>
+              </a:solidFill>
+              <a:latin typeface="Arial" panose="020B0604020202020204" pitchFamily="34" charset="0"/>
+              <a:cs typeface="Arial" panose="020B0604020202020204" pitchFamily="34" charset="0"/>
+            </a:endParaRPr>
+          </a:p>
+          <a:p>
+            <a:r>
+              <a:rPr lang="en-GB" dirty="0" smtClean="0">
+                <a:solidFill>
+                  <a:schemeClr val="bg1"/>
+                </a:solidFill>
+                <a:latin typeface="Arial" panose="020B0604020202020204" pitchFamily="34" charset="0"/>
+                <a:cs typeface="Arial" panose="020B0604020202020204" pitchFamily="34" charset="0"/>
+              </a:rPr>
+              <a:t>X</a:t>
+            </a:r>
+            <a:r>
+              <a:rPr lang="en-BE" dirty="0" smtClean="0">
+                <a:solidFill>
+                  <a:schemeClr val="bg1"/>
+                </a:solidFill>
+                <a:latin typeface="Arial" panose="020B0604020202020204" pitchFamily="34" charset="0"/>
+                <a:cs typeface="Arial" panose="020B0604020202020204" pitchFamily="34" charset="0"/>
+              </a:rPr>
+              <a:t>xx</a:t>
+            </a:r>
+          </a:p>
+          <a:p>
+            <a:endParaRPr lang="en-GB" dirty="0">
+              <a:solidFill>
+                <a:schemeClr val="bg1"/>
+              </a:solidFill>
+              <a:latin typeface="Arial" panose="020B0604020202020204" pitchFamily="34" charset="0"/>
+              <a:cs typeface="Arial" panose="020B0604020202020204" pitchFamily="34" charset="0"/>
+            </a:endParaRPr>
+          </a:p>
+          <a:p>
+            <a:r>
+              <a:rPr lang="en-GB" dirty="0">
+                <a:solidFill>
+                  <a:schemeClr val="bg1"/>
+                </a:solidFill>
+                <a:latin typeface="Arial" panose="020B0604020202020204" pitchFamily="34" charset="0"/>
+                <a:cs typeface="Arial" panose="020B0604020202020204" pitchFamily="34" charset="0"/>
+              </a:rPr>
+              <a:t>## Data Source(s</a:t>
+            </a:r>
+            <a:r>
+              <a:rPr lang="en-GB" dirty="0" smtClean="0">
+                <a:solidFill>
+                  <a:schemeClr val="bg1"/>
+                </a:solidFill>
+                <a:latin typeface="Arial" panose="020B0604020202020204" pitchFamily="34" charset="0"/>
+                <a:cs typeface="Arial" panose="020B0604020202020204" pitchFamily="34" charset="0"/>
+              </a:rPr>
+              <a:t>)</a:t>
+            </a:r>
+            <a:endParaRPr lang="en-BE" dirty="0" smtClean="0">
+              <a:solidFill>
+                <a:schemeClr val="bg1"/>
+              </a:solidFill>
+              <a:latin typeface="Arial" panose="020B0604020202020204" pitchFamily="34" charset="0"/>
+              <a:cs typeface="Arial" panose="020B0604020202020204" pitchFamily="34" charset="0"/>
+            </a:endParaRPr>
+          </a:p>
+          <a:p>
+            <a:r>
+              <a:rPr lang="en-GB" dirty="0" smtClean="0">
+                <a:solidFill>
+                  <a:schemeClr val="bg1"/>
+                </a:solidFill>
+                <a:latin typeface="Arial" panose="020B0604020202020204" pitchFamily="34" charset="0"/>
+                <a:cs typeface="Arial" panose="020B0604020202020204" pitchFamily="34" charset="0"/>
+              </a:rPr>
+              <a:t>X</a:t>
+            </a:r>
+            <a:r>
+              <a:rPr lang="en-BE" dirty="0" smtClean="0">
+                <a:solidFill>
+                  <a:schemeClr val="bg1"/>
+                </a:solidFill>
+                <a:latin typeface="Arial" panose="020B0604020202020204" pitchFamily="34" charset="0"/>
+                <a:cs typeface="Arial" panose="020B0604020202020204" pitchFamily="34" charset="0"/>
+              </a:rPr>
+              <a:t>xx</a:t>
+            </a:r>
+          </a:p>
+          <a:p>
+            <a:endParaRPr lang="en-GB" dirty="0">
+              <a:solidFill>
+                <a:schemeClr val="bg1"/>
+              </a:solidFill>
+              <a:latin typeface="Arial" panose="020B0604020202020204" pitchFamily="34" charset="0"/>
+              <a:cs typeface="Arial" panose="020B0604020202020204" pitchFamily="34" charset="0"/>
+            </a:endParaRPr>
+          </a:p>
+          <a:p>
+            <a:r>
+              <a:rPr lang="en-GB" dirty="0">
+                <a:solidFill>
+                  <a:schemeClr val="bg1"/>
+                </a:solidFill>
+                <a:latin typeface="Arial" panose="020B0604020202020204" pitchFamily="34" charset="0"/>
+                <a:cs typeface="Arial" panose="020B0604020202020204" pitchFamily="34" charset="0"/>
+              </a:rPr>
+              <a:t>## Summary of Methods and </a:t>
+            </a:r>
+            <a:r>
+              <a:rPr lang="en-GB" dirty="0" smtClean="0">
+                <a:solidFill>
+                  <a:schemeClr val="bg1"/>
+                </a:solidFill>
+                <a:latin typeface="Arial" panose="020B0604020202020204" pitchFamily="34" charset="0"/>
+                <a:cs typeface="Arial" panose="020B0604020202020204" pitchFamily="34" charset="0"/>
+              </a:rPr>
+              <a:t>Results</a:t>
+            </a:r>
+            <a:endParaRPr lang="en-BE" dirty="0" smtClean="0">
+              <a:solidFill>
+                <a:schemeClr val="bg1"/>
+              </a:solidFill>
+              <a:latin typeface="Arial" panose="020B0604020202020204" pitchFamily="34" charset="0"/>
+              <a:cs typeface="Arial" panose="020B0604020202020204" pitchFamily="34" charset="0"/>
+            </a:endParaRPr>
+          </a:p>
+          <a:p>
+            <a:r>
+              <a:rPr lang="en-GB" dirty="0" smtClean="0">
+                <a:solidFill>
+                  <a:schemeClr val="bg1"/>
+                </a:solidFill>
+                <a:latin typeface="Arial" panose="020B0604020202020204" pitchFamily="34" charset="0"/>
+                <a:cs typeface="Arial" panose="020B0604020202020204" pitchFamily="34" charset="0"/>
+              </a:rPr>
+              <a:t>X</a:t>
+            </a:r>
+            <a:r>
+              <a:rPr lang="en-BE" dirty="0" smtClean="0">
+                <a:solidFill>
+                  <a:schemeClr val="bg1"/>
+                </a:solidFill>
+                <a:latin typeface="Arial" panose="020B0604020202020204" pitchFamily="34" charset="0"/>
+                <a:cs typeface="Arial" panose="020B0604020202020204" pitchFamily="34" charset="0"/>
+              </a:rPr>
+              <a:t>xx</a:t>
+            </a:r>
+          </a:p>
+          <a:p>
+            <a:endParaRPr lang="en-BE" dirty="0">
+              <a:solidFill>
+                <a:schemeClr val="bg1"/>
+              </a:solidFill>
+              <a:latin typeface="Arial" panose="020B0604020202020204" pitchFamily="34" charset="0"/>
+              <a:cs typeface="Arial" panose="020B0604020202020204" pitchFamily="34" charset="0"/>
+            </a:endParaRPr>
+          </a:p>
+          <a:p>
+            <a:endParaRPr lang="en-BE" dirty="0" smtClean="0">
+              <a:solidFill>
+                <a:schemeClr val="bg1"/>
+              </a:solidFill>
+              <a:latin typeface="Arial" panose="020B0604020202020204" pitchFamily="34" charset="0"/>
+              <a:cs typeface="Arial" panose="020B0604020202020204" pitchFamily="34" charset="0"/>
+            </a:endParaRPr>
           </a:p>
         </p:txBody>
       </p:sp>
     </p:spTree>
     <p:extLst>
       <p:ext uri="{BB962C8B-B14F-4D97-AF65-F5344CB8AC3E}">
-        <p14:creationId xmlns:p14="http://schemas.microsoft.com/office/powerpoint/2010/main" val="2074830425"/>
+        <p14:creationId xmlns:p14="http://schemas.microsoft.com/office/powerpoint/2010/main" val="171768344"/>
       </p:ext>
     </p:extLst>
   </p:cSld>
   <p:clrMapOvr>
     <a:masterClrMapping/>
   </p:clrMapOvr>
+  <p:timing>
+    <p:tnLst>
+      <p:par>
+        <p:cTn id="1" dur="indefinite" restart="never" nodeType="tmRoot"/>
+      </p:par>
+    </p:tnLst>
+  </p:timing>
 </p:sld>
 </file>
 
@@ -6571,13 +6629,20 @@
     </p:spTree>
     <p:extLst>
       <p:ext uri="{BB962C8B-B14F-4D97-AF65-F5344CB8AC3E}">
-        <p14:creationId xmlns:p14="http://schemas.microsoft.com/office/powerpoint/2010/main" val="2818645891"/>
+        <p14:creationId xmlns:p14="http://schemas.microsoft.com/office/powerpoint/2010/main" val="3262259022"/>
       </p:ext>
     </p:extLst>
   </p:cSld>
   <p:clrMapOvr>
     <a:masterClrMapping/>
   </p:clrMapOvr>
+  <p:timing>
+    <p:tnLst>
+      <p:par>
+        <p:cTn id="1" dur="indefinite" restart="never" nodeType="tmRoot"/>
+      </p:par>
+    </p:tnLst>
+  </p:timing>
 </p:sld>
 </file>
 
@@ -6600,14 +6665,14 @@
       </p:grpSpPr>
       <p:sp>
         <p:nvSpPr>
-          <p:cNvPr id="4" name="Rectangle 3"/>
+          <p:cNvPr id="2" name="Rectangle 1"/>
           <p:cNvSpPr/>
           <p:nvPr/>
         </p:nvSpPr>
         <p:spPr>
           <a:xfrm>
             <a:off x="891396" y="428179"/>
-            <a:ext cx="10409208" cy="3139321"/>
+            <a:ext cx="10409208" cy="6494085"/>
           </a:xfrm>
           <a:prstGeom prst="rect">
             <a:avLst/>
@@ -6620,16 +6685,16 @@
           <a:lstStyle/>
           <a:p>
             <a:r>
-              <a:rPr lang="en-GB" b="1" u="sng" dirty="0">
+              <a:rPr lang="en-BE" b="1" u="sng" dirty="0" smtClean="0">
                 <a:solidFill>
                   <a:schemeClr val="accent4"/>
                 </a:solidFill>
                 <a:latin typeface="Arial" panose="020B0604020202020204" pitchFamily="34" charset="0"/>
                 <a:cs typeface="Arial" panose="020B0604020202020204" pitchFamily="34" charset="0"/>
               </a:rPr>
-              <a:t>Data Cleaning and Preparation: </a:t>
-            </a:r>
-            <a:endParaRPr lang="en-BE" b="1" u="sng" dirty="0">
+              <a:t>Main research question: </a:t>
+            </a:r>
+            <a:endParaRPr lang="en-GB" b="1" u="sng" dirty="0" smtClean="0">
               <a:solidFill>
                 <a:schemeClr val="accent4"/>
               </a:solidFill>
@@ -6639,26 +6704,58 @@
           </a:p>
           <a:p>
             <a:r>
-              <a:rPr lang="en-GB" dirty="0" smtClean="0">
-                <a:solidFill>
-                  <a:schemeClr val="bg1"/>
-                </a:solidFill>
-                <a:latin typeface="Arial" panose="020B0604020202020204" pitchFamily="34" charset="0"/>
-                <a:cs typeface="Arial" panose="020B0604020202020204" pitchFamily="34" charset="0"/>
-              </a:rPr>
-              <a:t>Explain </a:t>
-            </a:r>
-            <a:r>
-              <a:rPr lang="en-GB" dirty="0">
-                <a:solidFill>
-                  <a:schemeClr val="bg1"/>
-                </a:solidFill>
-                <a:latin typeface="Arial" panose="020B0604020202020204" pitchFamily="34" charset="0"/>
-                <a:cs typeface="Arial" panose="020B0604020202020204" pitchFamily="34" charset="0"/>
-              </a:rPr>
-              <a:t>the process of cleaning and preparing the data, </a:t>
-            </a:r>
-            <a:endParaRPr lang="en-BE" dirty="0" smtClean="0">
+              <a:rPr lang="en-GB" sz="1600" b="1" dirty="0">
+                <a:solidFill>
+                  <a:schemeClr val="bg1"/>
+                </a:solidFill>
+                <a:latin typeface="Arial" panose="020B0604020202020204" pitchFamily="34" charset="0"/>
+                <a:cs typeface="Arial" panose="020B0604020202020204" pitchFamily="34" charset="0"/>
+              </a:rPr>
+              <a:t>What is the unique optimal investment strategy</a:t>
+            </a:r>
+            <a:r>
+              <a:rPr lang="en-BE" sz="1600" b="1" baseline="30000" dirty="0">
+                <a:solidFill>
+                  <a:schemeClr val="bg1"/>
+                </a:solidFill>
+                <a:latin typeface="Arial" panose="020B0604020202020204" pitchFamily="34" charset="0"/>
+                <a:cs typeface="Arial" panose="020B0604020202020204" pitchFamily="34" charset="0"/>
+              </a:rPr>
+              <a:t>1</a:t>
+            </a:r>
+            <a:r>
+              <a:rPr lang="en-GB" sz="1600" b="1" dirty="0">
+                <a:solidFill>
+                  <a:schemeClr val="bg1"/>
+                </a:solidFill>
+                <a:latin typeface="Arial" panose="020B0604020202020204" pitchFamily="34" charset="0"/>
+                <a:cs typeface="Arial" panose="020B0604020202020204" pitchFamily="34" charset="0"/>
+              </a:rPr>
+              <a:t> that corresponds exactly to a given user-specified set of investment parameters</a:t>
+            </a:r>
+            <a:r>
+              <a:rPr lang="en-BE" sz="1600" b="1" dirty="0">
+                <a:solidFill>
+                  <a:schemeClr val="bg1"/>
+                </a:solidFill>
+                <a:latin typeface="Arial" panose="020B0604020202020204" pitchFamily="34" charset="0"/>
+                <a:cs typeface="Arial" panose="020B0604020202020204" pitchFamily="34" charset="0"/>
+              </a:rPr>
+              <a:t>?</a:t>
+            </a:r>
+          </a:p>
+          <a:p>
+            <a:r>
+              <a:rPr lang="en-BE" sz="1600" dirty="0" smtClean="0">
+                <a:solidFill>
+                  <a:schemeClr val="bg1"/>
+                </a:solidFill>
+                <a:latin typeface="Arial" panose="020B0604020202020204" pitchFamily="34" charset="0"/>
+                <a:cs typeface="Arial" panose="020B0604020202020204" pitchFamily="34" charset="0"/>
+              </a:rPr>
+              <a:t> </a:t>
+            </a:r>
+            <a:endParaRPr lang="en-GB" sz="1600" dirty="0" smtClean="0">
               <a:solidFill>
                 <a:schemeClr val="bg1"/>
               </a:solidFill>
@@ -6668,26 +6765,72 @@
           </a:p>
           <a:p>
             <a:r>
-              <a:rPr lang="en-GB" dirty="0" smtClean="0">
-                <a:solidFill>
-                  <a:schemeClr val="bg1"/>
-                </a:solidFill>
-                <a:latin typeface="Arial" panose="020B0604020202020204" pitchFamily="34" charset="0"/>
-                <a:cs typeface="Arial" panose="020B0604020202020204" pitchFamily="34" charset="0"/>
-              </a:rPr>
-              <a:t>highlighting </a:t>
-            </a:r>
-            <a:r>
-              <a:rPr lang="en-GB" dirty="0">
-                <a:solidFill>
-                  <a:schemeClr val="bg1"/>
-                </a:solidFill>
-                <a:latin typeface="Arial" panose="020B0604020202020204" pitchFamily="34" charset="0"/>
-                <a:cs typeface="Arial" panose="020B0604020202020204" pitchFamily="34" charset="0"/>
-              </a:rPr>
-              <a:t>the challenges, bottlenecks, </a:t>
-            </a:r>
-            <a:endParaRPr lang="en-BE" dirty="0" smtClean="0">
+              <a:rPr lang="en-BE" b="1" u="sng" dirty="0" smtClean="0">
+                <a:solidFill>
+                  <a:schemeClr val="accent4"/>
+                </a:solidFill>
+                <a:latin typeface="Arial" panose="020B0604020202020204" pitchFamily="34" charset="0"/>
+                <a:cs typeface="Arial" panose="020B0604020202020204" pitchFamily="34" charset="0"/>
+              </a:rPr>
+              <a:t>Sub-questions: </a:t>
+            </a:r>
+          </a:p>
+          <a:p>
+            <a:pPr marL="457200" indent="-457200">
+              <a:buFont typeface="+mj-lt"/>
+              <a:buAutoNum type="arabicPeriod"/>
+            </a:pPr>
+            <a:r>
+              <a:rPr lang="en-GB" sz="1600" b="1" dirty="0" smtClean="0">
+                <a:solidFill>
+                  <a:schemeClr val="bg1"/>
+                </a:solidFill>
+                <a:latin typeface="Arial" panose="020B0604020202020204" pitchFamily="34" charset="0"/>
+                <a:cs typeface="Arial" panose="020B0604020202020204" pitchFamily="34" charset="0"/>
+              </a:rPr>
+              <a:t>What are relevant </a:t>
+            </a:r>
+            <a:r>
+              <a:rPr lang="en-BE" sz="1600" b="1" dirty="0" smtClean="0">
+                <a:solidFill>
+                  <a:schemeClr val="bg1"/>
+                </a:solidFill>
+                <a:latin typeface="Arial" panose="020B0604020202020204" pitchFamily="34" charset="0"/>
+                <a:cs typeface="Arial" panose="020B0604020202020204" pitchFamily="34" charset="0"/>
+              </a:rPr>
+              <a:t>investment parameters </a:t>
+            </a:r>
+            <a:r>
+              <a:rPr lang="en-GB" sz="1600" dirty="0" smtClean="0">
+                <a:solidFill>
+                  <a:schemeClr val="bg1"/>
+                </a:solidFill>
+                <a:latin typeface="Arial" panose="020B0604020202020204" pitchFamily="34" charset="0"/>
+                <a:cs typeface="Arial" panose="020B0604020202020204" pitchFamily="34" charset="0"/>
+              </a:rPr>
+              <a:t>that determine optimal </a:t>
+            </a:r>
+            <a:r>
+              <a:rPr lang="en-BE" sz="1600" dirty="0" smtClean="0">
+                <a:solidFill>
+                  <a:schemeClr val="bg1"/>
+                </a:solidFill>
+                <a:latin typeface="Arial" panose="020B0604020202020204" pitchFamily="34" charset="0"/>
+                <a:cs typeface="Arial" panose="020B0604020202020204" pitchFamily="34" charset="0"/>
+              </a:rPr>
+              <a:t>corresponding </a:t>
+            </a:r>
+            <a:r>
+              <a:rPr lang="en-GB" sz="1600" dirty="0" smtClean="0">
+                <a:solidFill>
+                  <a:schemeClr val="bg1"/>
+                </a:solidFill>
+                <a:latin typeface="Arial" panose="020B0604020202020204" pitchFamily="34" charset="0"/>
+                <a:cs typeface="Arial" panose="020B0604020202020204" pitchFamily="34" charset="0"/>
+              </a:rPr>
+              <a:t>investment strategy (desired investment objectives, time horizon, future deposits/withdrawals, risk constraints, ESG criteria, asset class restrictions, geographic restrictions, etc.)?</a:t>
+            </a:r>
+            <a:endParaRPr lang="en-BE" sz="1600" dirty="0" smtClean="0">
               <a:solidFill>
                 <a:schemeClr val="bg1"/>
               </a:solidFill>
@@ -6696,27 +6839,51 @@
             </a:endParaRPr>
           </a:p>
           <a:p>
-            <a:r>
-              <a:rPr lang="en-GB" dirty="0" smtClean="0">
-                <a:solidFill>
-                  <a:schemeClr val="bg1"/>
-                </a:solidFill>
-                <a:latin typeface="Arial" panose="020B0604020202020204" pitchFamily="34" charset="0"/>
-                <a:cs typeface="Arial" panose="020B0604020202020204" pitchFamily="34" charset="0"/>
-              </a:rPr>
-              <a:t>and </a:t>
-            </a:r>
-            <a:r>
-              <a:rPr lang="en-GB" dirty="0">
-                <a:solidFill>
-                  <a:schemeClr val="bg1"/>
-                </a:solidFill>
-                <a:latin typeface="Arial" panose="020B0604020202020204" pitchFamily="34" charset="0"/>
-                <a:cs typeface="Arial" panose="020B0604020202020204" pitchFamily="34" charset="0"/>
-              </a:rPr>
-              <a:t>your approach to improving the data cleaning process. </a:t>
-            </a:r>
-            <a:endParaRPr lang="en-BE" dirty="0" smtClean="0">
+            <a:pPr marL="457200" indent="-457200">
+              <a:buFont typeface="+mj-lt"/>
+              <a:buAutoNum type="arabicPeriod"/>
+            </a:pPr>
+            <a:r>
+              <a:rPr lang="en-GB" sz="1600" b="1" dirty="0" smtClean="0">
+                <a:solidFill>
+                  <a:schemeClr val="bg1"/>
+                </a:solidFill>
+                <a:latin typeface="Arial" panose="020B0604020202020204" pitchFamily="34" charset="0"/>
+                <a:cs typeface="Arial" panose="020B0604020202020204" pitchFamily="34" charset="0"/>
+              </a:rPr>
+              <a:t>Which securities</a:t>
+            </a:r>
+            <a:r>
+              <a:rPr lang="en-GB" sz="1600" b="1" baseline="30000" dirty="0" smtClean="0">
+                <a:solidFill>
+                  <a:schemeClr val="bg1"/>
+                </a:solidFill>
+                <a:latin typeface="Arial" panose="020B0604020202020204" pitchFamily="34" charset="0"/>
+                <a:cs typeface="Arial" panose="020B0604020202020204" pitchFamily="34" charset="0"/>
+              </a:rPr>
+              <a:t>2</a:t>
+            </a:r>
+            <a:r>
+              <a:rPr lang="en-GB" sz="1600" b="1" dirty="0" smtClean="0">
+                <a:solidFill>
+                  <a:schemeClr val="bg1"/>
+                </a:solidFill>
+                <a:latin typeface="Arial" panose="020B0604020202020204" pitchFamily="34" charset="0"/>
+                <a:cs typeface="Arial" panose="020B0604020202020204" pitchFamily="34" charset="0"/>
+              </a:rPr>
+              <a:t> should be considered </a:t>
+            </a:r>
+            <a:r>
+              <a:rPr lang="en-GB" sz="1600" dirty="0" smtClean="0">
+                <a:solidFill>
+                  <a:schemeClr val="bg1"/>
+                </a:solidFill>
+                <a:latin typeface="Arial" panose="020B0604020202020204" pitchFamily="34" charset="0"/>
+                <a:cs typeface="Arial" panose="020B0604020202020204" pitchFamily="34" charset="0"/>
+              </a:rPr>
+              <a:t>for the investment universe?</a:t>
+            </a:r>
+            <a:endParaRPr lang="en-BE" sz="1600" dirty="0" smtClean="0">
               <a:solidFill>
                 <a:schemeClr val="bg1"/>
               </a:solidFill>
@@ -6725,37 +6892,90 @@
             </a:endParaRPr>
           </a:p>
           <a:p>
-            <a:r>
-              <a:rPr lang="en-GB" dirty="0" smtClean="0">
-                <a:solidFill>
-                  <a:schemeClr val="bg1"/>
-                </a:solidFill>
-                <a:latin typeface="Arial" panose="020B0604020202020204" pitchFamily="34" charset="0"/>
-                <a:cs typeface="Arial" panose="020B0604020202020204" pitchFamily="34" charset="0"/>
-              </a:rPr>
-              <a:t>Also</a:t>
-            </a:r>
-            <a:r>
-              <a:rPr lang="en-GB" dirty="0">
-                <a:solidFill>
-                  <a:schemeClr val="bg1"/>
-                </a:solidFill>
-                <a:latin typeface="Arial" panose="020B0604020202020204" pitchFamily="34" charset="0"/>
-                <a:cs typeface="Arial" panose="020B0604020202020204" pitchFamily="34" charset="0"/>
-              </a:rPr>
-              <a:t>, discuss the tools and techniques used for this task and their functioning</a:t>
-            </a:r>
-            <a:r>
-              <a:rPr lang="en-GB" dirty="0" smtClean="0">
-                <a:solidFill>
-                  <a:schemeClr val="bg1"/>
-                </a:solidFill>
-                <a:latin typeface="Arial" panose="020B0604020202020204" pitchFamily="34" charset="0"/>
-                <a:cs typeface="Arial" panose="020B0604020202020204" pitchFamily="34" charset="0"/>
-              </a:rPr>
-              <a:t>.</a:t>
-            </a:r>
-            <a:endParaRPr lang="en-BE" dirty="0" smtClean="0">
+            <a:pPr marL="457200" indent="-457200">
+              <a:buFont typeface="+mj-lt"/>
+              <a:buAutoNum type="arabicPeriod"/>
+            </a:pPr>
+            <a:r>
+              <a:rPr lang="en-GB" sz="1600" b="1" dirty="0" smtClean="0">
+                <a:solidFill>
+                  <a:schemeClr val="bg1"/>
+                </a:solidFill>
+                <a:latin typeface="Arial" panose="020B0604020202020204" pitchFamily="34" charset="0"/>
+                <a:cs typeface="Arial" panose="020B0604020202020204" pitchFamily="34" charset="0"/>
+              </a:rPr>
+              <a:t>What are the desired criteria </a:t>
+            </a:r>
+            <a:r>
+              <a:rPr lang="en-GB" sz="1600" dirty="0" smtClean="0">
+                <a:solidFill>
+                  <a:schemeClr val="bg1"/>
+                </a:solidFill>
+                <a:latin typeface="Arial" panose="020B0604020202020204" pitchFamily="34" charset="0"/>
+                <a:cs typeface="Arial" panose="020B0604020202020204" pitchFamily="34" charset="0"/>
+              </a:rPr>
+              <a:t>for model accuracy and computational efficiency?</a:t>
+            </a:r>
+            <a:r>
+              <a:rPr lang="en-BE" sz="1600" dirty="0">
+                <a:solidFill>
+                  <a:schemeClr val="bg1"/>
+                </a:solidFill>
+                <a:latin typeface="Arial" panose="020B0604020202020204" pitchFamily="34" charset="0"/>
+                <a:cs typeface="Arial" panose="020B0604020202020204" pitchFamily="34" charset="0"/>
+              </a:rPr>
+              <a:t/>
+            </a:r>
+            <a:br>
+              <a:rPr lang="en-BE" sz="1600" dirty="0">
+                <a:solidFill>
+                  <a:schemeClr val="bg1"/>
+                </a:solidFill>
+                <a:latin typeface="Arial" panose="020B0604020202020204" pitchFamily="34" charset="0"/>
+                <a:cs typeface="Arial" panose="020B0604020202020204" pitchFamily="34" charset="0"/>
+              </a:rPr>
+            </a:br>
+            <a:r>
+              <a:rPr lang="en-GB" sz="1600" dirty="0" smtClean="0">
+                <a:solidFill>
+                  <a:schemeClr val="bg1"/>
+                </a:solidFill>
+                <a:latin typeface="Arial" panose="020B0604020202020204" pitchFamily="34" charset="0"/>
+                <a:cs typeface="Arial" panose="020B0604020202020204" pitchFamily="34" charset="0"/>
+              </a:rPr>
+              <a:t>How to </a:t>
+            </a:r>
+            <a:r>
+              <a:rPr lang="en-GB" sz="1600" b="1" dirty="0" smtClean="0">
+                <a:solidFill>
+                  <a:schemeClr val="bg1"/>
+                </a:solidFill>
+                <a:latin typeface="Arial" panose="020B0604020202020204" pitchFamily="34" charset="0"/>
+                <a:cs typeface="Arial" panose="020B0604020202020204" pitchFamily="34" charset="0"/>
+              </a:rPr>
+              <a:t>balance </a:t>
+            </a:r>
+            <a:r>
+              <a:rPr lang="en-BE" sz="1600" b="1" dirty="0" smtClean="0">
+                <a:solidFill>
+                  <a:schemeClr val="bg1"/>
+                </a:solidFill>
+                <a:latin typeface="Arial" panose="020B0604020202020204" pitchFamily="34" charset="0"/>
+                <a:cs typeface="Arial" panose="020B0604020202020204" pitchFamily="34" charset="0"/>
+              </a:rPr>
+              <a:t>these two factors</a:t>
+            </a:r>
+            <a:r>
+              <a:rPr lang="en-GB" sz="1600" dirty="0" smtClean="0">
+                <a:solidFill>
+                  <a:schemeClr val="bg1"/>
+                </a:solidFill>
+                <a:latin typeface="Arial" panose="020B0604020202020204" pitchFamily="34" charset="0"/>
+                <a:cs typeface="Arial" panose="020B0604020202020204" pitchFamily="34" charset="0"/>
+              </a:rPr>
+              <a:t>?</a:t>
+            </a:r>
+            <a:endParaRPr lang="en-BE" sz="1600" dirty="0" smtClean="0">
               <a:solidFill>
                 <a:schemeClr val="bg1"/>
               </a:solidFill>
@@ -6764,7 +6984,51 @@
             </a:endParaRPr>
           </a:p>
           <a:p>
-            <a:endParaRPr lang="en-BE" dirty="0">
+            <a:pPr marL="457200" indent="-457200">
+              <a:buFont typeface="+mj-lt"/>
+              <a:buAutoNum type="arabicPeriod"/>
+            </a:pPr>
+            <a:r>
+              <a:rPr lang="en-GB" sz="1600" b="1" dirty="0" smtClean="0">
+                <a:solidFill>
+                  <a:schemeClr val="bg1"/>
+                </a:solidFill>
+                <a:latin typeface="Arial" panose="020B0604020202020204" pitchFamily="34" charset="0"/>
+                <a:cs typeface="Arial" panose="020B0604020202020204" pitchFamily="34" charset="0"/>
+              </a:rPr>
+              <a:t>What is the optimal approach to restricting the possible combinations of securities</a:t>
+            </a:r>
+            <a:r>
+              <a:rPr lang="en-GB" sz="1600" b="1" baseline="30000" dirty="0" smtClean="0">
+                <a:solidFill>
+                  <a:schemeClr val="bg1"/>
+                </a:solidFill>
+                <a:latin typeface="Arial" panose="020B0604020202020204" pitchFamily="34" charset="0"/>
+                <a:cs typeface="Arial" panose="020B0604020202020204" pitchFamily="34" charset="0"/>
+              </a:rPr>
+              <a:t>3</a:t>
+            </a:r>
+            <a:r>
+              <a:rPr lang="en-GB" sz="1600" b="1" dirty="0" smtClean="0">
+                <a:solidFill>
+                  <a:schemeClr val="bg1"/>
+                </a:solidFill>
+                <a:latin typeface="Arial" panose="020B0604020202020204" pitchFamily="34" charset="0"/>
+                <a:cs typeface="Arial" panose="020B0604020202020204" pitchFamily="34" charset="0"/>
+              </a:rPr>
+              <a:t> </a:t>
+            </a:r>
+            <a:r>
+              <a:rPr lang="en-GB" sz="1600" dirty="0" smtClean="0">
+                <a:solidFill>
+                  <a:schemeClr val="bg1"/>
+                </a:solidFill>
+                <a:latin typeface="Arial" panose="020B0604020202020204" pitchFamily="34" charset="0"/>
+                <a:cs typeface="Arial" panose="020B0604020202020204" pitchFamily="34" charset="0"/>
+              </a:rPr>
+              <a:t>(so that model accuracy and computational efficiency are well-balanced)?</a:t>
+            </a:r>
+            <a:endParaRPr lang="en-BE" sz="1600" dirty="0" smtClean="0">
               <a:solidFill>
                 <a:schemeClr val="bg1"/>
               </a:solidFill>
@@ -6773,28 +7037,62 @@
             </a:endParaRPr>
           </a:p>
           <a:p>
-            <a:r>
-              <a:rPr lang="en-GB" dirty="0">
-                <a:solidFill>
-                  <a:schemeClr val="bg1"/>
-                </a:solidFill>
-                <a:latin typeface="Arial" panose="020B0604020202020204" pitchFamily="34" charset="0"/>
-                <a:cs typeface="Arial" panose="020B0604020202020204" pitchFamily="34" charset="0"/>
-              </a:rPr>
-              <a:t>&lt;!-- Describe the challenges related to cleaning/filtering your raw data in order to prepare an analytic data set. What were the bottle necks (which tasks and which hardware resources)? How did you speed up/improve the data cleaning procedure for large amounts of data? Which tools/techniques did you use and how do these tools/techniques work?   </a:t>
-            </a:r>
-            <a:r>
-              <a:rPr lang="en-GB" dirty="0" smtClean="0">
-                <a:solidFill>
-                  <a:schemeClr val="bg1"/>
-                </a:solidFill>
-                <a:latin typeface="Arial" panose="020B0604020202020204" pitchFamily="34" charset="0"/>
-                <a:cs typeface="Arial" panose="020B0604020202020204" pitchFamily="34" charset="0"/>
-              </a:rPr>
-              <a:t>--&gt;</a:t>
-            </a:r>
-            <a:r>
-              <a:rPr lang="en-BE" dirty="0" smtClean="0">
+            <a:pPr marL="457200" indent="-457200">
+              <a:buFont typeface="+mj-lt"/>
+              <a:buAutoNum type="arabicPeriod"/>
+            </a:pPr>
+            <a:r>
+              <a:rPr lang="en-GB" sz="1600" b="1" dirty="0" smtClean="0">
+                <a:solidFill>
+                  <a:schemeClr val="bg1"/>
+                </a:solidFill>
+                <a:latin typeface="Arial" panose="020B0604020202020204" pitchFamily="34" charset="0"/>
+                <a:cs typeface="Arial" panose="020B0604020202020204" pitchFamily="34" charset="0"/>
+              </a:rPr>
+              <a:t>How to determine an optimal investment strategy by comparing equal-length portfolio return series</a:t>
+            </a:r>
+            <a:r>
+              <a:rPr lang="en-GB" sz="1600" b="1" baseline="30000" dirty="0" smtClean="0">
+                <a:solidFill>
+                  <a:schemeClr val="bg1"/>
+                </a:solidFill>
+                <a:latin typeface="Arial" panose="020B0604020202020204" pitchFamily="34" charset="0"/>
+                <a:cs typeface="Arial" panose="020B0604020202020204" pitchFamily="34" charset="0"/>
+              </a:rPr>
+              <a:t>4</a:t>
+            </a:r>
+            <a:r>
+              <a:rPr lang="en-GB" sz="1600" b="1" dirty="0" smtClean="0">
+                <a:solidFill>
+                  <a:schemeClr val="bg1"/>
+                </a:solidFill>
+                <a:latin typeface="Arial" panose="020B0604020202020204" pitchFamily="34" charset="0"/>
+                <a:cs typeface="Arial" panose="020B0604020202020204" pitchFamily="34" charset="0"/>
+              </a:rPr>
+              <a:t>  of each candidate investment strategy</a:t>
+            </a:r>
+            <a:r>
+              <a:rPr lang="en-GB" sz="1600" b="1" baseline="30000" dirty="0" smtClean="0">
+                <a:solidFill>
+                  <a:schemeClr val="bg1"/>
+                </a:solidFill>
+                <a:latin typeface="Arial" panose="020B0604020202020204" pitchFamily="34" charset="0"/>
+                <a:cs typeface="Arial" panose="020B0604020202020204" pitchFamily="34" charset="0"/>
+              </a:rPr>
+              <a:t>5</a:t>
+            </a:r>
+            <a:r>
+              <a:rPr lang="en-GB" sz="1600" dirty="0" smtClean="0">
+                <a:solidFill>
+                  <a:schemeClr val="bg1"/>
+                </a:solidFill>
+                <a:latin typeface="Arial" panose="020B0604020202020204" pitchFamily="34" charset="0"/>
+                <a:cs typeface="Arial" panose="020B0604020202020204" pitchFamily="34" charset="0"/>
+              </a:rPr>
+              <a:t>? </a:t>
+            </a:r>
+            <a:r>
+              <a:rPr lang="en-BE" sz="1600" dirty="0" smtClean="0">
                 <a:solidFill>
                   <a:schemeClr val="bg1"/>
                 </a:solidFill>
@@ -6804,7 +7102,7 @@
               <a:t/>
             </a:r>
             <a:br>
-              <a:rPr lang="en-BE" dirty="0" smtClean="0">
+              <a:rPr lang="en-BE" sz="1600" dirty="0" smtClean="0">
                 <a:solidFill>
                   <a:schemeClr val="bg1"/>
                 </a:solidFill>
@@ -6813,28 +7111,352 @@
               </a:rPr>
             </a:br>
             <a:r>
-              <a:rPr lang="en-BE" dirty="0" smtClean="0">
-                <a:solidFill>
-                  <a:schemeClr val="bg1"/>
-                </a:solidFill>
-                <a:latin typeface="Arial" panose="020B0604020202020204" pitchFamily="34" charset="0"/>
-                <a:cs typeface="Arial" panose="020B0604020202020204" pitchFamily="34" charset="0"/>
-              </a:rPr>
-              <a:t>Xxx</a:t>
-            </a:r>
+              <a:rPr lang="en-GB" sz="1600" dirty="0" smtClean="0">
+                <a:solidFill>
+                  <a:schemeClr val="bg1"/>
+                </a:solidFill>
+                <a:latin typeface="Arial" panose="020B0604020202020204" pitchFamily="34" charset="0"/>
+                <a:cs typeface="Arial" panose="020B0604020202020204" pitchFamily="34" charset="0"/>
+              </a:rPr>
+              <a:t>How do we include measures such as maximum drawdown, drawdown length and conditional </a:t>
+            </a:r>
+            <a:r>
+              <a:rPr lang="en-GB" sz="1600" dirty="0" err="1" smtClean="0">
+                <a:solidFill>
+                  <a:schemeClr val="bg1"/>
+                </a:solidFill>
+                <a:latin typeface="Arial" panose="020B0604020202020204" pitchFamily="34" charset="0"/>
+                <a:cs typeface="Arial" panose="020B0604020202020204" pitchFamily="34" charset="0"/>
+              </a:rPr>
+              <a:t>VaR</a:t>
+            </a:r>
+            <a:r>
+              <a:rPr lang="en-GB" sz="1600" dirty="0" smtClean="0">
+                <a:solidFill>
+                  <a:schemeClr val="bg1"/>
+                </a:solidFill>
+                <a:latin typeface="Arial" panose="020B0604020202020204" pitchFamily="34" charset="0"/>
+                <a:cs typeface="Arial" panose="020B0604020202020204" pitchFamily="34" charset="0"/>
+              </a:rPr>
+              <a:t> into such an evaluation?</a:t>
+            </a:r>
+            <a:endParaRPr lang="en-BE" sz="1600" dirty="0" smtClean="0">
+              <a:solidFill>
+                <a:schemeClr val="bg1"/>
+              </a:solidFill>
+              <a:latin typeface="Arial" panose="020B0604020202020204" pitchFamily="34" charset="0"/>
+              <a:cs typeface="Arial" panose="020B0604020202020204" pitchFamily="34" charset="0"/>
+            </a:endParaRPr>
+          </a:p>
+          <a:p>
+            <a:pPr marL="457200" indent="-457200">
+              <a:buFont typeface="+mj-lt"/>
+              <a:buAutoNum type="arabicPeriod"/>
+            </a:pPr>
+            <a:r>
+              <a:rPr lang="en-GB" sz="1600" b="1" dirty="0" smtClean="0">
+                <a:solidFill>
+                  <a:schemeClr val="bg1"/>
+                </a:solidFill>
+                <a:latin typeface="Arial" panose="020B0604020202020204" pitchFamily="34" charset="0"/>
+                <a:cs typeface="Arial" panose="020B0604020202020204" pitchFamily="34" charset="0"/>
+              </a:rPr>
+              <a:t>What are the optimal estimation method</a:t>
+            </a:r>
+            <a:r>
+              <a:rPr lang="en-GB" sz="1600" b="1" baseline="30000" dirty="0" smtClean="0">
+                <a:solidFill>
+                  <a:schemeClr val="bg1"/>
+                </a:solidFill>
+                <a:latin typeface="Arial" panose="020B0604020202020204" pitchFamily="34" charset="0"/>
+                <a:cs typeface="Arial" panose="020B0604020202020204" pitchFamily="34" charset="0"/>
+              </a:rPr>
+              <a:t>6</a:t>
+            </a:r>
+            <a:r>
+              <a:rPr lang="en-GB" sz="1600" b="1" dirty="0" smtClean="0">
+                <a:solidFill>
+                  <a:schemeClr val="bg1"/>
+                </a:solidFill>
+                <a:latin typeface="Arial" panose="020B0604020202020204" pitchFamily="34" charset="0"/>
+                <a:cs typeface="Arial" panose="020B0604020202020204" pitchFamily="34" charset="0"/>
+              </a:rPr>
+              <a:t> and corresponding specification</a:t>
+            </a:r>
+            <a:r>
+              <a:rPr lang="en-GB" sz="1600" b="1" baseline="30000" dirty="0" smtClean="0">
+                <a:solidFill>
+                  <a:schemeClr val="bg1"/>
+                </a:solidFill>
+                <a:latin typeface="Arial" panose="020B0604020202020204" pitchFamily="34" charset="0"/>
+                <a:cs typeface="Arial" panose="020B0604020202020204" pitchFamily="34" charset="0"/>
+              </a:rPr>
+              <a:t>7</a:t>
+            </a:r>
+            <a:r>
+              <a:rPr lang="en-GB" sz="1600" b="1" dirty="0" smtClean="0">
+                <a:solidFill>
+                  <a:schemeClr val="bg1"/>
+                </a:solidFill>
+                <a:latin typeface="Arial" panose="020B0604020202020204" pitchFamily="34" charset="0"/>
+                <a:cs typeface="Arial" panose="020B0604020202020204" pitchFamily="34" charset="0"/>
+              </a:rPr>
+              <a:t> </a:t>
+            </a:r>
+            <a:r>
+              <a:rPr lang="en-GB" sz="1600" dirty="0" smtClean="0">
+                <a:solidFill>
+                  <a:schemeClr val="bg1"/>
+                </a:solidFill>
+                <a:latin typeface="Arial" panose="020B0604020202020204" pitchFamily="34" charset="0"/>
+                <a:cs typeface="Arial" panose="020B0604020202020204" pitchFamily="34" charset="0"/>
+              </a:rPr>
+              <a:t>for determining the optimal investment strategy? </a:t>
+            </a:r>
+            <a:endParaRPr lang="en-BE" sz="1600" dirty="0" smtClean="0">
+              <a:solidFill>
+                <a:schemeClr val="bg1"/>
+              </a:solidFill>
+              <a:latin typeface="Arial" panose="020B0604020202020204" pitchFamily="34" charset="0"/>
+              <a:cs typeface="Arial" panose="020B0604020202020204" pitchFamily="34" charset="0"/>
+            </a:endParaRPr>
+          </a:p>
+          <a:p>
+            <a:pPr marL="457200" indent="-457200">
+              <a:buFont typeface="+mj-lt"/>
+              <a:buAutoNum type="arabicPeriod"/>
+            </a:pPr>
+            <a:r>
+              <a:rPr lang="en-GB" sz="1600" b="1" dirty="0" smtClean="0">
+                <a:solidFill>
+                  <a:schemeClr val="bg1"/>
+                </a:solidFill>
+                <a:latin typeface="Arial" panose="020B0604020202020204" pitchFamily="34" charset="0"/>
+                <a:cs typeface="Arial" panose="020B0604020202020204" pitchFamily="34" charset="0"/>
+              </a:rPr>
+              <a:t>How to validate the robustness and statistical reliability </a:t>
+            </a:r>
+            <a:r>
+              <a:rPr lang="en-GB" sz="1600" dirty="0" smtClean="0">
+                <a:solidFill>
+                  <a:schemeClr val="bg1"/>
+                </a:solidFill>
+                <a:latin typeface="Arial" panose="020B0604020202020204" pitchFamily="34" charset="0"/>
+                <a:cs typeface="Arial" panose="020B0604020202020204" pitchFamily="34" charset="0"/>
+              </a:rPr>
+              <a:t>of the </a:t>
+            </a:r>
+            <a:r>
+              <a:rPr lang="en-BE" sz="1600" dirty="0" smtClean="0">
+                <a:solidFill>
+                  <a:schemeClr val="bg1"/>
+                </a:solidFill>
+                <a:latin typeface="Arial" panose="020B0604020202020204" pitchFamily="34" charset="0"/>
+                <a:cs typeface="Arial" panose="020B0604020202020204" pitchFamily="34" charset="0"/>
+              </a:rPr>
+              <a:t>optimal </a:t>
+            </a:r>
+            <a:r>
+              <a:rPr lang="en-GB" sz="1600" dirty="0" smtClean="0">
+                <a:solidFill>
+                  <a:schemeClr val="bg1"/>
+                </a:solidFill>
+                <a:latin typeface="Arial" panose="020B0604020202020204" pitchFamily="34" charset="0"/>
+                <a:cs typeface="Arial" panose="020B0604020202020204" pitchFamily="34" charset="0"/>
+              </a:rPr>
+              <a:t>investment strategy?</a:t>
+            </a:r>
+          </a:p>
+          <a:p>
+            <a:pPr marL="457200" indent="-457200">
+              <a:buFont typeface="+mj-lt"/>
+              <a:buAutoNum type="arabicPeriod"/>
+            </a:pPr>
+            <a:r>
+              <a:rPr lang="en-GB" sz="1600" b="1" dirty="0" smtClean="0">
+                <a:solidFill>
+                  <a:schemeClr val="bg1"/>
+                </a:solidFill>
+                <a:latin typeface="Arial" panose="020B0604020202020204" pitchFamily="34" charset="0"/>
+                <a:cs typeface="Arial" panose="020B0604020202020204" pitchFamily="34" charset="0"/>
+              </a:rPr>
+              <a:t>How to account for inflation and foreign exchange </a:t>
+            </a:r>
+            <a:r>
+              <a:rPr lang="en-GB" sz="1600" b="1" dirty="0" err="1" smtClean="0">
+                <a:solidFill>
+                  <a:schemeClr val="bg1"/>
+                </a:solidFill>
+                <a:latin typeface="Arial" panose="020B0604020202020204" pitchFamily="34" charset="0"/>
+                <a:cs typeface="Arial" panose="020B0604020202020204" pitchFamily="34" charset="0"/>
+              </a:rPr>
+              <a:t>movemen</a:t>
+            </a:r>
+            <a:r>
+              <a:rPr lang="en-BE" sz="1600" b="1" dirty="0" smtClean="0">
+                <a:solidFill>
+                  <a:schemeClr val="bg1"/>
+                </a:solidFill>
+                <a:latin typeface="Arial" panose="020B0604020202020204" pitchFamily="34" charset="0"/>
+                <a:cs typeface="Arial" panose="020B0604020202020204" pitchFamily="34" charset="0"/>
+              </a:rPr>
+              <a:t>t</a:t>
+            </a:r>
+            <a:r>
+              <a:rPr lang="en-GB" sz="1600" b="1" dirty="0" smtClean="0">
+                <a:solidFill>
+                  <a:schemeClr val="bg1"/>
+                </a:solidFill>
+                <a:latin typeface="Arial" panose="020B0604020202020204" pitchFamily="34" charset="0"/>
+                <a:cs typeface="Arial" panose="020B0604020202020204" pitchFamily="34" charset="0"/>
+              </a:rPr>
+              <a:t>s </a:t>
+            </a:r>
+            <a:r>
+              <a:rPr lang="en-GB" sz="1600" dirty="0" smtClean="0">
+                <a:solidFill>
+                  <a:schemeClr val="bg1"/>
+                </a:solidFill>
+                <a:latin typeface="Arial" panose="020B0604020202020204" pitchFamily="34" charset="0"/>
+                <a:cs typeface="Arial" panose="020B0604020202020204" pitchFamily="34" charset="0"/>
+              </a:rPr>
+              <a:t>when determining the optimal investment strategy?</a:t>
+            </a:r>
+            <a:endParaRPr lang="en-BE" sz="1600" dirty="0" smtClean="0">
+              <a:solidFill>
+                <a:schemeClr val="bg1"/>
+              </a:solidFill>
+              <a:latin typeface="Arial" panose="020B0604020202020204" pitchFamily="34" charset="0"/>
+              <a:cs typeface="Arial" panose="020B0604020202020204" pitchFamily="34" charset="0"/>
+            </a:endParaRPr>
+          </a:p>
+          <a:p>
+            <a:pPr marL="457200" indent="-457200">
+              <a:buFont typeface="+mj-lt"/>
+              <a:buAutoNum type="arabicPeriod"/>
+            </a:pPr>
+            <a:r>
+              <a:rPr lang="en-GB" sz="1600" b="1" dirty="0" smtClean="0">
+                <a:solidFill>
+                  <a:schemeClr val="bg1"/>
+                </a:solidFill>
+                <a:latin typeface="Arial" panose="020B0604020202020204" pitchFamily="34" charset="0"/>
+                <a:cs typeface="Arial" panose="020B0604020202020204" pitchFamily="34" charset="0"/>
+              </a:rPr>
+              <a:t>What are the theoretical underpinnings and assumptions </a:t>
+            </a:r>
+            <a:r>
+              <a:rPr lang="en-GB" sz="1600" dirty="0" smtClean="0">
+                <a:solidFill>
+                  <a:schemeClr val="bg1"/>
+                </a:solidFill>
+                <a:latin typeface="Arial" panose="020B0604020202020204" pitchFamily="34" charset="0"/>
+                <a:cs typeface="Arial" panose="020B0604020202020204" pitchFamily="34" charset="0"/>
+              </a:rPr>
+              <a:t>of the optimization model?</a:t>
+            </a:r>
+          </a:p>
+          <a:p>
+            <a:pPr marL="457200" indent="-457200">
+              <a:buFont typeface="+mj-lt"/>
+              <a:buAutoNum type="arabicPeriod"/>
+            </a:pPr>
+            <a:r>
+              <a:rPr lang="en-GB" sz="1600" b="1" dirty="0" smtClean="0">
+                <a:solidFill>
+                  <a:schemeClr val="bg1"/>
+                </a:solidFill>
+                <a:latin typeface="Arial" panose="020B0604020202020204" pitchFamily="34" charset="0"/>
+                <a:cs typeface="Arial" panose="020B0604020202020204" pitchFamily="34" charset="0"/>
+              </a:rPr>
+              <a:t>What are potential drawbacks and limitations</a:t>
+            </a:r>
+            <a:r>
+              <a:rPr lang="en-GB" sz="1600" dirty="0" smtClean="0">
+                <a:solidFill>
+                  <a:schemeClr val="bg1"/>
+                </a:solidFill>
+                <a:latin typeface="Arial" panose="020B0604020202020204" pitchFamily="34" charset="0"/>
+                <a:cs typeface="Arial" panose="020B0604020202020204" pitchFamily="34" charset="0"/>
+              </a:rPr>
+              <a:t> of the model when applied to real-life investments</a:t>
+            </a:r>
+            <a:r>
+              <a:rPr lang="en-BE" sz="1600" dirty="0" smtClean="0">
+                <a:solidFill>
+                  <a:schemeClr val="bg1"/>
+                </a:solidFill>
+                <a:latin typeface="Arial" panose="020B0604020202020204" pitchFamily="34" charset="0"/>
+                <a:cs typeface="Arial" panose="020B0604020202020204" pitchFamily="34" charset="0"/>
+              </a:rPr>
+              <a:t>?</a:t>
+            </a:r>
+            <a:br>
+              <a:rPr lang="en-BE" sz="1600" dirty="0" smtClean="0">
+                <a:solidFill>
+                  <a:schemeClr val="bg1"/>
+                </a:solidFill>
+                <a:latin typeface="Arial" panose="020B0604020202020204" pitchFamily="34" charset="0"/>
+                <a:cs typeface="Arial" panose="020B0604020202020204" pitchFamily="34" charset="0"/>
+              </a:rPr>
+            </a:br>
+            <a:r>
+              <a:rPr lang="en-BE" sz="1600" b="1" dirty="0" smtClean="0">
+                <a:solidFill>
+                  <a:schemeClr val="bg1"/>
+                </a:solidFill>
+                <a:latin typeface="Arial" panose="020B0604020202020204" pitchFamily="34" charset="0"/>
+                <a:cs typeface="Arial" panose="020B0604020202020204" pitchFamily="34" charset="0"/>
+              </a:rPr>
+              <a:t>How </a:t>
+            </a:r>
+            <a:r>
+              <a:rPr lang="en-GB" sz="1600" b="1" dirty="0" smtClean="0">
+                <a:solidFill>
+                  <a:schemeClr val="bg1"/>
+                </a:solidFill>
+                <a:latin typeface="Arial" panose="020B0604020202020204" pitchFamily="34" charset="0"/>
+                <a:cs typeface="Arial" panose="020B0604020202020204" pitchFamily="34" charset="0"/>
+              </a:rPr>
+              <a:t>can these be addressed or mitigated</a:t>
+            </a:r>
+            <a:r>
+              <a:rPr lang="en-GB" sz="1600" dirty="0" smtClean="0">
+                <a:solidFill>
+                  <a:schemeClr val="bg1"/>
+                </a:solidFill>
+                <a:latin typeface="Arial" panose="020B0604020202020204" pitchFamily="34" charset="0"/>
+                <a:cs typeface="Arial" panose="020B0604020202020204" pitchFamily="34" charset="0"/>
+              </a:rPr>
+              <a:t>?</a:t>
+            </a:r>
+            <a:endParaRPr lang="en-GB" sz="1600" dirty="0">
+              <a:solidFill>
+                <a:schemeClr val="bg1"/>
+              </a:solidFill>
+              <a:latin typeface="Arial" panose="020B0604020202020204" pitchFamily="34" charset="0"/>
+              <a:cs typeface="Arial" panose="020B0604020202020204" pitchFamily="34" charset="0"/>
+            </a:endParaRPr>
           </a:p>
         </p:txBody>
       </p:sp>
     </p:spTree>
     <p:extLst>
       <p:ext uri="{BB962C8B-B14F-4D97-AF65-F5344CB8AC3E}">
-        <p14:creationId xmlns:p14="http://schemas.microsoft.com/office/powerpoint/2010/main" val="1926662717"/>
+        <p14:creationId xmlns:p14="http://schemas.microsoft.com/office/powerpoint/2010/main" val="683710211"/>
       </p:ext>
     </p:extLst>
   </p:cSld>
   <p:clrMapOvr>
     <a:masterClrMapping/>
   </p:clrMapOvr>
+  <p:timing>
+    <p:tnLst>
+      <p:par>
+        <p:cTn id="1" dur="indefinite" restart="never" nodeType="tmRoot"/>
+      </p:par>
+    </p:tnLst>
+  </p:timing>
 </p:sld>
 </file>
 

</xml_diff>